<commit_message>
modificaiones word y power point
</commit_message>
<xml_diff>
--- a/Documentacion/PresentaciónProyectoFinal.pptx
+++ b/Documentacion/PresentaciónProyectoFinal.pptx
@@ -308,7 +308,7 @@
             <a:fld id="{B61BEF0D-F0BB-DE4B-95CE-6DB70DBA9567}" type="datetimeFigureOut">
               <a:rPr lang="en-US" dirty="0"/>
               <a:pPr/>
-              <a:t>11/2/2022</a:t>
+              <a:t>11/3/2022</a:t>
             </a:fld>
             <a:endParaRPr lang="en-US" dirty="0"/>
           </a:p>
@@ -643,7 +643,7 @@
             <a:fld id="{B61BEF0D-F0BB-DE4B-95CE-6DB70DBA9567}" type="datetimeFigureOut">
               <a:rPr lang="en-US" dirty="0"/>
               <a:pPr/>
-              <a:t>11/2/2022</a:t>
+              <a:t>11/3/2022</a:t>
             </a:fld>
             <a:endParaRPr lang="en-US" dirty="0"/>
           </a:p>
@@ -1041,7 +1041,7 @@
             <a:fld id="{B61BEF0D-F0BB-DE4B-95CE-6DB70DBA9567}" type="datetimeFigureOut">
               <a:rPr lang="en-US" dirty="0"/>
               <a:pPr/>
-              <a:t>11/2/2022</a:t>
+              <a:t>11/3/2022</a:t>
             </a:fld>
             <a:endParaRPr lang="en-US" dirty="0"/>
           </a:p>
@@ -1374,7 +1374,7 @@
             <a:fld id="{B61BEF0D-F0BB-DE4B-95CE-6DB70DBA9567}" type="datetimeFigureOut">
               <a:rPr lang="en-US" dirty="0"/>
               <a:pPr/>
-              <a:t>11/2/2022</a:t>
+              <a:t>11/3/2022</a:t>
             </a:fld>
             <a:endParaRPr lang="en-US" dirty="0"/>
           </a:p>
@@ -1691,7 +1691,7 @@
             <a:fld id="{B61BEF0D-F0BB-DE4B-95CE-6DB70DBA9567}" type="datetimeFigureOut">
               <a:rPr lang="en-US" dirty="0"/>
               <a:pPr/>
-              <a:t>11/2/2022</a:t>
+              <a:t>11/3/2022</a:t>
             </a:fld>
             <a:endParaRPr lang="en-US" dirty="0"/>
           </a:p>
@@ -2084,7 +2084,7 @@
             <a:fld id="{B61BEF0D-F0BB-DE4B-95CE-6DB70DBA9567}" type="datetimeFigureOut">
               <a:rPr lang="en-US" dirty="0"/>
               <a:pPr/>
-              <a:t>11/2/2022</a:t>
+              <a:t>11/3/2022</a:t>
             </a:fld>
             <a:endParaRPr lang="en-US" dirty="0"/>
           </a:p>
@@ -2338,7 +2338,7 @@
             <a:fld id="{B61BEF0D-F0BB-DE4B-95CE-6DB70DBA9567}" type="datetimeFigureOut">
               <a:rPr lang="en-US" dirty="0"/>
               <a:pPr/>
-              <a:t>11/2/2022</a:t>
+              <a:t>11/3/2022</a:t>
             </a:fld>
             <a:endParaRPr lang="en-US" dirty="0"/>
           </a:p>
@@ -2597,7 +2597,7 @@
             <a:fld id="{B61BEF0D-F0BB-DE4B-95CE-6DB70DBA9567}" type="datetimeFigureOut">
               <a:rPr lang="en-US" dirty="0"/>
               <a:pPr/>
-              <a:t>11/2/2022</a:t>
+              <a:t>11/3/2022</a:t>
             </a:fld>
             <a:endParaRPr lang="en-US" dirty="0"/>
           </a:p>
@@ -2856,7 +2856,7 @@
             <a:fld id="{B61BEF0D-F0BB-DE4B-95CE-6DB70DBA9567}" type="datetimeFigureOut">
               <a:rPr lang="en-US" dirty="0"/>
               <a:pPr/>
-              <a:t>11/2/2022</a:t>
+              <a:t>11/3/2022</a:t>
             </a:fld>
             <a:endParaRPr lang="en-US" dirty="0"/>
           </a:p>
@@ -3182,7 +3182,7 @@
             <a:fld id="{B61BEF0D-F0BB-DE4B-95CE-6DB70DBA9567}" type="datetimeFigureOut">
               <a:rPr lang="en-US" dirty="0"/>
               <a:pPr/>
-              <a:t>11/2/2022</a:t>
+              <a:t>11/3/2022</a:t>
             </a:fld>
             <a:endParaRPr lang="en-US" dirty="0"/>
           </a:p>
@@ -3502,7 +3502,7 @@
             <a:fld id="{B61BEF0D-F0BB-DE4B-95CE-6DB70DBA9567}" type="datetimeFigureOut">
               <a:rPr lang="en-US" dirty="0"/>
               <a:pPr/>
-              <a:t>11/2/2022</a:t>
+              <a:t>11/3/2022</a:t>
             </a:fld>
             <a:endParaRPr lang="en-US" dirty="0"/>
           </a:p>
@@ -3956,7 +3956,7 @@
             <a:fld id="{B61BEF0D-F0BB-DE4B-95CE-6DB70DBA9567}" type="datetimeFigureOut">
               <a:rPr lang="en-US" dirty="0"/>
               <a:pPr/>
-              <a:t>11/2/2022</a:t>
+              <a:t>11/3/2022</a:t>
             </a:fld>
             <a:endParaRPr lang="en-US" dirty="0"/>
           </a:p>
@@ -4158,7 +4158,7 @@
             <a:fld id="{B61BEF0D-F0BB-DE4B-95CE-6DB70DBA9567}" type="datetimeFigureOut">
               <a:rPr lang="en-US" dirty="0"/>
               <a:pPr/>
-              <a:t>11/2/2022</a:t>
+              <a:t>11/3/2022</a:t>
             </a:fld>
             <a:endParaRPr lang="en-US" dirty="0"/>
           </a:p>
@@ -4332,7 +4332,7 @@
             <a:fld id="{B61BEF0D-F0BB-DE4B-95CE-6DB70DBA9567}" type="datetimeFigureOut">
               <a:rPr lang="en-US" dirty="0"/>
               <a:pPr/>
-              <a:t>11/2/2022</a:t>
+              <a:t>11/3/2022</a:t>
             </a:fld>
             <a:endParaRPr lang="en-US" dirty="0"/>
           </a:p>
@@ -4662,7 +4662,7 @@
             <a:fld id="{B61BEF0D-F0BB-DE4B-95CE-6DB70DBA9567}" type="datetimeFigureOut">
               <a:rPr lang="en-US" dirty="0"/>
               <a:pPr/>
-              <a:t>11/2/2022</a:t>
+              <a:t>11/3/2022</a:t>
             </a:fld>
             <a:endParaRPr lang="en-US" dirty="0"/>
           </a:p>
@@ -5004,7 +5004,7 @@
             <a:fld id="{B61BEF0D-F0BB-DE4B-95CE-6DB70DBA9567}" type="datetimeFigureOut">
               <a:rPr lang="en-US" dirty="0"/>
               <a:pPr/>
-              <a:t>11/2/2022</a:t>
+              <a:t>11/3/2022</a:t>
             </a:fld>
             <a:endParaRPr lang="en-US" dirty="0"/>
           </a:p>
@@ -7118,7 +7118,7 @@
             <a:fld id="{B61BEF0D-F0BB-DE4B-95CE-6DB70DBA9567}" type="datetimeFigureOut">
               <a:rPr lang="en-US" dirty="0"/>
               <a:pPr/>
-              <a:t>11/2/2022</a:t>
+              <a:t>11/3/2022</a:t>
             </a:fld>
             <a:endParaRPr lang="en-US" dirty="0"/>
           </a:p>
@@ -7713,13 +7713,13 @@
   <p:clrMapOvr>
     <a:masterClrMapping/>
   </p:clrMapOvr>
-  <mc:AlternateContent xmlns:mc="http://schemas.openxmlformats.org/markup-compatibility/2006">
-    <mc:Choice xmlns:p14="http://schemas.microsoft.com/office/powerpoint/2010/main" Requires="p14">
+  <mc:AlternateContent xmlns:mc="http://schemas.openxmlformats.org/markup-compatibility/2006" xmlns:p14="http://schemas.microsoft.com/office/powerpoint/2010/main">
+    <mc:Choice Requires="p14">
       <p:transition spd="slow" p14:dur="1500">
         <p14:window dir="vert"/>
       </p:transition>
     </mc:Choice>
-    <mc:Fallback>
+    <mc:Fallback xmlns="">
       <p:transition spd="slow">
         <p:fade/>
       </p:transition>
@@ -7835,11 +7835,7 @@
           <a:p>
             <a:r>
               <a:rPr lang="es-ES" dirty="0" smtClean="0"/>
-              <a:t>Vemos </a:t>
-            </a:r>
-            <a:r>
-              <a:rPr lang="es-ES" dirty="0" smtClean="0"/>
-              <a:t>el para que del sistema: </a:t>
+              <a:t>Vemos el para que del sistema: </a:t>
             </a:r>
           </a:p>
           <a:p>
@@ -7887,13 +7883,13 @@
   <p:clrMapOvr>
     <a:masterClrMapping/>
   </p:clrMapOvr>
-  <mc:AlternateContent xmlns:mc="http://schemas.openxmlformats.org/markup-compatibility/2006">
-    <mc:Choice xmlns:p15="http://schemas.microsoft.com/office/powerpoint/2012/main" Requires="p15">
+  <mc:AlternateContent xmlns:mc="http://schemas.openxmlformats.org/markup-compatibility/2006" xmlns:p15="http://schemas.microsoft.com/office/powerpoint/2012/main">
+    <mc:Choice Requires="p15">
       <p:transition xmlns:p14="http://schemas.microsoft.com/office/powerpoint/2010/main" spd="slow" p14:dur="2000">
         <p15:prstTrans prst="fallOver"/>
       </p:transition>
     </mc:Choice>
-    <mc:Fallback>
+    <mc:Fallback xmlns="">
       <p:transition spd="slow">
         <p:fade/>
       </p:transition>
@@ -8744,13 +8740,13 @@
   <p:clrMapOvr>
     <a:masterClrMapping/>
   </p:clrMapOvr>
-  <mc:AlternateContent xmlns:mc="http://schemas.openxmlformats.org/markup-compatibility/2006">
-    <mc:Choice xmlns:p14="http://schemas.microsoft.com/office/powerpoint/2010/main" Requires="p14">
+  <mc:AlternateContent xmlns:mc="http://schemas.openxmlformats.org/markup-compatibility/2006" xmlns:p14="http://schemas.microsoft.com/office/powerpoint/2010/main">
+    <mc:Choice Requires="p14">
       <p:transition spd="slow" p14:dur="3000">
         <p14:shred/>
       </p:transition>
     </mc:Choice>
-    <mc:Fallback>
+    <mc:Fallback xmlns="">
       <p:transition spd="slow">
         <p:fade/>
       </p:transition>
@@ -9979,13 +9975,25 @@
           <a:p>
             <a:r>
               <a:rPr lang="es-ES" dirty="0" smtClean="0"/>
-              <a:t>Crud de Clientes (crea, edita, actualiza y borra)</a:t>
-            </a:r>
-          </a:p>
-          <a:p>
+              <a:t>Gestión </a:t>
+            </a:r>
             <a:r>
               <a:rPr lang="es-ES" dirty="0" smtClean="0"/>
-              <a:t>Crud de Servicios </a:t>
+              <a:t>de Clientes (crea, edita, actualiza y borra)</a:t>
+            </a:r>
+          </a:p>
+          <a:p>
+            <a:r>
+              <a:rPr lang="es-ES" dirty="0" smtClean="0"/>
+              <a:t>Gestión</a:t>
+            </a:r>
+            <a:r>
+              <a:rPr lang="es-ES" dirty="0" smtClean="0"/>
+              <a:t> </a:t>
+            </a:r>
+            <a:r>
+              <a:rPr lang="es-ES" dirty="0" smtClean="0"/>
+              <a:t>de Servicios </a:t>
             </a:r>
             <a:r>
               <a:rPr lang="es-ES" dirty="0"/>
@@ -9999,7 +10007,15 @@
           <a:p>
             <a:r>
               <a:rPr lang="es-ES" dirty="0" smtClean="0"/>
-              <a:t>Crud de Turnos </a:t>
+              <a:t>Gestión</a:t>
+            </a:r>
+            <a:r>
+              <a:rPr lang="es-ES" dirty="0" smtClean="0"/>
+              <a:t> </a:t>
+            </a:r>
+            <a:r>
+              <a:rPr lang="es-ES" dirty="0" smtClean="0"/>
+              <a:t>de Turnos </a:t>
             </a:r>
             <a:r>
               <a:rPr lang="es-ES" dirty="0"/>
@@ -10635,13 +10651,13 @@
   <p:clrMapOvr>
     <a:masterClrMapping/>
   </p:clrMapOvr>
-  <mc:AlternateContent xmlns:mc="http://schemas.openxmlformats.org/markup-compatibility/2006">
-    <mc:Choice xmlns:p14="http://schemas.microsoft.com/office/powerpoint/2010/main" Requires="p14">
+  <mc:AlternateContent xmlns:mc="http://schemas.openxmlformats.org/markup-compatibility/2006" xmlns:p14="http://schemas.microsoft.com/office/powerpoint/2010/main">
+    <mc:Choice Requires="p14">
       <p:transition spd="slow" p14:dur="4000">
         <p14:vortex dir="r"/>
       </p:transition>
     </mc:Choice>
-    <mc:Fallback>
+    <mc:Fallback xmlns="">
       <p:transition spd="slow">
         <p:fade/>
       </p:transition>
@@ -10967,13 +10983,13 @@
   <p:clrMapOvr>
     <a:masterClrMapping/>
   </p:clrMapOvr>
-  <mc:AlternateContent xmlns:mc="http://schemas.openxmlformats.org/markup-compatibility/2006">
-    <mc:Choice xmlns:p14="http://schemas.microsoft.com/office/powerpoint/2010/main" Requires="p14">
+  <mc:AlternateContent xmlns:mc="http://schemas.openxmlformats.org/markup-compatibility/2006" xmlns:p14="http://schemas.microsoft.com/office/powerpoint/2010/main">
+    <mc:Choice Requires="p14">
       <p:transition spd="slow" p14:dur="4400">
         <p14:honeycomb/>
       </p:transition>
     </mc:Choice>
-    <mc:Fallback>
+    <mc:Fallback xmlns="">
       <p:transition spd="slow">
         <p:fade/>
       </p:transition>
@@ -11781,7 +11797,7 @@
         </p:blipFill>
         <p:spPr>
           <a:xfrm>
-            <a:off x="2086709" y="1472001"/>
+            <a:off x="1319000" y="1472001"/>
             <a:ext cx="1654154" cy="1654154"/>
           </a:xfrm>
           <a:prstGeom prst="rect">
@@ -11841,7 +11857,7 @@
         </p:blipFill>
         <p:spPr>
           <a:xfrm>
-            <a:off x="6482897" y="3155044"/>
+            <a:off x="6352501" y="2915607"/>
             <a:ext cx="2602597" cy="1626623"/>
           </a:xfrm>
           <a:prstGeom prst="rect">
@@ -11871,7 +11887,7 @@
         </p:blipFill>
         <p:spPr>
           <a:xfrm>
-            <a:off x="4009043" y="1879211"/>
+            <a:off x="3772324" y="1357050"/>
             <a:ext cx="2098886" cy="2023734"/>
           </a:xfrm>
           <a:prstGeom prst="rect">
@@ -11999,6 +12015,612 @@
           </a:prstGeom>
         </p:spPr>
       </p:pic>
+      <p:sp>
+        <p:nvSpPr>
+          <p:cNvPr id="13" name="Cuadro de texto 2"/>
+          <p:cNvSpPr txBox="1">
+            <a:spLocks noChangeArrowheads="1"/>
+          </p:cNvSpPr>
+          <p:nvPr/>
+        </p:nvSpPr>
+        <p:spPr bwMode="auto">
+          <a:xfrm>
+            <a:off x="1064029" y="2992494"/>
+            <a:ext cx="2096609" cy="466725"/>
+          </a:xfrm>
+          <a:prstGeom prst="rect">
+            <a:avLst/>
+          </a:prstGeom>
+          <a:noFill/>
+          <a:ln>
+            <a:noFill/>
+          </a:ln>
+          <a:effectLst/>
+        </p:spPr>
+        <p:txBody>
+          <a:bodyPr rot="0" vert="horz" wrap="square" lIns="91440" tIns="45720" rIns="91440" bIns="45720" anchor="t" anchorCtr="0">
+            <a:noAutofit/>
+          </a:bodyPr>
+          <a:lstStyle/>
+          <a:p>
+            <a:pPr marL="0" marR="0" lvl="0" indent="0" algn="ctr" defTabSz="914400" eaLnBrk="1" fontAlgn="auto" latinLnBrk="0" hangingPunct="1">
+              <a:lnSpc>
+                <a:spcPct val="115000"/>
+              </a:lnSpc>
+              <a:spcBef>
+                <a:spcPts val="0"/>
+              </a:spcBef>
+              <a:spcAft>
+                <a:spcPts val="1000"/>
+              </a:spcAft>
+              <a:buClrTx/>
+              <a:buSzTx/>
+              <a:buFontTx/>
+              <a:buNone/>
+              <a:tabLst/>
+              <a:defRPr/>
+            </a:pPr>
+            <a:r>
+              <a:rPr kumimoji="0" lang="es-AR" sz="1050" b="0" i="0" u="none" strike="noStrike" kern="0" cap="none" spc="0" normalizeH="0" baseline="0" noProof="0" dirty="0" smtClean="0">
+                <a:ln>
+                  <a:noFill/>
+                </a:ln>
+                <a:solidFill>
+                  <a:sysClr val="windowText" lastClr="000000"/>
+                </a:solidFill>
+                <a:effectLst/>
+                <a:uLnTx/>
+                <a:uFillTx/>
+                <a:latin typeface="Calibri" panose="020F0502020204030204"/>
+                <a:ea typeface="Times New Roman" panose="02020603050405020304" pitchFamily="18" charset="0"/>
+                <a:cs typeface="Times New Roman" panose="02020603050405020304" pitchFamily="18" charset="0"/>
+              </a:rPr>
+              <a:t>Utilizado como lenguaje principal de programación</a:t>
+            </a:r>
+            <a:endParaRPr kumimoji="0" lang="es-AR" sz="1050" b="0" i="0" u="none" strike="noStrike" kern="0" cap="none" spc="0" normalizeH="0" baseline="0" noProof="0" dirty="0">
+              <a:ln>
+                <a:noFill/>
+              </a:ln>
+              <a:solidFill>
+                <a:sysClr val="windowText" lastClr="000000"/>
+              </a:solidFill>
+              <a:effectLst/>
+              <a:uLnTx/>
+              <a:uFillTx/>
+              <a:latin typeface="Calibri" panose="020F0502020204030204"/>
+              <a:ea typeface="Times New Roman" panose="02020603050405020304" pitchFamily="18" charset="0"/>
+              <a:cs typeface="Times New Roman" panose="02020603050405020304" pitchFamily="18" charset="0"/>
+            </a:endParaRPr>
+          </a:p>
+        </p:txBody>
+      </p:sp>
+      <p:sp>
+        <p:nvSpPr>
+          <p:cNvPr id="14" name="Cuadro de texto 2"/>
+          <p:cNvSpPr txBox="1">
+            <a:spLocks noChangeArrowheads="1"/>
+          </p:cNvSpPr>
+          <p:nvPr/>
+        </p:nvSpPr>
+        <p:spPr bwMode="auto">
+          <a:xfrm>
+            <a:off x="3383175" y="3257426"/>
+            <a:ext cx="2877185" cy="612140"/>
+          </a:xfrm>
+          <a:prstGeom prst="rect">
+            <a:avLst/>
+          </a:prstGeom>
+          <a:noFill/>
+          <a:ln>
+            <a:noFill/>
+          </a:ln>
+        </p:spPr>
+        <p:style>
+          <a:lnRef idx="0">
+            <a:scrgbClr r="0" g="0" b="0"/>
+          </a:lnRef>
+          <a:fillRef idx="0">
+            <a:scrgbClr r="0" g="0" b="0"/>
+          </a:fillRef>
+          <a:effectRef idx="0">
+            <a:scrgbClr r="0" g="0" b="0"/>
+          </a:effectRef>
+          <a:fontRef idx="minor">
+            <a:schemeClr val="dk1"/>
+          </a:fontRef>
+        </p:style>
+        <p:txBody>
+          <a:bodyPr rot="0" vert="horz" wrap="square" lIns="91440" tIns="45720" rIns="91440" bIns="45720" anchor="t" anchorCtr="0">
+            <a:noAutofit/>
+          </a:bodyPr>
+          <a:lstStyle/>
+          <a:p>
+            <a:pPr algn="ctr">
+              <a:lnSpc>
+                <a:spcPct val="115000"/>
+              </a:lnSpc>
+              <a:spcAft>
+                <a:spcPts val="1000"/>
+              </a:spcAft>
+            </a:pPr>
+            <a:r>
+              <a:rPr lang="es-AR" sz="1050" dirty="0">
+                <a:effectLst/>
+                <a:ea typeface="Times New Roman" panose="02020603050405020304" pitchFamily="18" charset="0"/>
+                <a:cs typeface="Times New Roman" panose="02020603050405020304" pitchFamily="18" charset="0"/>
+              </a:rPr>
+              <a:t>Librería con la que se creó las interfaces de usuario, versión 18.2.0</a:t>
+            </a:r>
+          </a:p>
+        </p:txBody>
+      </p:sp>
+      <p:sp>
+        <p:nvSpPr>
+          <p:cNvPr id="16" name="Cuadro de texto 2"/>
+          <p:cNvSpPr txBox="1">
+            <a:spLocks noChangeArrowheads="1"/>
+          </p:cNvSpPr>
+          <p:nvPr/>
+        </p:nvSpPr>
+        <p:spPr bwMode="auto">
+          <a:xfrm>
+            <a:off x="8967009" y="2981685"/>
+            <a:ext cx="2446487" cy="447675"/>
+          </a:xfrm>
+          <a:prstGeom prst="rect">
+            <a:avLst/>
+          </a:prstGeom>
+          <a:noFill/>
+          <a:ln>
+            <a:noFill/>
+          </a:ln>
+        </p:spPr>
+        <p:style>
+          <a:lnRef idx="0">
+            <a:scrgbClr r="0" g="0" b="0"/>
+          </a:lnRef>
+          <a:fillRef idx="0">
+            <a:scrgbClr r="0" g="0" b="0"/>
+          </a:fillRef>
+          <a:effectRef idx="0">
+            <a:scrgbClr r="0" g="0" b="0"/>
+          </a:effectRef>
+          <a:fontRef idx="minor">
+            <a:schemeClr val="dk1"/>
+          </a:fontRef>
+        </p:style>
+        <p:txBody>
+          <a:bodyPr rot="0" vert="horz" wrap="square" lIns="91440" tIns="45720" rIns="91440" bIns="45720" anchor="t" anchorCtr="0">
+            <a:noAutofit/>
+          </a:bodyPr>
+          <a:lstStyle/>
+          <a:p>
+            <a:pPr algn="ctr">
+              <a:lnSpc>
+                <a:spcPct val="115000"/>
+              </a:lnSpc>
+              <a:spcAft>
+                <a:spcPts val="1000"/>
+              </a:spcAft>
+            </a:pPr>
+            <a:r>
+              <a:rPr lang="es-AR" sz="1050" dirty="0">
+                <a:effectLst/>
+                <a:ea typeface="Times New Roman" panose="02020603050405020304" pitchFamily="18" charset="0"/>
+                <a:cs typeface="Times New Roman" panose="02020603050405020304" pitchFamily="18" charset="0"/>
+              </a:rPr>
+              <a:t>Gestor con el que se creó el código fuente.</a:t>
+            </a:r>
+          </a:p>
+        </p:txBody>
+      </p:sp>
+      <p:sp>
+        <p:nvSpPr>
+          <p:cNvPr id="18" name="Cuadro de texto 2"/>
+          <p:cNvSpPr txBox="1">
+            <a:spLocks noChangeArrowheads="1"/>
+          </p:cNvSpPr>
+          <p:nvPr/>
+        </p:nvSpPr>
+        <p:spPr bwMode="auto">
+          <a:xfrm>
+            <a:off x="6036212" y="2165680"/>
+            <a:ext cx="2574765" cy="468630"/>
+          </a:xfrm>
+          <a:prstGeom prst="rect">
+            <a:avLst/>
+          </a:prstGeom>
+          <a:noFill/>
+          <a:ln>
+            <a:noFill/>
+          </a:ln>
+        </p:spPr>
+        <p:style>
+          <a:lnRef idx="0">
+            <a:scrgbClr r="0" g="0" b="0"/>
+          </a:lnRef>
+          <a:fillRef idx="0">
+            <a:scrgbClr r="0" g="0" b="0"/>
+          </a:fillRef>
+          <a:effectRef idx="0">
+            <a:scrgbClr r="0" g="0" b="0"/>
+          </a:effectRef>
+          <a:fontRef idx="minor">
+            <a:schemeClr val="dk1"/>
+          </a:fontRef>
+        </p:style>
+        <p:txBody>
+          <a:bodyPr rot="0" vert="horz" wrap="square" lIns="91440" tIns="45720" rIns="91440" bIns="45720" anchor="t" anchorCtr="0">
+            <a:noAutofit/>
+          </a:bodyPr>
+          <a:lstStyle/>
+          <a:p>
+            <a:pPr algn="ctr">
+              <a:lnSpc>
+                <a:spcPct val="115000"/>
+              </a:lnSpc>
+              <a:spcAft>
+                <a:spcPts val="1000"/>
+              </a:spcAft>
+            </a:pPr>
+            <a:r>
+              <a:rPr lang="es-AR" sz="1050" dirty="0">
+                <a:effectLst/>
+                <a:ea typeface="Times New Roman" panose="02020603050405020304" pitchFamily="18" charset="0"/>
+                <a:cs typeface="Times New Roman" panose="02020603050405020304" pitchFamily="18" charset="0"/>
+              </a:rPr>
+              <a:t>Librería utilizada para los </a:t>
+            </a:r>
+            <a:r>
+              <a:rPr lang="es-AR" sz="1050" dirty="0" smtClean="0">
+                <a:effectLst/>
+                <a:ea typeface="Times New Roman" panose="02020603050405020304" pitchFamily="18" charset="0"/>
+                <a:cs typeface="Times New Roman" panose="02020603050405020304" pitchFamily="18" charset="0"/>
+              </a:rPr>
+              <a:t>componentes, estilos y animaciones</a:t>
+            </a:r>
+            <a:endParaRPr lang="es-AR" sz="1050" dirty="0">
+              <a:effectLst/>
+              <a:ea typeface="Times New Roman" panose="02020603050405020304" pitchFamily="18" charset="0"/>
+              <a:cs typeface="Times New Roman" panose="02020603050405020304" pitchFamily="18" charset="0"/>
+            </a:endParaRPr>
+          </a:p>
+        </p:txBody>
+      </p:sp>
+      <p:sp>
+        <p:nvSpPr>
+          <p:cNvPr id="19" name="Cuadro de texto 2"/>
+          <p:cNvSpPr txBox="1">
+            <a:spLocks noChangeArrowheads="1"/>
+          </p:cNvSpPr>
+          <p:nvPr/>
+        </p:nvSpPr>
+        <p:spPr bwMode="auto">
+          <a:xfrm>
+            <a:off x="6416785" y="4447698"/>
+            <a:ext cx="2727215" cy="492760"/>
+          </a:xfrm>
+          <a:prstGeom prst="rect">
+            <a:avLst/>
+          </a:prstGeom>
+          <a:noFill/>
+          <a:ln>
+            <a:noFill/>
+          </a:ln>
+        </p:spPr>
+        <p:style>
+          <a:lnRef idx="0">
+            <a:scrgbClr r="0" g="0" b="0"/>
+          </a:lnRef>
+          <a:fillRef idx="0">
+            <a:scrgbClr r="0" g="0" b="0"/>
+          </a:fillRef>
+          <a:effectRef idx="0">
+            <a:scrgbClr r="0" g="0" b="0"/>
+          </a:effectRef>
+          <a:fontRef idx="minor">
+            <a:schemeClr val="dk1"/>
+          </a:fontRef>
+        </p:style>
+        <p:txBody>
+          <a:bodyPr rot="0" vert="horz" wrap="square" lIns="91440" tIns="45720" rIns="91440" bIns="45720" anchor="t" anchorCtr="0">
+            <a:noAutofit/>
+          </a:bodyPr>
+          <a:lstStyle/>
+          <a:p>
+            <a:pPr algn="ctr">
+              <a:lnSpc>
+                <a:spcPct val="115000"/>
+              </a:lnSpc>
+              <a:spcAft>
+                <a:spcPts val="1000"/>
+              </a:spcAft>
+            </a:pPr>
+            <a:r>
+              <a:rPr lang="es-AR" sz="1050" dirty="0">
+                <a:effectLst/>
+                <a:ea typeface="Times New Roman" panose="02020603050405020304" pitchFamily="18" charset="0"/>
+                <a:cs typeface="Times New Roman" panose="02020603050405020304" pitchFamily="18" charset="0"/>
+              </a:rPr>
+              <a:t>Gestor utilizado para la gestión y almacenamiento de la base de datos</a:t>
+            </a:r>
+          </a:p>
+        </p:txBody>
+      </p:sp>
+      <p:sp>
+        <p:nvSpPr>
+          <p:cNvPr id="20" name="Cuadro de texto 2"/>
+          <p:cNvSpPr txBox="1">
+            <a:spLocks noChangeArrowheads="1"/>
+          </p:cNvSpPr>
+          <p:nvPr/>
+        </p:nvSpPr>
+        <p:spPr bwMode="auto">
+          <a:xfrm>
+            <a:off x="3564745" y="6240412"/>
+            <a:ext cx="2952433" cy="476885"/>
+          </a:xfrm>
+          <a:prstGeom prst="rect">
+            <a:avLst/>
+          </a:prstGeom>
+          <a:noFill/>
+          <a:ln>
+            <a:noFill/>
+          </a:ln>
+        </p:spPr>
+        <p:style>
+          <a:lnRef idx="0">
+            <a:scrgbClr r="0" g="0" b="0"/>
+          </a:lnRef>
+          <a:fillRef idx="0">
+            <a:scrgbClr r="0" g="0" b="0"/>
+          </a:fillRef>
+          <a:effectRef idx="0">
+            <a:scrgbClr r="0" g="0" b="0"/>
+          </a:effectRef>
+          <a:fontRef idx="minor">
+            <a:schemeClr val="dk1"/>
+          </a:fontRef>
+        </p:style>
+        <p:txBody>
+          <a:bodyPr rot="0" vert="horz" wrap="square" lIns="91440" tIns="45720" rIns="91440" bIns="45720" anchor="t" anchorCtr="0">
+            <a:noAutofit/>
+          </a:bodyPr>
+          <a:lstStyle/>
+          <a:p>
+            <a:pPr algn="ctr">
+              <a:lnSpc>
+                <a:spcPct val="115000"/>
+              </a:lnSpc>
+              <a:spcAft>
+                <a:spcPts val="1000"/>
+              </a:spcAft>
+            </a:pPr>
+            <a:r>
+              <a:rPr lang="es-AR" sz="1050" dirty="0">
+                <a:effectLst/>
+                <a:ea typeface="Times New Roman" panose="02020603050405020304" pitchFamily="18" charset="0"/>
+                <a:cs typeface="Times New Roman" panose="02020603050405020304" pitchFamily="18" charset="0"/>
+              </a:rPr>
+              <a:t>ORM que permitió manipular la base de datos</a:t>
+            </a:r>
+          </a:p>
+        </p:txBody>
+      </p:sp>
+      <p:sp>
+        <p:nvSpPr>
+          <p:cNvPr id="21" name="Cuadro de texto 2"/>
+          <p:cNvSpPr txBox="1">
+            <a:spLocks noChangeArrowheads="1"/>
+          </p:cNvSpPr>
+          <p:nvPr/>
+        </p:nvSpPr>
+        <p:spPr bwMode="auto">
+          <a:xfrm>
+            <a:off x="7492897" y="6074321"/>
+            <a:ext cx="3587968" cy="318285"/>
+          </a:xfrm>
+          <a:prstGeom prst="rect">
+            <a:avLst/>
+          </a:prstGeom>
+          <a:noFill/>
+          <a:ln>
+            <a:noFill/>
+          </a:ln>
+        </p:spPr>
+        <p:style>
+          <a:lnRef idx="0">
+            <a:scrgbClr r="0" g="0" b="0"/>
+          </a:lnRef>
+          <a:fillRef idx="0">
+            <a:scrgbClr r="0" g="0" b="0"/>
+          </a:fillRef>
+          <a:effectRef idx="0">
+            <a:scrgbClr r="0" g="0" b="0"/>
+          </a:effectRef>
+          <a:fontRef idx="minor">
+            <a:schemeClr val="dk1"/>
+          </a:fontRef>
+        </p:style>
+        <p:txBody>
+          <a:bodyPr rot="0" vert="horz" wrap="square" lIns="91440" tIns="45720" rIns="91440" bIns="45720" anchor="t" anchorCtr="0">
+            <a:noAutofit/>
+          </a:bodyPr>
+          <a:lstStyle/>
+          <a:p>
+            <a:pPr algn="ctr">
+              <a:lnSpc>
+                <a:spcPct val="115000"/>
+              </a:lnSpc>
+              <a:spcAft>
+                <a:spcPts val="1000"/>
+              </a:spcAft>
+            </a:pPr>
+            <a:r>
+              <a:rPr lang="es-AR" sz="1050" dirty="0">
+                <a:effectLst/>
+                <a:ea typeface="Times New Roman" panose="02020603050405020304" pitchFamily="18" charset="0"/>
+                <a:cs typeface="Times New Roman" panose="02020603050405020304" pitchFamily="18" charset="0"/>
+              </a:rPr>
+              <a:t>ORM que permitió manipular la base de datos</a:t>
+            </a:r>
+          </a:p>
+        </p:txBody>
+      </p:sp>
+      <p:sp>
+        <p:nvSpPr>
+          <p:cNvPr id="22" name="Cuadro de texto 2"/>
+          <p:cNvSpPr txBox="1">
+            <a:spLocks noChangeArrowheads="1"/>
+          </p:cNvSpPr>
+          <p:nvPr/>
+        </p:nvSpPr>
+        <p:spPr bwMode="auto">
+          <a:xfrm>
+            <a:off x="1230284" y="6091999"/>
+            <a:ext cx="2233066" cy="476885"/>
+          </a:xfrm>
+          <a:prstGeom prst="rect">
+            <a:avLst/>
+          </a:prstGeom>
+          <a:noFill/>
+          <a:ln>
+            <a:noFill/>
+          </a:ln>
+        </p:spPr>
+        <p:style>
+          <a:lnRef idx="0">
+            <a:scrgbClr r="0" g="0" b="0"/>
+          </a:lnRef>
+          <a:fillRef idx="0">
+            <a:scrgbClr r="0" g="0" b="0"/>
+          </a:fillRef>
+          <a:effectRef idx="0">
+            <a:scrgbClr r="0" g="0" b="0"/>
+          </a:effectRef>
+          <a:fontRef idx="minor">
+            <a:schemeClr val="dk1"/>
+          </a:fontRef>
+        </p:style>
+        <p:txBody>
+          <a:bodyPr rot="0" vert="horz" wrap="square" lIns="91440" tIns="45720" rIns="91440" bIns="45720" anchor="t" anchorCtr="0">
+            <a:noAutofit/>
+          </a:bodyPr>
+          <a:lstStyle/>
+          <a:p>
+            <a:pPr algn="ctr">
+              <a:lnSpc>
+                <a:spcPct val="115000"/>
+              </a:lnSpc>
+              <a:spcAft>
+                <a:spcPts val="1000"/>
+              </a:spcAft>
+            </a:pPr>
+            <a:r>
+              <a:rPr lang="es-AR" sz="1050" dirty="0" smtClean="0">
+                <a:effectLst/>
+                <a:ea typeface="Times New Roman" panose="02020603050405020304" pitchFamily="18" charset="0"/>
+                <a:cs typeface="Times New Roman" panose="02020603050405020304" pitchFamily="18" charset="0"/>
+              </a:rPr>
+              <a:t>Librería encargada de todo el calendario </a:t>
+            </a:r>
+            <a:r>
+              <a:rPr lang="es-AR" sz="1050" dirty="0" err="1" smtClean="0">
+                <a:effectLst/>
+                <a:ea typeface="Times New Roman" panose="02020603050405020304" pitchFamily="18" charset="0"/>
+                <a:cs typeface="Times New Roman" panose="02020603050405020304" pitchFamily="18" charset="0"/>
+              </a:rPr>
+              <a:t>drag</a:t>
+            </a:r>
+            <a:r>
+              <a:rPr lang="es-AR" sz="1050" dirty="0" smtClean="0">
+                <a:effectLst/>
+                <a:ea typeface="Times New Roman" panose="02020603050405020304" pitchFamily="18" charset="0"/>
+                <a:cs typeface="Times New Roman" panose="02020603050405020304" pitchFamily="18" charset="0"/>
+              </a:rPr>
+              <a:t> and </a:t>
+            </a:r>
+            <a:r>
+              <a:rPr lang="es-AR" sz="1050" dirty="0" err="1" smtClean="0">
+                <a:effectLst/>
+                <a:ea typeface="Times New Roman" panose="02020603050405020304" pitchFamily="18" charset="0"/>
+                <a:cs typeface="Times New Roman" panose="02020603050405020304" pitchFamily="18" charset="0"/>
+              </a:rPr>
+              <a:t>drop</a:t>
+            </a:r>
+            <a:endParaRPr lang="es-AR" sz="1050" dirty="0">
+              <a:effectLst/>
+              <a:ea typeface="Times New Roman" panose="02020603050405020304" pitchFamily="18" charset="0"/>
+              <a:cs typeface="Times New Roman" panose="02020603050405020304" pitchFamily="18" charset="0"/>
+            </a:endParaRPr>
+          </a:p>
+        </p:txBody>
+      </p:sp>
+      <p:sp>
+        <p:nvSpPr>
+          <p:cNvPr id="24" name="Cuadro de texto 2"/>
+          <p:cNvSpPr txBox="1">
+            <a:spLocks noChangeArrowheads="1"/>
+          </p:cNvSpPr>
+          <p:nvPr/>
+        </p:nvSpPr>
+        <p:spPr bwMode="auto">
+          <a:xfrm>
+            <a:off x="1152301" y="4413419"/>
+            <a:ext cx="3270069" cy="440055"/>
+          </a:xfrm>
+          <a:prstGeom prst="rect">
+            <a:avLst/>
+          </a:prstGeom>
+          <a:noFill/>
+          <a:ln>
+            <a:noFill/>
+          </a:ln>
+        </p:spPr>
+        <p:style>
+          <a:lnRef idx="0">
+            <a:scrgbClr r="0" g="0" b="0"/>
+          </a:lnRef>
+          <a:fillRef idx="0">
+            <a:scrgbClr r="0" g="0" b="0"/>
+          </a:fillRef>
+          <a:effectRef idx="0">
+            <a:scrgbClr r="0" g="0" b="0"/>
+          </a:effectRef>
+          <a:fontRef idx="minor">
+            <a:schemeClr val="dk1"/>
+          </a:fontRef>
+        </p:style>
+        <p:txBody>
+          <a:bodyPr rot="0" vert="horz" wrap="square" lIns="91440" tIns="45720" rIns="91440" bIns="45720" anchor="t" anchorCtr="0">
+            <a:noAutofit/>
+          </a:bodyPr>
+          <a:lstStyle/>
+          <a:p>
+            <a:pPr algn="ctr">
+              <a:lnSpc>
+                <a:spcPct val="115000"/>
+              </a:lnSpc>
+              <a:spcAft>
+                <a:spcPts val="1000"/>
+              </a:spcAft>
+            </a:pPr>
+            <a:r>
+              <a:rPr lang="es-ES" sz="1050" dirty="0">
+                <a:effectLst/>
+                <a:ea typeface="Times New Roman" panose="02020603050405020304" pitchFamily="18" charset="0"/>
+                <a:cs typeface="Times New Roman" panose="02020603050405020304" pitchFamily="18" charset="0"/>
+              </a:rPr>
+              <a:t>Librería utilizada para la creación de los gráficos</a:t>
+            </a:r>
+            <a:endParaRPr lang="es-AR" sz="1050" dirty="0">
+              <a:effectLst/>
+              <a:ea typeface="Times New Roman" panose="02020603050405020304" pitchFamily="18" charset="0"/>
+              <a:cs typeface="Times New Roman" panose="02020603050405020304" pitchFamily="18" charset="0"/>
+            </a:endParaRPr>
+          </a:p>
+        </p:txBody>
+      </p:sp>
     </p:spTree>
     <p:extLst>
       <p:ext uri="{BB962C8B-B14F-4D97-AF65-F5344CB8AC3E}">
@@ -12009,13 +12631,13 @@
   <p:clrMapOvr>
     <a:masterClrMapping/>
   </p:clrMapOvr>
-  <mc:AlternateContent xmlns:mc="http://schemas.openxmlformats.org/markup-compatibility/2006">
-    <mc:Choice xmlns:p14="http://schemas.microsoft.com/office/powerpoint/2010/main" Requires="p14">
+  <mc:AlternateContent xmlns:mc="http://schemas.openxmlformats.org/markup-compatibility/2006" xmlns:p14="http://schemas.microsoft.com/office/powerpoint/2010/main">
+    <mc:Choice Requires="p14">
       <p:transition spd="slow" p14:dur="3900">
         <p14:glitter pattern="hexagon"/>
       </p:transition>
     </mc:Choice>
-    <mc:Fallback>
+    <mc:Fallback xmlns="">
       <p:transition spd="slow">
         <p:fade/>
       </p:transition>
@@ -12369,21 +12991,74 @@
                             </p:childTnLst>
                           </p:cTn>
                         </p:par>
+                      </p:childTnLst>
+                    </p:cTn>
+                  </p:par>
+                  <p:par>
+                    <p:cTn id="25" fill="hold">
+                      <p:stCondLst>
+                        <p:cond delay="indefinite"/>
+                      </p:stCondLst>
+                      <p:childTnLst>
                         <p:par>
-                          <p:cTn id="25" fill="hold">
+                          <p:cTn id="26" fill="hold">
                             <p:stCondLst>
-                              <p:cond delay="4000"/>
+                              <p:cond delay="0"/>
                             </p:stCondLst>
                             <p:childTnLst>
                               <p:par>
-                                <p:cTn id="26" presetID="35" presetClass="entr" presetSubtype="0" fill="hold" nodeType="afterEffect">
+                                <p:cTn id="27" presetID="9" presetClass="entr" presetSubtype="0" fill="hold" grpId="0" nodeType="clickEffect">
                                   <p:stCondLst>
                                     <p:cond delay="0"/>
                                   </p:stCondLst>
                                   <p:childTnLst>
                                     <p:set>
                                       <p:cBhvr>
-                                        <p:cTn id="27" dur="1" fill="hold">
+                                        <p:cTn id="28" dur="1" fill="hold">
+                                          <p:stCondLst>
+                                            <p:cond delay="0"/>
+                                          </p:stCondLst>
+                                        </p:cTn>
+                                        <p:tgtEl>
+                                          <p:spTgt spid="18"/>
+                                        </p:tgtEl>
+                                        <p:attrNameLst>
+                                          <p:attrName>style.visibility</p:attrName>
+                                        </p:attrNameLst>
+                                      </p:cBhvr>
+                                      <p:to>
+                                        <p:strVal val="visible"/>
+                                      </p:to>
+                                    </p:set>
+                                    <p:animEffect transition="in" filter="dissolve">
+                                      <p:cBhvr>
+                                        <p:cTn id="29" dur="500"/>
+                                        <p:tgtEl>
+                                          <p:spTgt spid="18"/>
+                                        </p:tgtEl>
+                                      </p:cBhvr>
+                                    </p:animEffect>
+                                  </p:childTnLst>
+                                </p:cTn>
+                              </p:par>
+                            </p:childTnLst>
+                          </p:cTn>
+                        </p:par>
+                        <p:par>
+                          <p:cTn id="30" fill="hold">
+                            <p:stCondLst>
+                              <p:cond delay="500"/>
+                            </p:stCondLst>
+                            <p:childTnLst>
+                              <p:par>
+                                <p:cTn id="31" presetID="35" presetClass="entr" presetSubtype="0" fill="hold" nodeType="afterEffect">
+                                  <p:stCondLst>
+                                    <p:cond delay="0"/>
+                                  </p:stCondLst>
+                                  <p:childTnLst>
+                                    <p:set>
+                                      <p:cBhvr>
+                                        <p:cTn id="32" dur="1" fill="hold">
                                           <p:stCondLst>
                                             <p:cond delay="0"/>
                                           </p:stCondLst>
@@ -12401,7 +13076,7 @@
                                     </p:set>
                                     <p:animEffect transition="in" filter="fade">
                                       <p:cBhvr>
-                                        <p:cTn id="28" dur="2000"/>
+                                        <p:cTn id="33" dur="2000"/>
                                         <p:tgtEl>
                                           <p:spTgt spid="8"/>
                                         </p:tgtEl>
@@ -12409,7 +13084,7 @@
                                     </p:animEffect>
                                     <p:anim calcmode="lin" valueType="num">
                                       <p:cBhvr>
-                                        <p:cTn id="29" dur="2000" fill="hold"/>
+                                        <p:cTn id="34" dur="2000" fill="hold"/>
                                         <p:tgtEl>
                                           <p:spTgt spid="8"/>
                                         </p:tgtEl>
@@ -12432,7 +13107,7 @@
                                     </p:anim>
                                     <p:anim calcmode="lin" valueType="num">
                                       <p:cBhvr>
-                                        <p:cTn id="30" dur="2000" fill="hold"/>
+                                        <p:cTn id="35" dur="2000" fill="hold"/>
                                         <p:tgtEl>
                                           <p:spTgt spid="8"/>
                                         </p:tgtEl>
@@ -12455,7 +13130,7 @@
                                     </p:anim>
                                     <p:anim calcmode="lin" valueType="num">
                                       <p:cBhvr>
-                                        <p:cTn id="31" dur="2000" fill="hold"/>
+                                        <p:cTn id="36" dur="2000" fill="hold"/>
                                         <p:tgtEl>
                                           <p:spTgt spid="8"/>
                                         </p:tgtEl>
@@ -12482,21 +13157,74 @@
                             </p:childTnLst>
                           </p:cTn>
                         </p:par>
+                      </p:childTnLst>
+                    </p:cTn>
+                  </p:par>
+                  <p:par>
+                    <p:cTn id="37" fill="hold">
+                      <p:stCondLst>
+                        <p:cond delay="indefinite"/>
+                      </p:stCondLst>
+                      <p:childTnLst>
                         <p:par>
-                          <p:cTn id="32" fill="hold">
+                          <p:cTn id="38" fill="hold">
                             <p:stCondLst>
-                              <p:cond delay="6000"/>
+                              <p:cond delay="0"/>
                             </p:stCondLst>
                             <p:childTnLst>
                               <p:par>
-                                <p:cTn id="33" presetID="42" presetClass="entr" presetSubtype="0" fill="hold" nodeType="afterEffect">
+                                <p:cTn id="39" presetID="9" presetClass="entr" presetSubtype="0" fill="hold" grpId="0" nodeType="clickEffect">
                                   <p:stCondLst>
                                     <p:cond delay="0"/>
                                   </p:stCondLst>
                                   <p:childTnLst>
                                     <p:set>
                                       <p:cBhvr>
-                                        <p:cTn id="34" dur="1" fill="hold">
+                                        <p:cTn id="40" dur="1" fill="hold">
+                                          <p:stCondLst>
+                                            <p:cond delay="0"/>
+                                          </p:stCondLst>
+                                        </p:cTn>
+                                        <p:tgtEl>
+                                          <p:spTgt spid="14"/>
+                                        </p:tgtEl>
+                                        <p:attrNameLst>
+                                          <p:attrName>style.visibility</p:attrName>
+                                        </p:attrNameLst>
+                                      </p:cBhvr>
+                                      <p:to>
+                                        <p:strVal val="visible"/>
+                                      </p:to>
+                                    </p:set>
+                                    <p:animEffect transition="in" filter="dissolve">
+                                      <p:cBhvr>
+                                        <p:cTn id="41" dur="500"/>
+                                        <p:tgtEl>
+                                          <p:spTgt spid="14"/>
+                                        </p:tgtEl>
+                                      </p:cBhvr>
+                                    </p:animEffect>
+                                  </p:childTnLst>
+                                </p:cTn>
+                              </p:par>
+                            </p:childTnLst>
+                          </p:cTn>
+                        </p:par>
+                        <p:par>
+                          <p:cTn id="42" fill="hold">
+                            <p:stCondLst>
+                              <p:cond delay="500"/>
+                            </p:stCondLst>
+                            <p:childTnLst>
+                              <p:par>
+                                <p:cTn id="43" presetID="42" presetClass="entr" presetSubtype="0" fill="hold" nodeType="afterEffect">
+                                  <p:stCondLst>
+                                    <p:cond delay="0"/>
+                                  </p:stCondLst>
+                                  <p:childTnLst>
+                                    <p:set>
+                                      <p:cBhvr>
+                                        <p:cTn id="44" dur="1" fill="hold">
                                           <p:stCondLst>
                                             <p:cond delay="0"/>
                                           </p:stCondLst>
@@ -12514,7 +13242,7 @@
                                     </p:set>
                                     <p:animEffect transition="in" filter="fade">
                                       <p:cBhvr>
-                                        <p:cTn id="35" dur="1000"/>
+                                        <p:cTn id="45" dur="1000"/>
                                         <p:tgtEl>
                                           <p:spTgt spid="12"/>
                                         </p:tgtEl>
@@ -12522,7 +13250,7 @@
                                     </p:animEffect>
                                     <p:anim calcmode="lin" valueType="num">
                                       <p:cBhvr>
-                                        <p:cTn id="36" dur="1000" fill="hold"/>
+                                        <p:cTn id="46" dur="1000" fill="hold"/>
                                         <p:tgtEl>
                                           <p:spTgt spid="12"/>
                                         </p:tgtEl>
@@ -12545,7 +13273,7 @@
                                     </p:anim>
                                     <p:anim calcmode="lin" valueType="num">
                                       <p:cBhvr>
-                                        <p:cTn id="37" dur="1000" fill="hold"/>
+                                        <p:cTn id="47" dur="1000" fill="hold"/>
                                         <p:tgtEl>
                                           <p:spTgt spid="12"/>
                                         </p:tgtEl>
@@ -12572,21 +13300,74 @@
                             </p:childTnLst>
                           </p:cTn>
                         </p:par>
+                      </p:childTnLst>
+                    </p:cTn>
+                  </p:par>
+                  <p:par>
+                    <p:cTn id="48" fill="hold">
+                      <p:stCondLst>
+                        <p:cond delay="indefinite"/>
+                      </p:stCondLst>
+                      <p:childTnLst>
                         <p:par>
-                          <p:cTn id="38" fill="hold">
+                          <p:cTn id="49" fill="hold">
                             <p:stCondLst>
-                              <p:cond delay="7000"/>
+                              <p:cond delay="0"/>
                             </p:stCondLst>
                             <p:childTnLst>
                               <p:par>
-                                <p:cTn id="39" presetID="31" presetClass="entr" presetSubtype="0" fill="hold" nodeType="afterEffect">
+                                <p:cTn id="50" presetID="9" presetClass="entr" presetSubtype="0" fill="hold" grpId="0" nodeType="clickEffect">
                                   <p:stCondLst>
                                     <p:cond delay="0"/>
                                   </p:stCondLst>
                                   <p:childTnLst>
                                     <p:set>
                                       <p:cBhvr>
-                                        <p:cTn id="40" dur="1" fill="hold">
+                                        <p:cTn id="51" dur="1" fill="hold">
+                                          <p:stCondLst>
+                                            <p:cond delay="0"/>
+                                          </p:stCondLst>
+                                        </p:cTn>
+                                        <p:tgtEl>
+                                          <p:spTgt spid="16"/>
+                                        </p:tgtEl>
+                                        <p:attrNameLst>
+                                          <p:attrName>style.visibility</p:attrName>
+                                        </p:attrNameLst>
+                                      </p:cBhvr>
+                                      <p:to>
+                                        <p:strVal val="visible"/>
+                                      </p:to>
+                                    </p:set>
+                                    <p:animEffect transition="in" filter="dissolve">
+                                      <p:cBhvr>
+                                        <p:cTn id="52" dur="500"/>
+                                        <p:tgtEl>
+                                          <p:spTgt spid="16"/>
+                                        </p:tgtEl>
+                                      </p:cBhvr>
+                                    </p:animEffect>
+                                  </p:childTnLst>
+                                </p:cTn>
+                              </p:par>
+                            </p:childTnLst>
+                          </p:cTn>
+                        </p:par>
+                        <p:par>
+                          <p:cTn id="53" fill="hold">
+                            <p:stCondLst>
+                              <p:cond delay="500"/>
+                            </p:stCondLst>
+                            <p:childTnLst>
+                              <p:par>
+                                <p:cTn id="54" presetID="31" presetClass="entr" presetSubtype="0" fill="hold" nodeType="afterEffect">
+                                  <p:stCondLst>
+                                    <p:cond delay="0"/>
+                                  </p:stCondLst>
+                                  <p:childTnLst>
+                                    <p:set>
+                                      <p:cBhvr>
+                                        <p:cTn id="55" dur="1" fill="hold">
                                           <p:stCondLst>
                                             <p:cond delay="0"/>
                                           </p:stCondLst>
@@ -12604,7 +13385,7 @@
                                     </p:set>
                                     <p:anim calcmode="lin" valueType="num">
                                       <p:cBhvr>
-                                        <p:cTn id="41" dur="1000" fill="hold"/>
+                                        <p:cTn id="56" dur="1000" fill="hold"/>
                                         <p:tgtEl>
                                           <p:spTgt spid="7"/>
                                         </p:tgtEl>
@@ -12627,7 +13408,7 @@
                                     </p:anim>
                                     <p:anim calcmode="lin" valueType="num">
                                       <p:cBhvr>
-                                        <p:cTn id="42" dur="1000" fill="hold"/>
+                                        <p:cTn id="57" dur="1000" fill="hold"/>
                                         <p:tgtEl>
                                           <p:spTgt spid="7"/>
                                         </p:tgtEl>
@@ -12650,7 +13431,7 @@
                                     </p:anim>
                                     <p:anim calcmode="lin" valueType="num">
                                       <p:cBhvr>
-                                        <p:cTn id="43" dur="1000" fill="hold"/>
+                                        <p:cTn id="58" dur="1000" fill="hold"/>
                                         <p:tgtEl>
                                           <p:spTgt spid="7"/>
                                         </p:tgtEl>
@@ -12673,9 +13454,62 @@
                                     </p:anim>
                                     <p:animEffect transition="in" filter="fade">
                                       <p:cBhvr>
-                                        <p:cTn id="44" dur="1000"/>
+                                        <p:cTn id="59" dur="1000"/>
                                         <p:tgtEl>
                                           <p:spTgt spid="7"/>
+                                        </p:tgtEl>
+                                      </p:cBhvr>
+                                    </p:animEffect>
+                                  </p:childTnLst>
+                                </p:cTn>
+                              </p:par>
+                            </p:childTnLst>
+                          </p:cTn>
+                        </p:par>
+                      </p:childTnLst>
+                    </p:cTn>
+                  </p:par>
+                  <p:par>
+                    <p:cTn id="60" fill="hold">
+                      <p:stCondLst>
+                        <p:cond delay="indefinite"/>
+                      </p:stCondLst>
+                      <p:childTnLst>
+                        <p:par>
+                          <p:cTn id="61" fill="hold">
+                            <p:stCondLst>
+                              <p:cond delay="0"/>
+                            </p:stCondLst>
+                            <p:childTnLst>
+                              <p:par>
+                                <p:cTn id="62" presetID="9" presetClass="entr" presetSubtype="0" fill="hold" grpId="0" nodeType="clickEffect">
+                                  <p:stCondLst>
+                                    <p:cond delay="0"/>
+                                  </p:stCondLst>
+                                  <p:childTnLst>
+                                    <p:set>
+                                      <p:cBhvr>
+                                        <p:cTn id="63" dur="1" fill="hold">
+                                          <p:stCondLst>
+                                            <p:cond delay="0"/>
+                                          </p:stCondLst>
+                                        </p:cTn>
+                                        <p:tgtEl>
+                                          <p:spTgt spid="19"/>
+                                        </p:tgtEl>
+                                        <p:attrNameLst>
+                                          <p:attrName>style.visibility</p:attrName>
+                                        </p:attrNameLst>
+                                      </p:cBhvr>
+                                      <p:to>
+                                        <p:strVal val="visible"/>
+                                      </p:to>
+                                    </p:set>
+                                    <p:animEffect transition="in" filter="dissolve">
+                                      <p:cBhvr>
+                                        <p:cTn id="64" dur="500"/>
+                                        <p:tgtEl>
+                                          <p:spTgt spid="19"/>
                                         </p:tgtEl>
                                       </p:cBhvr>
                                     </p:animEffect>
@@ -12686,20 +13520,20 @@
                           </p:cTn>
                         </p:par>
                         <p:par>
-                          <p:cTn id="45" fill="hold">
+                          <p:cTn id="65" fill="hold">
                             <p:stCondLst>
-                              <p:cond delay="8000"/>
+                              <p:cond delay="500"/>
                             </p:stCondLst>
                             <p:childTnLst>
                               <p:par>
-                                <p:cTn id="46" presetID="3" presetClass="entr" presetSubtype="10" fill="hold" nodeType="afterEffect">
+                                <p:cTn id="66" presetID="3" presetClass="entr" presetSubtype="10" fill="hold" nodeType="afterEffect">
                                   <p:stCondLst>
                                     <p:cond delay="0"/>
                                   </p:stCondLst>
                                   <p:childTnLst>
                                     <p:set>
                                       <p:cBhvr>
-                                        <p:cTn id="47" dur="1" fill="hold">
+                                        <p:cTn id="67" dur="1" fill="hold">
                                           <p:stCondLst>
                                             <p:cond delay="0"/>
                                           </p:stCondLst>
@@ -12717,9 +13551,62 @@
                                     </p:set>
                                     <p:animEffect transition="in" filter="blinds(horizontal)">
                                       <p:cBhvr>
-                                        <p:cTn id="48" dur="500"/>
+                                        <p:cTn id="68" dur="500"/>
                                         <p:tgtEl>
                                           <p:spTgt spid="11"/>
+                                        </p:tgtEl>
+                                      </p:cBhvr>
+                                    </p:animEffect>
+                                  </p:childTnLst>
+                                </p:cTn>
+                              </p:par>
+                            </p:childTnLst>
+                          </p:cTn>
+                        </p:par>
+                      </p:childTnLst>
+                    </p:cTn>
+                  </p:par>
+                  <p:par>
+                    <p:cTn id="69" fill="hold">
+                      <p:stCondLst>
+                        <p:cond delay="indefinite"/>
+                      </p:stCondLst>
+                      <p:childTnLst>
+                        <p:par>
+                          <p:cTn id="70" fill="hold">
+                            <p:stCondLst>
+                              <p:cond delay="0"/>
+                            </p:stCondLst>
+                            <p:childTnLst>
+                              <p:par>
+                                <p:cTn id="71" presetID="9" presetClass="entr" presetSubtype="0" fill="hold" grpId="0" nodeType="clickEffect">
+                                  <p:stCondLst>
+                                    <p:cond delay="0"/>
+                                  </p:stCondLst>
+                                  <p:childTnLst>
+                                    <p:set>
+                                      <p:cBhvr>
+                                        <p:cTn id="72" dur="1" fill="hold">
+                                          <p:stCondLst>
+                                            <p:cond delay="0"/>
+                                          </p:stCondLst>
+                                        </p:cTn>
+                                        <p:tgtEl>
+                                          <p:spTgt spid="21"/>
+                                        </p:tgtEl>
+                                        <p:attrNameLst>
+                                          <p:attrName>style.visibility</p:attrName>
+                                        </p:attrNameLst>
+                                      </p:cBhvr>
+                                      <p:to>
+                                        <p:strVal val="visible"/>
+                                      </p:to>
+                                    </p:set>
+                                    <p:animEffect transition="in" filter="dissolve">
+                                      <p:cBhvr>
+                                        <p:cTn id="73" dur="500"/>
+                                        <p:tgtEl>
+                                          <p:spTgt spid="21"/>
                                         </p:tgtEl>
                                       </p:cBhvr>
                                     </p:animEffect>
@@ -12730,20 +13617,20 @@
                           </p:cTn>
                         </p:par>
                         <p:par>
-                          <p:cTn id="49" fill="hold">
+                          <p:cTn id="74" fill="hold">
                             <p:stCondLst>
-                              <p:cond delay="8500"/>
+                              <p:cond delay="500"/>
                             </p:stCondLst>
                             <p:childTnLst>
                               <p:par>
-                                <p:cTn id="50" presetID="21" presetClass="entr" presetSubtype="1" fill="hold" nodeType="afterEffect">
+                                <p:cTn id="75" presetID="21" presetClass="entr" presetSubtype="1" fill="hold" nodeType="afterEffect">
                                   <p:stCondLst>
                                     <p:cond delay="0"/>
                                   </p:stCondLst>
                                   <p:childTnLst>
                                     <p:set>
                                       <p:cBhvr>
-                                        <p:cTn id="51" dur="1" fill="hold">
+                                        <p:cTn id="76" dur="1" fill="hold">
                                           <p:stCondLst>
                                             <p:cond delay="0"/>
                                           </p:stCondLst>
@@ -12761,9 +13648,62 @@
                                     </p:set>
                                     <p:animEffect transition="in" filter="wheel(1)">
                                       <p:cBhvr>
-                                        <p:cTn id="52" dur="2000"/>
+                                        <p:cTn id="77" dur="2000"/>
                                         <p:tgtEl>
                                           <p:spTgt spid="9"/>
+                                        </p:tgtEl>
+                                      </p:cBhvr>
+                                    </p:animEffect>
+                                  </p:childTnLst>
+                                </p:cTn>
+                              </p:par>
+                            </p:childTnLst>
+                          </p:cTn>
+                        </p:par>
+                      </p:childTnLst>
+                    </p:cTn>
+                  </p:par>
+                  <p:par>
+                    <p:cTn id="78" fill="hold">
+                      <p:stCondLst>
+                        <p:cond delay="indefinite"/>
+                      </p:stCondLst>
+                      <p:childTnLst>
+                        <p:par>
+                          <p:cTn id="79" fill="hold">
+                            <p:stCondLst>
+                              <p:cond delay="0"/>
+                            </p:stCondLst>
+                            <p:childTnLst>
+                              <p:par>
+                                <p:cTn id="80" presetID="9" presetClass="entr" presetSubtype="0" fill="hold" grpId="0" nodeType="clickEffect">
+                                  <p:stCondLst>
+                                    <p:cond delay="0"/>
+                                  </p:stCondLst>
+                                  <p:childTnLst>
+                                    <p:set>
+                                      <p:cBhvr>
+                                        <p:cTn id="81" dur="1" fill="hold">
+                                          <p:stCondLst>
+                                            <p:cond delay="0"/>
+                                          </p:stCondLst>
+                                        </p:cTn>
+                                        <p:tgtEl>
+                                          <p:spTgt spid="24"/>
+                                        </p:tgtEl>
+                                        <p:attrNameLst>
+                                          <p:attrName>style.visibility</p:attrName>
+                                        </p:attrNameLst>
+                                      </p:cBhvr>
+                                      <p:to>
+                                        <p:strVal val="visible"/>
+                                      </p:to>
+                                    </p:set>
+                                    <p:animEffect transition="in" filter="dissolve">
+                                      <p:cBhvr>
+                                        <p:cTn id="82" dur="500"/>
+                                        <p:tgtEl>
+                                          <p:spTgt spid="24"/>
                                         </p:tgtEl>
                                       </p:cBhvr>
                                     </p:animEffect>
@@ -12774,20 +13714,20 @@
                           </p:cTn>
                         </p:par>
                         <p:par>
-                          <p:cTn id="53" fill="hold">
+                          <p:cTn id="83" fill="hold">
                             <p:stCondLst>
-                              <p:cond delay="10500"/>
+                              <p:cond delay="500"/>
                             </p:stCondLst>
                             <p:childTnLst>
                               <p:par>
-                                <p:cTn id="54" presetID="30" presetClass="entr" presetSubtype="0" fill="hold" nodeType="afterEffect">
+                                <p:cTn id="84" presetID="30" presetClass="entr" presetSubtype="0" fill="hold" nodeType="afterEffect">
                                   <p:stCondLst>
                                     <p:cond delay="0"/>
                                   </p:stCondLst>
                                   <p:childTnLst>
                                     <p:set>
                                       <p:cBhvr>
-                                        <p:cTn id="55" dur="1" fill="hold">
+                                        <p:cTn id="85" dur="1" fill="hold">
                                           <p:stCondLst>
                                             <p:cond delay="0"/>
                                           </p:stCondLst>
@@ -12805,7 +13745,7 @@
                                     </p:set>
                                     <p:animEffect transition="in" filter="fade">
                                       <p:cBhvr>
-                                        <p:cTn id="56" dur="800" decel="100000"/>
+                                        <p:cTn id="86" dur="800" decel="100000"/>
                                         <p:tgtEl>
                                           <p:spTgt spid="5"/>
                                         </p:tgtEl>
@@ -12813,7 +13753,7 @@
                                     </p:animEffect>
                                     <p:anim calcmode="lin" valueType="num">
                                       <p:cBhvr>
-                                        <p:cTn id="57" dur="800" decel="100000" fill="hold"/>
+                                        <p:cTn id="87" dur="800" decel="100000" fill="hold"/>
                                         <p:tgtEl>
                                           <p:spTgt spid="5"/>
                                         </p:tgtEl>
@@ -12836,7 +13776,7 @@
                                     </p:anim>
                                     <p:anim calcmode="lin" valueType="num">
                                       <p:cBhvr>
-                                        <p:cTn id="58" dur="800" decel="100000" fill="hold"/>
+                                        <p:cTn id="88" dur="800" decel="100000" fill="hold"/>
                                         <p:tgtEl>
                                           <p:spTgt spid="5"/>
                                         </p:tgtEl>
@@ -12859,7 +13799,7 @@
                                     </p:anim>
                                     <p:anim calcmode="lin" valueType="num">
                                       <p:cBhvr>
-                                        <p:cTn id="59" dur="800" decel="100000" fill="hold"/>
+                                        <p:cTn id="89" dur="800" decel="100000" fill="hold"/>
                                         <p:tgtEl>
                                           <p:spTgt spid="5"/>
                                         </p:tgtEl>
@@ -12882,7 +13822,7 @@
                                     </p:anim>
                                     <p:anim calcmode="lin" valueType="num">
                                       <p:cBhvr>
-                                        <p:cTn id="60" dur="200" accel="100000" fill="hold">
+                                        <p:cTn id="90" dur="200" accel="100000" fill="hold">
                                           <p:stCondLst>
                                             <p:cond delay="800"/>
                                           </p:stCondLst>
@@ -12909,7 +13849,7 @@
                                     </p:anim>
                                     <p:anim calcmode="lin" valueType="num">
                                       <p:cBhvr>
-                                        <p:cTn id="61" dur="200" accel="100000" fill="hold">
+                                        <p:cTn id="91" dur="200" accel="100000" fill="hold">
                                           <p:stCondLst>
                                             <p:cond delay="800"/>
                                           </p:stCondLst>
@@ -12940,21 +13880,74 @@
                             </p:childTnLst>
                           </p:cTn>
                         </p:par>
+                      </p:childTnLst>
+                    </p:cTn>
+                  </p:par>
+                  <p:par>
+                    <p:cTn id="92" fill="hold">
+                      <p:stCondLst>
+                        <p:cond delay="indefinite"/>
+                      </p:stCondLst>
+                      <p:childTnLst>
                         <p:par>
-                          <p:cTn id="62" fill="hold">
+                          <p:cTn id="93" fill="hold">
                             <p:stCondLst>
-                              <p:cond delay="11500"/>
+                              <p:cond delay="0"/>
                             </p:stCondLst>
                             <p:childTnLst>
                               <p:par>
-                                <p:cTn id="63" presetID="45" presetClass="entr" presetSubtype="0" fill="hold" nodeType="afterEffect">
+                                <p:cTn id="94" presetID="9" presetClass="entr" presetSubtype="0" fill="hold" grpId="0" nodeType="clickEffect">
                                   <p:stCondLst>
                                     <p:cond delay="0"/>
                                   </p:stCondLst>
                                   <p:childTnLst>
                                     <p:set>
                                       <p:cBhvr>
-                                        <p:cTn id="64" dur="1" fill="hold">
+                                        <p:cTn id="95" dur="1" fill="hold">
+                                          <p:stCondLst>
+                                            <p:cond delay="0"/>
+                                          </p:stCondLst>
+                                        </p:cTn>
+                                        <p:tgtEl>
+                                          <p:spTgt spid="13"/>
+                                        </p:tgtEl>
+                                        <p:attrNameLst>
+                                          <p:attrName>style.visibility</p:attrName>
+                                        </p:attrNameLst>
+                                      </p:cBhvr>
+                                      <p:to>
+                                        <p:strVal val="visible"/>
+                                      </p:to>
+                                    </p:set>
+                                    <p:animEffect transition="in" filter="dissolve">
+                                      <p:cBhvr>
+                                        <p:cTn id="96" dur="500"/>
+                                        <p:tgtEl>
+                                          <p:spTgt spid="13"/>
+                                        </p:tgtEl>
+                                      </p:cBhvr>
+                                    </p:animEffect>
+                                  </p:childTnLst>
+                                </p:cTn>
+                              </p:par>
+                            </p:childTnLst>
+                          </p:cTn>
+                        </p:par>
+                        <p:par>
+                          <p:cTn id="97" fill="hold">
+                            <p:stCondLst>
+                              <p:cond delay="500"/>
+                            </p:stCondLst>
+                            <p:childTnLst>
+                              <p:par>
+                                <p:cTn id="98" presetID="45" presetClass="entr" presetSubtype="0" fill="hold" nodeType="afterEffect">
+                                  <p:stCondLst>
+                                    <p:cond delay="0"/>
+                                  </p:stCondLst>
+                                  <p:childTnLst>
+                                    <p:set>
+                                      <p:cBhvr>
+                                        <p:cTn id="99" dur="1" fill="hold">
                                           <p:stCondLst>
                                             <p:cond delay="0"/>
                                           </p:stCondLst>
@@ -12972,7 +13965,7 @@
                                     </p:set>
                                     <p:animEffect transition="in" filter="fade">
                                       <p:cBhvr>
-                                        <p:cTn id="65" dur="2000"/>
+                                        <p:cTn id="100" dur="2000"/>
                                         <p:tgtEl>
                                           <p:spTgt spid="10"/>
                                         </p:tgtEl>
@@ -12980,7 +13973,7 @@
                                     </p:animEffect>
                                     <p:anim calcmode="lin" valueType="num">
                                       <p:cBhvr>
-                                        <p:cTn id="66" dur="2000" fill="hold"/>
+                                        <p:cTn id="101" dur="2000" fill="hold"/>
                                         <p:tgtEl>
                                           <p:spTgt spid="10"/>
                                         </p:tgtEl>
@@ -13003,7 +13996,7 @@
                                     </p:anim>
                                     <p:anim calcmode="lin" valueType="num">
                                       <p:cBhvr>
-                                        <p:cTn id="67" dur="2000" fill="hold"/>
+                                        <p:cTn id="102" dur="2000" fill="hold"/>
                                         <p:tgtEl>
                                           <p:spTgt spid="10"/>
                                         </p:tgtEl>
@@ -13030,27 +14023,36 @@
                             </p:childTnLst>
                           </p:cTn>
                         </p:par>
+                      </p:childTnLst>
+                    </p:cTn>
+                  </p:par>
+                  <p:par>
+                    <p:cTn id="103" fill="hold">
+                      <p:stCondLst>
+                        <p:cond delay="indefinite"/>
+                      </p:stCondLst>
+                      <p:childTnLst>
                         <p:par>
-                          <p:cTn id="68" fill="hold">
+                          <p:cTn id="104" fill="hold">
                             <p:stCondLst>
-                              <p:cond delay="13500"/>
+                              <p:cond delay="0"/>
                             </p:stCondLst>
                             <p:childTnLst>
                               <p:par>
-                                <p:cTn id="69" presetID="9" presetClass="entr" presetSubtype="0" fill="hold" nodeType="afterEffect">
+                                <p:cTn id="105" presetID="9" presetClass="entr" presetSubtype="0" fill="hold" grpId="0" nodeType="clickEffect">
                                   <p:stCondLst>
                                     <p:cond delay="0"/>
                                   </p:stCondLst>
                                   <p:childTnLst>
                                     <p:set>
                                       <p:cBhvr>
-                                        <p:cTn id="70" dur="1" fill="hold">
+                                        <p:cTn id="106" dur="1" fill="hold">
                                           <p:stCondLst>
                                             <p:cond delay="0"/>
                                           </p:stCondLst>
                                         </p:cTn>
                                         <p:tgtEl>
-                                          <p:spTgt spid="4"/>
+                                          <p:spTgt spid="20"/>
                                         </p:tgtEl>
                                         <p:attrNameLst>
                                           <p:attrName>style.visibility</p:attrName>
@@ -13062,9 +14064,106 @@
                                     </p:set>
                                     <p:animEffect transition="in" filter="dissolve">
                                       <p:cBhvr>
-                                        <p:cTn id="71" dur="500"/>
+                                        <p:cTn id="107" dur="500"/>
+                                        <p:tgtEl>
+                                          <p:spTgt spid="20"/>
+                                        </p:tgtEl>
+                                      </p:cBhvr>
+                                    </p:animEffect>
+                                  </p:childTnLst>
+                                </p:cTn>
+                              </p:par>
+                            </p:childTnLst>
+                          </p:cTn>
+                        </p:par>
+                        <p:par>
+                          <p:cTn id="108" fill="hold">
+                            <p:stCondLst>
+                              <p:cond delay="500"/>
+                            </p:stCondLst>
+                            <p:childTnLst>
+                              <p:par>
+                                <p:cTn id="109" presetID="9" presetClass="entr" presetSubtype="0" fill="hold" nodeType="afterEffect">
+                                  <p:stCondLst>
+                                    <p:cond delay="0"/>
+                                  </p:stCondLst>
+                                  <p:childTnLst>
+                                    <p:set>
+                                      <p:cBhvr>
+                                        <p:cTn id="110" dur="1" fill="hold">
+                                          <p:stCondLst>
+                                            <p:cond delay="0"/>
+                                          </p:stCondLst>
+                                        </p:cTn>
                                         <p:tgtEl>
                                           <p:spTgt spid="4"/>
+                                        </p:tgtEl>
+                                        <p:attrNameLst>
+                                          <p:attrName>style.visibility</p:attrName>
+                                        </p:attrNameLst>
+                                      </p:cBhvr>
+                                      <p:to>
+                                        <p:strVal val="visible"/>
+                                      </p:to>
+                                    </p:set>
+                                    <p:animEffect transition="in" filter="dissolve">
+                                      <p:cBhvr>
+                                        <p:cTn id="111" dur="500"/>
+                                        <p:tgtEl>
+                                          <p:spTgt spid="4"/>
+                                        </p:tgtEl>
+                                      </p:cBhvr>
+                                    </p:animEffect>
+                                  </p:childTnLst>
+                                </p:cTn>
+                              </p:par>
+                            </p:childTnLst>
+                          </p:cTn>
+                        </p:par>
+                      </p:childTnLst>
+                    </p:cTn>
+                  </p:par>
+                  <p:par>
+                    <p:cTn id="112" fill="hold">
+                      <p:stCondLst>
+                        <p:cond delay="indefinite"/>
+                      </p:stCondLst>
+                      <p:childTnLst>
+                        <p:par>
+                          <p:cTn id="113" fill="hold">
+                            <p:stCondLst>
+                              <p:cond delay="0"/>
+                            </p:stCondLst>
+                            <p:childTnLst>
+                              <p:par>
+                                <p:cTn id="114" presetID="9" presetClass="entr" presetSubtype="0" fill="hold" grpId="0" nodeType="clickEffect">
+                                  <p:stCondLst>
+                                    <p:cond delay="0"/>
+                                  </p:stCondLst>
+                                  <p:childTnLst>
+                                    <p:set>
+                                      <p:cBhvr>
+                                        <p:cTn id="115" dur="1" fill="hold">
+                                          <p:stCondLst>
+                                            <p:cond delay="0"/>
+                                          </p:stCondLst>
+                                        </p:cTn>
+                                        <p:tgtEl>
+                                          <p:spTgt spid="22"/>
+                                        </p:tgtEl>
+                                        <p:attrNameLst>
+                                          <p:attrName>style.visibility</p:attrName>
+                                        </p:attrNameLst>
+                                      </p:cBhvr>
+                                      <p:to>
+                                        <p:strVal val="visible"/>
+                                      </p:to>
+                                    </p:set>
+                                    <p:animEffect transition="in" filter="dissolve">
+                                      <p:cBhvr>
+                                        <p:cTn id="116" dur="500"/>
+                                        <p:tgtEl>
+                                          <p:spTgt spid="22"/>
                                         </p:tgtEl>
                                       </p:cBhvr>
                                     </p:animEffect>
@@ -13100,6 +14199,15 @@
     </p:tnLst>
     <p:bldLst>
       <p:bldP spid="2" grpId="0"/>
+      <p:bldP spid="13" grpId="0"/>
+      <p:bldP spid="14" grpId="0"/>
+      <p:bldP spid="16" grpId="0"/>
+      <p:bldP spid="18" grpId="0"/>
+      <p:bldP spid="19" grpId="0"/>
+      <p:bldP spid="20" grpId="0"/>
+      <p:bldP spid="21" grpId="0"/>
+      <p:bldP spid="22" grpId="0"/>
+      <p:bldP spid="24" grpId="0"/>
     </p:bldLst>
   </p:timing>
 </p:sld>
@@ -13369,13 +14477,13 @@
   <p:clrMapOvr>
     <a:masterClrMapping/>
   </p:clrMapOvr>
-  <mc:AlternateContent xmlns:mc="http://schemas.openxmlformats.org/markup-compatibility/2006">
-    <mc:Choice xmlns:p14="http://schemas.microsoft.com/office/powerpoint/2010/main" Requires="p14">
+  <mc:AlternateContent xmlns:mc="http://schemas.openxmlformats.org/markup-compatibility/2006" xmlns:p14="http://schemas.microsoft.com/office/powerpoint/2010/main">
+    <mc:Choice Requires="p14">
       <p:transition spd="slow" p14:dur="1400">
         <p14:ripple/>
       </p:transition>
     </mc:Choice>
-    <mc:Fallback>
+    <mc:Fallback xmlns="">
       <p:transition spd="slow">
         <p:fade/>
       </p:transition>

</xml_diff>

<commit_message>
modificaciones powere y sistema
</commit_message>
<xml_diff>
--- a/Documentacion/PresentaciónProyectoFinal.pptx
+++ b/Documentacion/PresentaciónProyectoFinal.pptx
@@ -163,7 +163,7 @@
           </a:lstStyle>
           <a:p>
             <a:r>
-              <a:rPr lang="es-ES" smtClean="0"/>
+              <a:rPr lang="es-ES"/>
               <a:t>Haga clic para modificar el estilo de título del patrón</a:t>
             </a:r>
             <a:endParaRPr lang="en-US" dirty="0"/>
@@ -283,7 +283,7 @@
           </a:lstStyle>
           <a:p>
             <a:r>
-              <a:rPr lang="es-ES" smtClean="0"/>
+              <a:rPr lang="es-ES"/>
               <a:t>Haga clic para editar el estilo de subtítulo del patrón</a:t>
             </a:r>
             <a:endParaRPr lang="en-US" dirty="0"/>
@@ -496,7 +496,7 @@
           </a:lstStyle>
           <a:p>
             <a:r>
-              <a:rPr lang="es-ES" smtClean="0"/>
+              <a:rPr lang="es-ES"/>
               <a:t>Haga clic para modificar el estilo de título del patrón</a:t>
             </a:r>
             <a:endParaRPr lang="en-US" dirty="0"/>
@@ -619,7 +619,7 @@
           <a:p>
             <a:pPr lvl="0"/>
             <a:r>
-              <a:rPr lang="es-ES" smtClean="0"/>
+              <a:rPr lang="es-ES"/>
               <a:t>Editar el estilo de texto del patrón</a:t>
             </a:r>
           </a:p>
@@ -831,7 +831,7 @@
           </a:lstStyle>
           <a:p>
             <a:r>
-              <a:rPr lang="es-ES" smtClean="0"/>
+              <a:rPr lang="es-ES"/>
               <a:t>Haga clic para modificar el estilo de título del patrón</a:t>
             </a:r>
             <a:endParaRPr lang="en-US" dirty="0"/>
@@ -895,7 +895,7 @@
           <a:p>
             <a:pPr lvl="0"/>
             <a:r>
-              <a:rPr lang="es-ES" smtClean="0"/>
+              <a:rPr lang="es-ES"/>
               <a:t>Editar el estilo de texto del patrón</a:t>
             </a:r>
           </a:p>
@@ -1017,7 +1017,7 @@
           <a:p>
             <a:pPr lvl="0"/>
             <a:r>
-              <a:rPr lang="es-ES" smtClean="0"/>
+              <a:rPr lang="es-ES"/>
               <a:t>Editar el estilo de texto del patrón</a:t>
             </a:r>
           </a:p>
@@ -1305,7 +1305,7 @@
           </a:lstStyle>
           <a:p>
             <a:r>
-              <a:rPr lang="es-ES" smtClean="0"/>
+              <a:rPr lang="es-ES"/>
               <a:t>Haga clic para modificar el estilo de título del patrón</a:t>
             </a:r>
             <a:endParaRPr lang="en-US" dirty="0"/>
@@ -1350,7 +1350,7 @@
               <a:buNone/>
             </a:pPr>
             <a:r>
-              <a:rPr lang="es-ES" smtClean="0"/>
+              <a:rPr lang="es-ES"/>
               <a:t>Editar el estilo de texto del patrón</a:t>
             </a:r>
           </a:p>
@@ -1562,7 +1562,7 @@
           </a:lstStyle>
           <a:p>
             <a:r>
-              <a:rPr lang="es-ES" smtClean="0"/>
+              <a:rPr lang="es-ES"/>
               <a:t>Haga clic para modificar el estilo de título del patrón</a:t>
             </a:r>
             <a:endParaRPr lang="en-US" dirty="0"/>
@@ -1623,7 +1623,7 @@
           <a:p>
             <a:pPr lvl="0"/>
             <a:r>
-              <a:rPr lang="es-ES" smtClean="0"/>
+              <a:rPr lang="es-ES"/>
               <a:t>Editar el estilo de texto del patrón</a:t>
             </a:r>
           </a:p>
@@ -1667,7 +1667,7 @@
               <a:buNone/>
             </a:pPr>
             <a:r>
-              <a:rPr lang="es-ES" smtClean="0"/>
+              <a:rPr lang="es-ES"/>
               <a:t>Editar el estilo de texto del patrón</a:t>
             </a:r>
           </a:p>
@@ -1955,7 +1955,7 @@
           </a:lstStyle>
           <a:p>
             <a:r>
-              <a:rPr lang="es-ES" smtClean="0"/>
+              <a:rPr lang="es-ES"/>
               <a:t>Haga clic para modificar el estilo de título del patrón</a:t>
             </a:r>
             <a:endParaRPr lang="en-US" dirty="0"/>
@@ -2016,7 +2016,7 @@
           <a:p>
             <a:pPr lvl="0"/>
             <a:r>
-              <a:rPr lang="es-ES" smtClean="0"/>
+              <a:rPr lang="es-ES"/>
               <a:t>Editar el estilo de texto del patrón</a:t>
             </a:r>
           </a:p>
@@ -2060,7 +2060,7 @@
               <a:buNone/>
             </a:pPr>
             <a:r>
-              <a:rPr lang="es-ES" smtClean="0"/>
+              <a:rPr lang="es-ES"/>
               <a:t>Editar el estilo de texto del patrón</a:t>
             </a:r>
           </a:p>
@@ -2261,7 +2261,7 @@
           <a:lstStyle/>
           <a:p>
             <a:r>
-              <a:rPr lang="es-ES" smtClean="0"/>
+              <a:rPr lang="es-ES"/>
               <a:t>Haga clic para modificar el estilo de título del patrón</a:t>
             </a:r>
             <a:endParaRPr lang="en-US" dirty="0"/>
@@ -2285,35 +2285,35 @@
           <a:p>
             <a:pPr lvl="0"/>
             <a:r>
-              <a:rPr lang="es-ES" smtClean="0"/>
+              <a:rPr lang="es-ES"/>
               <a:t>Editar el estilo de texto del patrón</a:t>
             </a:r>
           </a:p>
           <a:p>
             <a:pPr lvl="1"/>
             <a:r>
-              <a:rPr lang="es-ES" smtClean="0"/>
+              <a:rPr lang="es-ES"/>
               <a:t>Segundo nivel</a:t>
             </a:r>
           </a:p>
           <a:p>
             <a:pPr lvl="2"/>
             <a:r>
-              <a:rPr lang="es-ES" smtClean="0"/>
+              <a:rPr lang="es-ES"/>
               <a:t>Tercer nivel</a:t>
             </a:r>
           </a:p>
           <a:p>
             <a:pPr lvl="3"/>
             <a:r>
-              <a:rPr lang="es-ES" smtClean="0"/>
+              <a:rPr lang="es-ES"/>
               <a:t>Cuarto nivel</a:t>
             </a:r>
           </a:p>
           <a:p>
             <a:pPr lvl="4"/>
             <a:r>
-              <a:rPr lang="es-ES" smtClean="0"/>
+              <a:rPr lang="es-ES"/>
               <a:t>Quinto nivel</a:t>
             </a:r>
             <a:endParaRPr lang="en-US" dirty="0"/>
@@ -2515,7 +2515,7 @@
           <a:lstStyle/>
           <a:p>
             <a:r>
-              <a:rPr lang="es-ES" smtClean="0"/>
+              <a:rPr lang="es-ES"/>
               <a:t>Haga clic para modificar el estilo de título del patrón</a:t>
             </a:r>
             <a:endParaRPr lang="en-US" dirty="0"/>
@@ -2544,35 +2544,35 @@
           <a:p>
             <a:pPr lvl="0"/>
             <a:r>
-              <a:rPr lang="es-ES" smtClean="0"/>
+              <a:rPr lang="es-ES"/>
               <a:t>Editar el estilo de texto del patrón</a:t>
             </a:r>
           </a:p>
           <a:p>
             <a:pPr lvl="1"/>
             <a:r>
-              <a:rPr lang="es-ES" smtClean="0"/>
+              <a:rPr lang="es-ES"/>
               <a:t>Segundo nivel</a:t>
             </a:r>
           </a:p>
           <a:p>
             <a:pPr lvl="2"/>
             <a:r>
-              <a:rPr lang="es-ES" smtClean="0"/>
+              <a:rPr lang="es-ES"/>
               <a:t>Tercer nivel</a:t>
             </a:r>
           </a:p>
           <a:p>
             <a:pPr lvl="3"/>
             <a:r>
-              <a:rPr lang="es-ES" smtClean="0"/>
+              <a:rPr lang="es-ES"/>
               <a:t>Cuarto nivel</a:t>
             </a:r>
           </a:p>
           <a:p>
             <a:pPr lvl="4"/>
             <a:r>
-              <a:rPr lang="es-ES" smtClean="0"/>
+              <a:rPr lang="es-ES"/>
               <a:t>Quinto nivel</a:t>
             </a:r>
             <a:endParaRPr lang="en-US" dirty="0"/>
@@ -2774,7 +2774,7 @@
           <a:lstStyle/>
           <a:p>
             <a:r>
-              <a:rPr lang="es-ES" smtClean="0"/>
+              <a:rPr lang="es-ES"/>
               <a:t>Haga clic para modificar el estilo de título del patrón</a:t>
             </a:r>
             <a:endParaRPr lang="en-US" dirty="0"/>
@@ -2803,35 +2803,35 @@
           <a:p>
             <a:pPr lvl="0"/>
             <a:r>
-              <a:rPr lang="es-ES" smtClean="0"/>
+              <a:rPr lang="es-ES"/>
               <a:t>Editar el estilo de texto del patrón</a:t>
             </a:r>
           </a:p>
           <a:p>
             <a:pPr lvl="1"/>
             <a:r>
-              <a:rPr lang="es-ES" smtClean="0"/>
+              <a:rPr lang="es-ES"/>
               <a:t>Segundo nivel</a:t>
             </a:r>
           </a:p>
           <a:p>
             <a:pPr lvl="2"/>
             <a:r>
-              <a:rPr lang="es-ES" smtClean="0"/>
+              <a:rPr lang="es-ES"/>
               <a:t>Tercer nivel</a:t>
             </a:r>
           </a:p>
           <a:p>
             <a:pPr lvl="3"/>
             <a:r>
-              <a:rPr lang="es-ES" smtClean="0"/>
+              <a:rPr lang="es-ES"/>
               <a:t>Cuarto nivel</a:t>
             </a:r>
           </a:p>
           <a:p>
             <a:pPr lvl="4"/>
             <a:r>
-              <a:rPr lang="es-ES" smtClean="0"/>
+              <a:rPr lang="es-ES"/>
               <a:t>Quinto nivel</a:t>
             </a:r>
             <a:endParaRPr lang="en-US" dirty="0"/>
@@ -3037,7 +3037,7 @@
           </a:lstStyle>
           <a:p>
             <a:r>
-              <a:rPr lang="es-ES" smtClean="0"/>
+              <a:rPr lang="es-ES"/>
               <a:t>Haga clic para modificar el estilo de título del patrón</a:t>
             </a:r>
             <a:endParaRPr lang="en-US" dirty="0"/>
@@ -3158,7 +3158,7 @@
           <a:p>
             <a:pPr lvl="0"/>
             <a:r>
-              <a:rPr lang="es-ES" smtClean="0"/>
+              <a:rPr lang="es-ES"/>
               <a:t>Editar el estilo de texto del patrón</a:t>
             </a:r>
           </a:p>
@@ -3359,7 +3359,7 @@
           <a:lstStyle/>
           <a:p>
             <a:r>
-              <a:rPr lang="es-ES" smtClean="0"/>
+              <a:rPr lang="es-ES"/>
               <a:t>Haga clic para modificar el estilo de título del patrón</a:t>
             </a:r>
             <a:endParaRPr lang="en-US" dirty="0"/>
@@ -3390,35 +3390,35 @@
           <a:p>
             <a:pPr lvl="0"/>
             <a:r>
-              <a:rPr lang="es-ES" smtClean="0"/>
+              <a:rPr lang="es-ES"/>
               <a:t>Editar el estilo de texto del patrón</a:t>
             </a:r>
           </a:p>
           <a:p>
             <a:pPr lvl="1"/>
             <a:r>
-              <a:rPr lang="es-ES" smtClean="0"/>
+              <a:rPr lang="es-ES"/>
               <a:t>Segundo nivel</a:t>
             </a:r>
           </a:p>
           <a:p>
             <a:pPr lvl="2"/>
             <a:r>
-              <a:rPr lang="es-ES" smtClean="0"/>
+              <a:rPr lang="es-ES"/>
               <a:t>Tercer nivel</a:t>
             </a:r>
           </a:p>
           <a:p>
             <a:pPr lvl="3"/>
             <a:r>
-              <a:rPr lang="es-ES" smtClean="0"/>
+              <a:rPr lang="es-ES"/>
               <a:t>Cuarto nivel</a:t>
             </a:r>
           </a:p>
           <a:p>
             <a:pPr lvl="4"/>
             <a:r>
-              <a:rPr lang="es-ES" smtClean="0"/>
+              <a:rPr lang="es-ES"/>
               <a:t>Quinto nivel</a:t>
             </a:r>
             <a:endParaRPr lang="en-US" dirty="0"/>
@@ -3449,35 +3449,35 @@
           <a:p>
             <a:pPr lvl="0"/>
             <a:r>
-              <a:rPr lang="es-ES" smtClean="0"/>
+              <a:rPr lang="es-ES"/>
               <a:t>Editar el estilo de texto del patrón</a:t>
             </a:r>
           </a:p>
           <a:p>
             <a:pPr lvl="1"/>
             <a:r>
-              <a:rPr lang="es-ES" smtClean="0"/>
+              <a:rPr lang="es-ES"/>
               <a:t>Segundo nivel</a:t>
             </a:r>
           </a:p>
           <a:p>
             <a:pPr lvl="2"/>
             <a:r>
-              <a:rPr lang="es-ES" smtClean="0"/>
+              <a:rPr lang="es-ES"/>
               <a:t>Tercer nivel</a:t>
             </a:r>
           </a:p>
           <a:p>
             <a:pPr lvl="3"/>
             <a:r>
-              <a:rPr lang="es-ES" smtClean="0"/>
+              <a:rPr lang="es-ES"/>
               <a:t>Cuarto nivel</a:t>
             </a:r>
           </a:p>
           <a:p>
             <a:pPr lvl="4"/>
             <a:r>
-              <a:rPr lang="es-ES" smtClean="0"/>
+              <a:rPr lang="es-ES"/>
               <a:t>Quinto nivel</a:t>
             </a:r>
             <a:endParaRPr lang="en-US" dirty="0"/>
@@ -3679,7 +3679,7 @@
           <a:lstStyle/>
           <a:p>
             <a:r>
-              <a:rPr lang="es-ES" smtClean="0"/>
+              <a:rPr lang="es-ES"/>
               <a:t>Haga clic para modificar el estilo de título del patrón</a:t>
             </a:r>
             <a:endParaRPr lang="en-US" dirty="0"/>
@@ -3747,7 +3747,7 @@
           <a:p>
             <a:pPr lvl="0"/>
             <a:r>
-              <a:rPr lang="es-ES" smtClean="0"/>
+              <a:rPr lang="es-ES"/>
               <a:t>Editar el estilo de texto del patrón</a:t>
             </a:r>
           </a:p>
@@ -3777,35 +3777,35 @@
           <a:p>
             <a:pPr lvl="0"/>
             <a:r>
-              <a:rPr lang="es-ES" smtClean="0"/>
+              <a:rPr lang="es-ES"/>
               <a:t>Editar el estilo de texto del patrón</a:t>
             </a:r>
           </a:p>
           <a:p>
             <a:pPr lvl="1"/>
             <a:r>
-              <a:rPr lang="es-ES" smtClean="0"/>
+              <a:rPr lang="es-ES"/>
               <a:t>Segundo nivel</a:t>
             </a:r>
           </a:p>
           <a:p>
             <a:pPr lvl="2"/>
             <a:r>
-              <a:rPr lang="es-ES" smtClean="0"/>
+              <a:rPr lang="es-ES"/>
               <a:t>Tercer nivel</a:t>
             </a:r>
           </a:p>
           <a:p>
             <a:pPr lvl="3"/>
             <a:r>
-              <a:rPr lang="es-ES" smtClean="0"/>
+              <a:rPr lang="es-ES"/>
               <a:t>Cuarto nivel</a:t>
             </a:r>
           </a:p>
           <a:p>
             <a:pPr lvl="4"/>
             <a:r>
-              <a:rPr lang="es-ES" smtClean="0"/>
+              <a:rPr lang="es-ES"/>
               <a:t>Quinto nivel</a:t>
             </a:r>
             <a:endParaRPr lang="en-US" dirty="0"/>
@@ -3873,7 +3873,7 @@
           <a:p>
             <a:pPr lvl="0"/>
             <a:r>
-              <a:rPr lang="es-ES" smtClean="0"/>
+              <a:rPr lang="es-ES"/>
               <a:t>Editar el estilo de texto del patrón</a:t>
             </a:r>
           </a:p>
@@ -3903,35 +3903,35 @@
           <a:p>
             <a:pPr lvl="0"/>
             <a:r>
-              <a:rPr lang="es-ES" smtClean="0"/>
+              <a:rPr lang="es-ES"/>
               <a:t>Editar el estilo de texto del patrón</a:t>
             </a:r>
           </a:p>
           <a:p>
             <a:pPr lvl="1"/>
             <a:r>
-              <a:rPr lang="es-ES" smtClean="0"/>
+              <a:rPr lang="es-ES"/>
               <a:t>Segundo nivel</a:t>
             </a:r>
           </a:p>
           <a:p>
             <a:pPr lvl="2"/>
             <a:r>
-              <a:rPr lang="es-ES" smtClean="0"/>
+              <a:rPr lang="es-ES"/>
               <a:t>Tercer nivel</a:t>
             </a:r>
           </a:p>
           <a:p>
             <a:pPr lvl="3"/>
             <a:r>
-              <a:rPr lang="es-ES" smtClean="0"/>
+              <a:rPr lang="es-ES"/>
               <a:t>Cuarto nivel</a:t>
             </a:r>
           </a:p>
           <a:p>
             <a:pPr lvl="4"/>
             <a:r>
-              <a:rPr lang="es-ES" smtClean="0"/>
+              <a:rPr lang="es-ES"/>
               <a:t>Quinto nivel</a:t>
             </a:r>
             <a:endParaRPr lang="en-US" dirty="0"/>
@@ -4133,7 +4133,7 @@
           <a:lstStyle/>
           <a:p>
             <a:r>
-              <a:rPr lang="es-ES" smtClean="0"/>
+              <a:rPr lang="es-ES"/>
               <a:t>Haga clic para modificar el estilo de título del patrón</a:t>
             </a:r>
             <a:endParaRPr lang="en-US" dirty="0"/>
@@ -4513,7 +4513,7 @@
           </a:lstStyle>
           <a:p>
             <a:r>
-              <a:rPr lang="es-ES" smtClean="0"/>
+              <a:rPr lang="es-ES"/>
               <a:t>Haga clic para modificar el estilo de título del patrón</a:t>
             </a:r>
             <a:endParaRPr lang="en-US" dirty="0"/>
@@ -4544,35 +4544,35 @@
           <a:p>
             <a:pPr lvl="0"/>
             <a:r>
-              <a:rPr lang="es-ES" smtClean="0"/>
+              <a:rPr lang="es-ES"/>
               <a:t>Editar el estilo de texto del patrón</a:t>
             </a:r>
           </a:p>
           <a:p>
             <a:pPr lvl="1"/>
             <a:r>
-              <a:rPr lang="es-ES" smtClean="0"/>
+              <a:rPr lang="es-ES"/>
               <a:t>Segundo nivel</a:t>
             </a:r>
           </a:p>
           <a:p>
             <a:pPr lvl="2"/>
             <a:r>
-              <a:rPr lang="es-ES" smtClean="0"/>
+              <a:rPr lang="es-ES"/>
               <a:t>Tercer nivel</a:t>
             </a:r>
           </a:p>
           <a:p>
             <a:pPr lvl="3"/>
             <a:r>
-              <a:rPr lang="es-ES" smtClean="0"/>
+              <a:rPr lang="es-ES"/>
               <a:t>Cuarto nivel</a:t>
             </a:r>
           </a:p>
           <a:p>
             <a:pPr lvl="4"/>
             <a:r>
-              <a:rPr lang="es-ES" smtClean="0"/>
+              <a:rPr lang="es-ES"/>
               <a:t>Quinto nivel</a:t>
             </a:r>
             <a:endParaRPr lang="en-US" dirty="0"/>
@@ -4638,7 +4638,7 @@
           <a:p>
             <a:pPr lvl="0"/>
             <a:r>
-              <a:rPr lang="es-ES" smtClean="0"/>
+              <a:rPr lang="es-ES"/>
               <a:t>Editar el estilo de texto del patrón</a:t>
             </a:r>
           </a:p>
@@ -4845,7 +4845,7 @@
           </a:lstStyle>
           <a:p>
             <a:r>
-              <a:rPr lang="es-ES" smtClean="0"/>
+              <a:rPr lang="es-ES"/>
               <a:t>Haga clic para modificar el estilo de título del patrón</a:t>
             </a:r>
             <a:endParaRPr lang="en-US" dirty="0"/>
@@ -4912,7 +4912,7 @@
           </a:lstStyle>
           <a:p>
             <a:r>
-              <a:rPr lang="es-ES" dirty="0" smtClean="0"/>
+              <a:rPr lang="es-ES" dirty="0"/>
               <a:t>Haga clic en el icono para agregar una imagen</a:t>
             </a:r>
             <a:endParaRPr lang="en-US" dirty="0"/>
@@ -4980,7 +4980,7 @@
           <a:p>
             <a:pPr lvl="0"/>
             <a:r>
-              <a:rPr lang="es-ES" smtClean="0"/>
+              <a:rPr lang="es-ES"/>
               <a:t>Editar el estilo de texto del patrón</a:t>
             </a:r>
           </a:p>
@@ -7013,7 +7013,7 @@
           <a:lstStyle/>
           <a:p>
             <a:r>
-              <a:rPr lang="es-ES" smtClean="0"/>
+              <a:rPr lang="es-ES"/>
               <a:t>Haga clic para modificar el estilo de título del patrón</a:t>
             </a:r>
             <a:endParaRPr lang="en-US" dirty="0"/>
@@ -7047,35 +7047,35 @@
           <a:p>
             <a:pPr lvl="0"/>
             <a:r>
-              <a:rPr lang="es-ES" smtClean="0"/>
+              <a:rPr lang="es-ES"/>
               <a:t>Editar el estilo de texto del patrón</a:t>
             </a:r>
           </a:p>
           <a:p>
             <a:pPr lvl="1"/>
             <a:r>
-              <a:rPr lang="es-ES" smtClean="0"/>
+              <a:rPr lang="es-ES"/>
               <a:t>Segundo nivel</a:t>
             </a:r>
           </a:p>
           <a:p>
             <a:pPr lvl="2"/>
             <a:r>
-              <a:rPr lang="es-ES" smtClean="0"/>
+              <a:rPr lang="es-ES"/>
               <a:t>Tercer nivel</a:t>
             </a:r>
           </a:p>
           <a:p>
             <a:pPr lvl="3"/>
             <a:r>
-              <a:rPr lang="es-ES" smtClean="0"/>
+              <a:rPr lang="es-ES"/>
               <a:t>Cuarto nivel</a:t>
             </a:r>
           </a:p>
           <a:p>
             <a:pPr lvl="4"/>
             <a:r>
-              <a:rPr lang="es-ES" smtClean="0"/>
+              <a:rPr lang="es-ES"/>
               <a:t>Quinto nivel</a:t>
             </a:r>
             <a:endParaRPr lang="en-US" dirty="0"/>
@@ -7654,19 +7654,19 @@
           <a:lstStyle/>
           <a:p>
             <a:r>
-              <a:rPr lang="es-ES" dirty="0" smtClean="0"/>
+              <a:rPr lang="es-ES" dirty="0"/>
               <a:t>Instancia Evaluativa : Integradora</a:t>
             </a:r>
           </a:p>
           <a:p>
             <a:r>
-              <a:rPr lang="es-ES" dirty="0" smtClean="0"/>
+              <a:rPr lang="es-ES" dirty="0"/>
               <a:t>Alumno : Iscovich Marcos</a:t>
             </a:r>
           </a:p>
           <a:p>
             <a:r>
-              <a:rPr lang="es-ES" dirty="0" smtClean="0"/>
+              <a:rPr lang="es-ES" dirty="0"/>
               <a:t>Proyecto: Sistema de gestión para turnos y clientes en peluquería</a:t>
             </a:r>
             <a:endParaRPr lang="es-AR" dirty="0"/>
@@ -7725,13 +7725,6 @@
       </p:transition>
     </mc:Fallback>
   </mc:AlternateContent>
-  <p:timing>
-    <p:tnLst>
-      <p:par>
-        <p:cTn id="1" dur="indefinite" restart="never" nodeType="tmRoot"/>
-      </p:par>
-    </p:tnLst>
-  </p:timing>
 </p:sld>
 </file>
 
@@ -7771,10 +7764,6 @@
               <a:rPr lang="es-ES" b="1" dirty="0"/>
               <a:t>Análisis del Proyecto</a:t>
             </a:r>
-            <a:r>
-              <a:rPr lang="es-AR" b="1" dirty="0"/>
-              <a:t/>
-            </a:r>
             <a:br>
               <a:rPr lang="es-AR" b="1" dirty="0"/>
             </a:br>
@@ -7806,70 +7795,40 @@
           <a:p>
             <a:r>
               <a:rPr lang="es-ES" dirty="0"/>
-              <a:t>Proyecto inicia bajo la necesidad de una </a:t>
+              <a:t>La dueña de una peluquería solicita un sistema web para gestionar sus clientes y los turnos.</a:t>
             </a:r>
-            <a:r>
-              <a:rPr lang="es-ES" dirty="0" smtClean="0"/>
-              <a:t>allegada, </a:t>
-            </a:r>
+          </a:p>
+          <a:p>
             <a:r>
               <a:rPr lang="es-ES" dirty="0"/>
-              <a:t>que es dueña de una peluquería, ella me pide si se puede crear un sistema web para poder gestionar sus clientes y los turnos de los </a:t>
+              <a:t>La solución será un sistema web, donde podrá agendar todos sus clientes, cargar todos los turnos y ver una estadística de los mismos.</a:t>
             </a:r>
-            <a:r>
-              <a:rPr lang="es-ES" dirty="0" smtClean="0"/>
-              <a:t>mismos</a:t>
-            </a:r>
+            <a:endParaRPr lang="es-AR" dirty="0"/>
           </a:p>
           <a:p>
             <a:r>
               <a:rPr lang="es-ES" dirty="0"/>
-              <a:t>Como solución a esta necesidad le ofrezco crear un sistema web, donde podrá agendar todos sus clientes, cargar todos los turnos y ver una estadística de los </a:t>
+              <a:t>Objetivo del sistema: </a:t>
             </a:r>
-            <a:r>
-              <a:rPr lang="es-ES" dirty="0" smtClean="0"/>
-              <a:t>mismos.</a:t>
-            </a:r>
-            <a:endParaRPr lang="es-AR" dirty="0"/>
-          </a:p>
-          <a:p>
-            <a:r>
-              <a:rPr lang="es-ES" dirty="0" smtClean="0"/>
-              <a:t>Vemos el para que del sistema: </a:t>
-            </a:r>
-          </a:p>
-          <a:p>
-            <a:pPr lvl="8"/>
+          </a:p>
+          <a:p>
+            <a:pPr lvl="4"/>
             <a:r>
               <a:rPr lang="es-ES" dirty="0"/>
-              <a:t>Registrar todos los clientes y registrar los turnos por día</a:t>
+              <a:t>Registrar los clientes y los turnos del día.</a:t>
             </a:r>
-            <a:r>
-              <a:rPr lang="es-ES" dirty="0" smtClean="0"/>
-              <a:t>.</a:t>
-            </a:r>
-          </a:p>
-          <a:p>
-            <a:pPr lvl="8"/>
+          </a:p>
+          <a:p>
             <a:r>
               <a:rPr lang="es-ES" dirty="0"/>
-              <a:t>Tiempo estimado – 2 a 3 </a:t>
+              <a:t>Tiempo estimado de construcción : 2 a 3 meses.</a:t>
             </a:r>
-            <a:r>
-              <a:rPr lang="es-ES" dirty="0" smtClean="0"/>
-              <a:t>meses</a:t>
-            </a:r>
-          </a:p>
-          <a:p>
-            <a:r>
-              <a:rPr lang="es-ES" dirty="0" smtClean="0"/>
-              <a:t>Impacto del Sistema : </a:t>
-            </a:r>
+          </a:p>
+          <a:p>
             <a:r>
               <a:rPr lang="es-ES" dirty="0"/>
-              <a:t>Si todo es registrado, generara una organización en el ámbito laboral donde todos estén al tanto del flujo de trabajo diario y la posibilidad de obtener información a modo de estadística de días anteriores</a:t>
+              <a:t>Impacto del Sistema : Si todo es registrado, generará una organización en el ámbito laboral, permitiendo conocer el flujo de trabajo diario.</a:t>
             </a:r>
-            <a:endParaRPr lang="es-ES" dirty="0" smtClean="0"/>
           </a:p>
         </p:txBody>
       </p:sp>
@@ -8352,24 +8311,15 @@
                                   </p:childTnLst>
                                 </p:cTn>
                               </p:par>
-                            </p:childTnLst>
-                          </p:cTn>
-                        </p:par>
-                        <p:par>
-                          <p:cTn id="33" fill="hold">
-                            <p:stCondLst>
-                              <p:cond delay="3500"/>
-                            </p:stCondLst>
-                            <p:childTnLst>
                               <p:par>
-                                <p:cTn id="34" presetID="16" presetClass="entr" presetSubtype="21" fill="hold" grpId="0" nodeType="afterEffect">
+                                <p:cTn id="33" presetID="16" presetClass="entr" presetSubtype="21" fill="hold" grpId="0" nodeType="withEffect">
                                   <p:stCondLst>
                                     <p:cond delay="0"/>
                                   </p:stCondLst>
                                   <p:childTnLst>
                                     <p:set>
                                       <p:cBhvr>
-                                        <p:cTn id="35" dur="1" fill="hold">
+                                        <p:cTn id="34" dur="1" fill="hold">
                                           <p:stCondLst>
                                             <p:cond delay="0"/>
                                           </p:stCondLst>
@@ -8391,7 +8341,7 @@
                                     </p:set>
                                     <p:animEffect transition="in" filter="barn(inVertical)">
                                       <p:cBhvr>
-                                        <p:cTn id="36" dur="500"/>
+                                        <p:cTn id="35" dur="500"/>
                                         <p:tgtEl>
                                           <p:spTgt spid="3">
                                             <p:txEl>
@@ -8407,14 +8357,23 @@
                             </p:childTnLst>
                           </p:cTn>
                         </p:par>
+                      </p:childTnLst>
+                    </p:cTn>
+                  </p:par>
+                  <p:par>
+                    <p:cTn id="36" fill="hold">
+                      <p:stCondLst>
+                        <p:cond delay="indefinite"/>
+                      </p:stCondLst>
+                      <p:childTnLst>
                         <p:par>
                           <p:cTn id="37" fill="hold">
                             <p:stCondLst>
-                              <p:cond delay="4000"/>
+                              <p:cond delay="0"/>
                             </p:stCondLst>
                             <p:childTnLst>
                               <p:par>
-                                <p:cTn id="38" presetID="16" presetClass="entr" presetSubtype="21" fill="hold" grpId="0" nodeType="afterEffect">
+                                <p:cTn id="38" presetID="16" presetClass="entr" presetSubtype="21" fill="hold" grpId="0" nodeType="clickEffect">
                                   <p:stCondLst>
                                     <p:cond delay="0"/>
                                   </p:stCondLst>
@@ -8459,21 +8418,30 @@
                             </p:childTnLst>
                           </p:cTn>
                         </p:par>
+                      </p:childTnLst>
+                    </p:cTn>
+                  </p:par>
+                  <p:par>
+                    <p:cTn id="41" fill="hold">
+                      <p:stCondLst>
+                        <p:cond delay="indefinite"/>
+                      </p:stCondLst>
+                      <p:childTnLst>
                         <p:par>
-                          <p:cTn id="41" fill="hold">
+                          <p:cTn id="42" fill="hold">
                             <p:stCondLst>
-                              <p:cond delay="4500"/>
+                              <p:cond delay="0"/>
                             </p:stCondLst>
                             <p:childTnLst>
                               <p:par>
-                                <p:cTn id="42" presetID="16" presetClass="entr" presetSubtype="21" fill="hold" grpId="0" nodeType="afterEffect">
+                                <p:cTn id="43" presetID="16" presetClass="entr" presetSubtype="21" fill="hold" grpId="0" nodeType="clickEffect">
                                   <p:stCondLst>
                                     <p:cond delay="0"/>
                                   </p:stCondLst>
                                   <p:childTnLst>
                                     <p:set>
                                       <p:cBhvr>
-                                        <p:cTn id="43" dur="1" fill="hold">
+                                        <p:cTn id="44" dur="1" fill="hold">
                                           <p:stCondLst>
                                             <p:cond delay="0"/>
                                           </p:stCondLst>
@@ -8495,7 +8463,7 @@
                                     </p:set>
                                     <p:animEffect transition="in" filter="barn(inVertical)">
                                       <p:cBhvr>
-                                        <p:cTn id="44" dur="500"/>
+                                        <p:cTn id="45" dur="500"/>
                                         <p:tgtEl>
                                           <p:spTgt spid="3">
                                             <p:txEl>
@@ -8576,10 +8544,9 @@
           <a:lstStyle/>
           <a:p>
             <a:r>
-              <a:rPr lang="es-AR" dirty="0" smtClean="0"/>
+              <a:rPr lang="es-AR" dirty="0"/>
               <a:t>Descripción breve del sistema</a:t>
             </a:r>
-            <a:endParaRPr lang="es-AR" dirty="0"/>
           </a:p>
         </p:txBody>
       </p:sp>
@@ -8609,46 +8576,46 @@
               <a:buNone/>
             </a:pPr>
             <a:r>
-              <a:rPr lang="es-AR" dirty="0" smtClean="0"/>
+              <a:rPr lang="es-AR" dirty="0"/>
               <a:t>El sistema posee un panel de administrador en el cual podemos ver un barra lateral que nos muestra las diferentes funcionalidades, estas mismas son :</a:t>
             </a:r>
           </a:p>
           <a:p>
             <a:r>
-              <a:rPr lang="es-AR" dirty="0" smtClean="0"/>
+              <a:rPr lang="es-AR" dirty="0"/>
               <a:t>Servicios</a:t>
             </a:r>
           </a:p>
           <a:p>
             <a:pPr lvl="3"/>
             <a:r>
-              <a:rPr lang="es-AR" dirty="0" smtClean="0"/>
+              <a:rPr lang="es-AR" dirty="0"/>
               <a:t>Nuevo Servicio</a:t>
             </a:r>
           </a:p>
           <a:p>
             <a:r>
-              <a:rPr lang="es-AR" dirty="0" smtClean="0"/>
+              <a:rPr lang="es-AR" dirty="0"/>
               <a:t>Clientes</a:t>
             </a:r>
           </a:p>
           <a:p>
             <a:pPr lvl="3"/>
             <a:r>
-              <a:rPr lang="es-AR" dirty="0" smtClean="0"/>
+              <a:rPr lang="es-AR" dirty="0"/>
               <a:t>Agenda de Clientes</a:t>
             </a:r>
           </a:p>
           <a:p>
             <a:r>
-              <a:rPr lang="es-AR" dirty="0" smtClean="0"/>
+              <a:rPr lang="es-AR" dirty="0"/>
               <a:t>Turnos</a:t>
             </a:r>
           </a:p>
           <a:p>
             <a:pPr lvl="3"/>
             <a:r>
-              <a:rPr lang="es-AR" dirty="0" smtClean="0"/>
+              <a:rPr lang="es-AR" dirty="0"/>
               <a:t>Ver Turnos </a:t>
             </a:r>
           </a:p>
@@ -8657,7 +8624,7 @@
               <a:buNone/>
             </a:pPr>
             <a:r>
-              <a:rPr lang="es-AR" dirty="0" smtClean="0"/>
+              <a:rPr lang="es-AR" dirty="0"/>
               <a:t>En cada uno de ellos podemos crear, editar y eliminar los datos ingresados.</a:t>
             </a:r>
           </a:p>
@@ -8666,24 +8633,16 @@
               <a:buNone/>
             </a:pPr>
             <a:r>
-              <a:rPr lang="es-AR" dirty="0" smtClean="0"/>
-              <a:t>El apartado de los turnos tiene como destacado el sistema de </a:t>
+              <a:rPr lang="es-AR" dirty="0"/>
+              <a:t>El apartado de los turnos tiene como destacado el sistema de drag and </a:t>
             </a:r>
             <a:r>
-              <a:rPr lang="es-AR" dirty="0" err="1" smtClean="0"/>
-              <a:t>drag</a:t>
-            </a:r>
-            <a:r>
-              <a:rPr lang="es-AR" dirty="0" smtClean="0"/>
-              <a:t> and </a:t>
-            </a:r>
-            <a:r>
-              <a:rPr lang="es-AR" dirty="0" err="1" smtClean="0"/>
+              <a:rPr lang="es-AR" dirty="0" err="1"/>
               <a:t>drop</a:t>
             </a:r>
             <a:r>
-              <a:rPr lang="es-AR" dirty="0" smtClean="0"/>
-              <a:t> en el cual podemos arrastrar el turno y colocarlo en el lugar deseado, esto modificara el día y/o el horario</a:t>
+              <a:rPr lang="es-AR" dirty="0"/>
+              <a:t>, en el cual podemos arrastrar el turno y colocarlo en el lugar deseado, esto modificara el día y/o el horario</a:t>
             </a:r>
           </a:p>
           <a:p>
@@ -8691,7 +8650,7 @@
               <a:buNone/>
             </a:pPr>
             <a:r>
-              <a:rPr lang="es-AR" dirty="0" smtClean="0"/>
+              <a:rPr lang="es-AR" dirty="0"/>
               <a:t>Al seleccionar Pagina principal, nos muestra 2 gráficos en formato de área, donde podremos seleccionar un rango de fecha deseado.</a:t>
             </a:r>
           </a:p>
@@ -8700,10 +8659,9 @@
               <a:buNone/>
             </a:pPr>
             <a:r>
-              <a:rPr lang="es-AR" dirty="0" smtClean="0"/>
-              <a:t>Estos gráficos detallara la cantidad de turnos y ventas por día. Al igual que los totales de los mismos.</a:t>
+              <a:rPr lang="es-AR" dirty="0"/>
+              <a:t>Estos gráficos detallarán la cantidad de turnos y ventas por día. Al igual que los totales de los mismos.</a:t>
             </a:r>
-            <a:endParaRPr lang="es-AR" dirty="0"/>
           </a:p>
         </p:txBody>
       </p:sp>
@@ -9946,7 +9904,7 @@
           <a:lstStyle/>
           <a:p>
             <a:r>
-              <a:rPr lang="es-ES" dirty="0" smtClean="0"/>
+              <a:rPr lang="es-ES" dirty="0"/>
               <a:t>Funcionalidades</a:t>
             </a:r>
             <a:endParaRPr lang="es-AR" dirty="0"/>
@@ -9974,85 +9932,48 @@
           <a:lstStyle/>
           <a:p>
             <a:r>
-              <a:rPr lang="es-ES" dirty="0" smtClean="0"/>
-              <a:t>Gestión </a:t>
+              <a:rPr lang="es-ES" dirty="0"/>
+              <a:t>Gestión de Clientes (crea, edita, actualiza y borra)</a:t>
             </a:r>
-            <a:r>
-              <a:rPr lang="es-ES" dirty="0" smtClean="0"/>
-              <a:t>de Clientes (crea, edita, actualiza y borra)</a:t>
-            </a:r>
-          </a:p>
-          <a:p>
-            <a:r>
-              <a:rPr lang="es-ES" dirty="0" smtClean="0"/>
-              <a:t>Gestión</a:t>
-            </a:r>
-            <a:r>
-              <a:rPr lang="es-ES" dirty="0" smtClean="0"/>
-              <a:t> </a:t>
-            </a:r>
-            <a:r>
-              <a:rPr lang="es-ES" dirty="0" smtClean="0"/>
-              <a:t>de Servicios </a:t>
-            </a:r>
+          </a:p>
+          <a:p>
             <a:r>
               <a:rPr lang="es-ES" dirty="0"/>
-              <a:t>(crea, edita, actualiza y borra</a:t>
+              <a:t>Gestión de Servicios (crea, edita, actualiza y borra)</a:t>
             </a:r>
-            <a:r>
-              <a:rPr lang="es-ES" dirty="0" smtClean="0"/>
-              <a:t>)</a:t>
-            </a:r>
-          </a:p>
-          <a:p>
-            <a:r>
-              <a:rPr lang="es-ES" dirty="0" smtClean="0"/>
-              <a:t>Gestión</a:t>
-            </a:r>
-            <a:r>
-              <a:rPr lang="es-ES" dirty="0" smtClean="0"/>
-              <a:t> </a:t>
-            </a:r>
-            <a:r>
-              <a:rPr lang="es-ES" dirty="0" smtClean="0"/>
-              <a:t>de Turnos </a:t>
-            </a:r>
+          </a:p>
+          <a:p>
             <a:r>
               <a:rPr lang="es-ES" dirty="0"/>
-              <a:t>(crea, edita, actualiza y borra</a:t>
-            </a:r>
-            <a:r>
-              <a:rPr lang="es-ES" dirty="0" smtClean="0"/>
-              <a:t>)</a:t>
+              <a:t>Gestión de Turnos (crea, edita, actualiza y borra)</a:t>
             </a:r>
           </a:p>
           <a:p>
             <a:pPr lvl="2"/>
             <a:r>
-              <a:rPr lang="es-ES" dirty="0" smtClean="0"/>
+              <a:rPr lang="es-ES" dirty="0"/>
               <a:t>El método implementado para mostrar los turnos es de drag and drop esto quiere decir que con el mousse se puede arrastrar el turno y colocarlo en el horario y día deseado</a:t>
             </a:r>
           </a:p>
           <a:p>
             <a:pPr lvl="2"/>
             <a:r>
-              <a:rPr lang="es-ES" dirty="0" smtClean="0"/>
+              <a:rPr lang="es-ES" dirty="0"/>
               <a:t>Para editar el horario de un turno basta con agrandar el tamaño del turno y se modifica el tiempo de duración del turno</a:t>
             </a:r>
-            <a:endParaRPr lang="es-ES" dirty="0"/>
           </a:p>
           <a:p>
             <a:r>
-              <a:rPr lang="es-ES" dirty="0" smtClean="0"/>
+              <a:rPr lang="es-ES" dirty="0"/>
               <a:t>Visualización de los datos completos de cada cliente y la información de la cantidad de veces que asistió al local y que servicio se le realizo</a:t>
             </a:r>
           </a:p>
           <a:p>
-            <a:endParaRPr lang="es-ES" dirty="0" smtClean="0"/>
+            <a:endParaRPr lang="es-ES" dirty="0"/>
           </a:p>
           <a:p>
             <a:r>
-              <a:rPr lang="es-ES" dirty="0" smtClean="0"/>
+              <a:rPr lang="es-ES" dirty="0"/>
               <a:t>A modo estadísticas se pueden ver 2 gráficos en formato de área, los cuales muestran la cantidad de turnos por día, las ventas por día y los totales de ambos en un rango de fecha que el usuario elija</a:t>
             </a:r>
             <a:endParaRPr lang="es-AR" dirty="0"/>
@@ -10634,7 +10555,7 @@
           <a:lstStyle/>
           <a:p>
             <a:r>
-              <a:rPr lang="es-ES" dirty="0" smtClean="0"/>
+              <a:rPr lang="es-ES" dirty="0"/>
               <a:t>Diagrama de Entidad de Relaciones</a:t>
             </a:r>
             <a:endParaRPr lang="es-AR" dirty="0"/>
@@ -10833,13 +10754,8 @@
           <a:p>
             <a:r>
               <a:rPr lang="es-AR" dirty="0"/>
-              <a:t>Versiones del </a:t>
+              <a:t>Metodología Ágil</a:t>
             </a:r>
-            <a:r>
-              <a:rPr lang="es-AR" dirty="0" smtClean="0"/>
-              <a:t>sistema</a:t>
-            </a:r>
-            <a:endParaRPr lang="es-AR" dirty="0"/>
           </a:p>
         </p:txBody>
       </p:sp>
@@ -11738,10 +11654,9 @@
           <a:lstStyle/>
           <a:p>
             <a:r>
-              <a:rPr lang="es-AR" dirty="0" smtClean="0"/>
+              <a:rPr lang="es-AR" dirty="0"/>
               <a:t>Tecnologías Implementadas</a:t>
             </a:r>
-            <a:endParaRPr lang="es-AR" dirty="0"/>
           </a:p>
         </p:txBody>
       </p:sp>
@@ -12061,7 +11976,7 @@
               <a:defRPr/>
             </a:pPr>
             <a:r>
-              <a:rPr kumimoji="0" lang="es-AR" sz="1050" b="0" i="0" u="none" strike="noStrike" kern="0" cap="none" spc="0" normalizeH="0" baseline="0" noProof="0" dirty="0" smtClean="0">
+              <a:rPr kumimoji="0" lang="es-AR" sz="1050" b="0" i="0" u="none" strike="noStrike" kern="0" cap="none" spc="0" normalizeH="0" baseline="0" noProof="0" dirty="0">
                 <a:ln>
                   <a:noFill/>
                 </a:ln>
@@ -12077,20 +11992,6 @@
               </a:rPr>
               <a:t>Utilizado como lenguaje principal de programación</a:t>
             </a:r>
-            <a:endParaRPr kumimoji="0" lang="es-AR" sz="1050" b="0" i="0" u="none" strike="noStrike" kern="0" cap="none" spc="0" normalizeH="0" baseline="0" noProof="0" dirty="0">
-              <a:ln>
-                <a:noFill/>
-              </a:ln>
-              <a:solidFill>
-                <a:sysClr val="windowText" lastClr="000000"/>
-              </a:solidFill>
-              <a:effectLst/>
-              <a:uLnTx/>
-              <a:uFillTx/>
-              <a:latin typeface="Calibri" panose="020F0502020204030204"/>
-              <a:ea typeface="Times New Roman" panose="02020603050405020304" pitchFamily="18" charset="0"/>
-              <a:cs typeface="Times New Roman" panose="02020603050405020304" pitchFamily="18" charset="0"/>
-            </a:endParaRPr>
           </a:p>
         </p:txBody>
       </p:sp>
@@ -12269,21 +12170,8 @@
                 <a:ea typeface="Times New Roman" panose="02020603050405020304" pitchFamily="18" charset="0"/>
                 <a:cs typeface="Times New Roman" panose="02020603050405020304" pitchFamily="18" charset="0"/>
               </a:rPr>
-              <a:t>Librería utilizada para los </a:t>
+              <a:t>Librería utilizada para los componentes, estilos y animaciones</a:t>
             </a:r>
-            <a:r>
-              <a:rPr lang="es-AR" sz="1050" dirty="0" smtClean="0">
-                <a:effectLst/>
-                <a:ea typeface="Times New Roman" panose="02020603050405020304" pitchFamily="18" charset="0"/>
-                <a:cs typeface="Times New Roman" panose="02020603050405020304" pitchFamily="18" charset="0"/>
-              </a:rPr>
-              <a:t>componentes, estilos y animaciones</a:t>
-            </a:r>
-            <a:endParaRPr lang="es-AR" sz="1050" dirty="0">
-              <a:effectLst/>
-              <a:ea typeface="Times New Roman" panose="02020603050405020304" pitchFamily="18" charset="0"/>
-              <a:cs typeface="Times New Roman" panose="02020603050405020304" pitchFamily="18" charset="0"/>
-            </a:endParaRPr>
           </a:p>
         </p:txBody>
       </p:sp>
@@ -12517,7 +12405,7 @@
               </a:spcAft>
             </a:pPr>
             <a:r>
-              <a:rPr lang="es-AR" sz="1050" dirty="0" smtClean="0">
+              <a:rPr lang="es-AR" sz="1050" dirty="0">
                 <a:effectLst/>
                 <a:ea typeface="Times New Roman" panose="02020603050405020304" pitchFamily="18" charset="0"/>
                 <a:cs typeface="Times New Roman" panose="02020603050405020304" pitchFamily="18" charset="0"/>
@@ -12525,7 +12413,7 @@
               <a:t>Librería encargada de todo el calendario </a:t>
             </a:r>
             <a:r>
-              <a:rPr lang="es-AR" sz="1050" dirty="0" err="1" smtClean="0">
+              <a:rPr lang="es-AR" sz="1050" dirty="0" err="1">
                 <a:effectLst/>
                 <a:ea typeface="Times New Roman" panose="02020603050405020304" pitchFamily="18" charset="0"/>
                 <a:cs typeface="Times New Roman" panose="02020603050405020304" pitchFamily="18" charset="0"/>
@@ -12533,7 +12421,7 @@
               <a:t>drag</a:t>
             </a:r>
             <a:r>
-              <a:rPr lang="es-AR" sz="1050" dirty="0" smtClean="0">
+              <a:rPr lang="es-AR" sz="1050" dirty="0">
                 <a:effectLst/>
                 <a:ea typeface="Times New Roman" panose="02020603050405020304" pitchFamily="18" charset="0"/>
                 <a:cs typeface="Times New Roman" panose="02020603050405020304" pitchFamily="18" charset="0"/>
@@ -12541,7 +12429,7 @@
               <a:t> and </a:t>
             </a:r>
             <a:r>
-              <a:rPr lang="es-AR" sz="1050" dirty="0" err="1" smtClean="0">
+              <a:rPr lang="es-AR" sz="1050" dirty="0" err="1">
                 <a:effectLst/>
                 <a:ea typeface="Times New Roman" panose="02020603050405020304" pitchFamily="18" charset="0"/>
                 <a:cs typeface="Times New Roman" panose="02020603050405020304" pitchFamily="18" charset="0"/>

</xml_diff>

<commit_message>
modificaciones sistema y ppt
</commit_message>
<xml_diff>
--- a/Documentacion/PresentaciónProyectoFinal.pptx
+++ b/Documentacion/PresentaciónProyectoFinal.pptx
@@ -215,7 +215,7 @@
           <a:p>
             <a:fld id="{A5FC8FE6-AD67-4CA8-818C-2F6F50C4FE22}" type="datetimeFigureOut">
               <a:rPr lang="es-AR" smtClean="0"/>
-              <a:t>08/11/2022</a:t>
+              <a:t>24/11/2022</a:t>
             </a:fld>
             <a:endParaRPr lang="es-AR"/>
           </a:p>
@@ -279,35 +279,35 @@
           <a:p>
             <a:pPr lvl="0"/>
             <a:r>
-              <a:rPr lang="es-ES" smtClean="0"/>
+              <a:rPr lang="es-ES"/>
               <a:t>Editar el estilo de texto del patrón</a:t>
             </a:r>
           </a:p>
           <a:p>
             <a:pPr lvl="1"/>
             <a:r>
-              <a:rPr lang="es-ES" smtClean="0"/>
+              <a:rPr lang="es-ES"/>
               <a:t>Segundo nivel</a:t>
             </a:r>
           </a:p>
           <a:p>
             <a:pPr lvl="2"/>
             <a:r>
-              <a:rPr lang="es-ES" smtClean="0"/>
+              <a:rPr lang="es-ES"/>
               <a:t>Tercer nivel</a:t>
             </a:r>
           </a:p>
           <a:p>
             <a:pPr lvl="3"/>
             <a:r>
-              <a:rPr lang="es-ES" smtClean="0"/>
+              <a:rPr lang="es-ES"/>
               <a:t>Cuarto nivel</a:t>
             </a:r>
           </a:p>
           <a:p>
             <a:pPr lvl="4"/>
             <a:r>
-              <a:rPr lang="es-ES" smtClean="0"/>
+              <a:rPr lang="es-ES"/>
               <a:t>Quinto nivel</a:t>
             </a:r>
             <a:endParaRPr lang="es-AR"/>
@@ -672,7 +672,7 @@
             <a:fld id="{B61BEF0D-F0BB-DE4B-95CE-6DB70DBA9567}" type="datetimeFigureOut">
               <a:rPr lang="en-US" smtClean="0"/>
               <a:pPr/>
-              <a:t>11/8/2022</a:t>
+              <a:t>11/24/2022</a:t>
             </a:fld>
             <a:endParaRPr lang="en-US" dirty="0"/>
           </a:p>
@@ -1019,7 +1019,7 @@
             <a:fld id="{B61BEF0D-F0BB-DE4B-95CE-6DB70DBA9567}" type="datetimeFigureOut">
               <a:rPr lang="en-US" smtClean="0"/>
               <a:pPr/>
-              <a:t>11/8/2022</a:t>
+              <a:t>11/24/2022</a:t>
             </a:fld>
             <a:endParaRPr lang="en-US" dirty="0"/>
           </a:p>
@@ -1429,7 +1429,7 @@
             <a:fld id="{B61BEF0D-F0BB-DE4B-95CE-6DB70DBA9567}" type="datetimeFigureOut">
               <a:rPr lang="en-US" smtClean="0"/>
               <a:pPr/>
-              <a:t>11/8/2022</a:t>
+              <a:t>11/24/2022</a:t>
             </a:fld>
             <a:endParaRPr lang="en-US" dirty="0"/>
           </a:p>
@@ -1774,7 +1774,7 @@
             <a:fld id="{B61BEF0D-F0BB-DE4B-95CE-6DB70DBA9567}" type="datetimeFigureOut">
               <a:rPr lang="en-US" smtClean="0"/>
               <a:pPr/>
-              <a:t>11/8/2022</a:t>
+              <a:t>11/24/2022</a:t>
             </a:fld>
             <a:endParaRPr lang="en-US" dirty="0"/>
           </a:p>
@@ -2103,7 +2103,7 @@
             <a:fld id="{B61BEF0D-F0BB-DE4B-95CE-6DB70DBA9567}" type="datetimeFigureOut">
               <a:rPr lang="en-US" smtClean="0"/>
               <a:pPr/>
-              <a:t>11/8/2022</a:t>
+              <a:t>11/24/2022</a:t>
             </a:fld>
             <a:endParaRPr lang="en-US" dirty="0"/>
           </a:p>
@@ -2508,7 +2508,7 @@
             <a:fld id="{B61BEF0D-F0BB-DE4B-95CE-6DB70DBA9567}" type="datetimeFigureOut">
               <a:rPr lang="en-US" smtClean="0"/>
               <a:pPr/>
-              <a:t>11/8/2022</a:t>
+              <a:t>11/24/2022</a:t>
             </a:fld>
             <a:endParaRPr lang="en-US" dirty="0"/>
           </a:p>
@@ -2774,7 +2774,7 @@
             <a:fld id="{B61BEF0D-F0BB-DE4B-95CE-6DB70DBA9567}" type="datetimeFigureOut">
               <a:rPr lang="en-US" smtClean="0"/>
               <a:pPr/>
-              <a:t>11/8/2022</a:t>
+              <a:t>11/24/2022</a:t>
             </a:fld>
             <a:endParaRPr lang="en-US" dirty="0"/>
           </a:p>
@@ -3045,7 +3045,7 @@
             <a:fld id="{B61BEF0D-F0BB-DE4B-95CE-6DB70DBA9567}" type="datetimeFigureOut">
               <a:rPr lang="en-US" smtClean="0"/>
               <a:pPr/>
-              <a:t>11/8/2022</a:t>
+              <a:t>11/24/2022</a:t>
             </a:fld>
             <a:endParaRPr lang="en-US" dirty="0"/>
           </a:p>
@@ -3316,7 +3316,7 @@
             <a:fld id="{B61BEF0D-F0BB-DE4B-95CE-6DB70DBA9567}" type="datetimeFigureOut">
               <a:rPr lang="en-US" smtClean="0"/>
               <a:pPr/>
-              <a:t>11/8/2022</a:t>
+              <a:t>11/24/2022</a:t>
             </a:fld>
             <a:endParaRPr lang="en-US" dirty="0"/>
           </a:p>
@@ -3654,7 +3654,7 @@
             <a:fld id="{B61BEF0D-F0BB-DE4B-95CE-6DB70DBA9567}" type="datetimeFigureOut">
               <a:rPr lang="en-US" smtClean="0"/>
               <a:pPr/>
-              <a:t>11/8/2022</a:t>
+              <a:t>11/24/2022</a:t>
             </a:fld>
             <a:endParaRPr lang="en-US" dirty="0"/>
           </a:p>
@@ -3986,7 +3986,7 @@
             <a:fld id="{B61BEF0D-F0BB-DE4B-95CE-6DB70DBA9567}" type="datetimeFigureOut">
               <a:rPr lang="en-US" smtClean="0"/>
               <a:pPr/>
-              <a:t>11/8/2022</a:t>
+              <a:t>11/24/2022</a:t>
             </a:fld>
             <a:endParaRPr lang="en-US" dirty="0"/>
           </a:p>
@@ -4452,7 +4452,7 @@
             <a:fld id="{B61BEF0D-F0BB-DE4B-95CE-6DB70DBA9567}" type="datetimeFigureOut">
               <a:rPr lang="en-US" smtClean="0"/>
               <a:pPr/>
-              <a:t>11/8/2022</a:t>
+              <a:t>11/24/2022</a:t>
             </a:fld>
             <a:endParaRPr lang="en-US" dirty="0"/>
           </a:p>
@@ -4666,7 +4666,7 @@
             <a:fld id="{B61BEF0D-F0BB-DE4B-95CE-6DB70DBA9567}" type="datetimeFigureOut">
               <a:rPr lang="en-US" smtClean="0"/>
               <a:pPr/>
-              <a:t>11/8/2022</a:t>
+              <a:t>11/24/2022</a:t>
             </a:fld>
             <a:endParaRPr lang="en-US" dirty="0"/>
           </a:p>
@@ -4852,7 +4852,7 @@
             <a:fld id="{B61BEF0D-F0BB-DE4B-95CE-6DB70DBA9567}" type="datetimeFigureOut">
               <a:rPr lang="en-US" smtClean="0"/>
               <a:pPr/>
-              <a:t>11/8/2022</a:t>
+              <a:t>11/24/2022</a:t>
             </a:fld>
             <a:endParaRPr lang="en-US" dirty="0"/>
           </a:p>
@@ -5194,7 +5194,7 @@
             <a:fld id="{B61BEF0D-F0BB-DE4B-95CE-6DB70DBA9567}" type="datetimeFigureOut">
               <a:rPr lang="en-US" smtClean="0"/>
               <a:pPr/>
-              <a:t>11/8/2022</a:t>
+              <a:t>11/24/2022</a:t>
             </a:fld>
             <a:endParaRPr lang="en-US" dirty="0"/>
           </a:p>
@@ -5548,7 +5548,7 @@
             <a:fld id="{B61BEF0D-F0BB-DE4B-95CE-6DB70DBA9567}" type="datetimeFigureOut">
               <a:rPr lang="en-US" smtClean="0"/>
               <a:pPr/>
-              <a:t>11/8/2022</a:t>
+              <a:t>11/24/2022</a:t>
             </a:fld>
             <a:endParaRPr lang="en-US" dirty="0"/>
           </a:p>
@@ -7674,7 +7674,7 @@
             <a:fld id="{B61BEF0D-F0BB-DE4B-95CE-6DB70DBA9567}" type="datetimeFigureOut">
               <a:rPr lang="en-US" smtClean="0"/>
               <a:pPr/>
-              <a:t>11/8/2022</a:t>
+              <a:t>11/24/2022</a:t>
             </a:fld>
             <a:endParaRPr lang="en-US" dirty="0"/>
           </a:p>
@@ -8293,13 +8293,6 @@
       </p:transition>
     </mc:Fallback>
   </mc:AlternateContent>
-  <p:timing>
-    <p:tnLst>
-      <p:par>
-        <p:cTn id="1" dur="indefinite" restart="never" nodeType="tmRoot"/>
-      </p:par>
-    </p:tnLst>
-  </p:timing>
 </p:sld>
 </file>
 
@@ -8339,10 +8332,6 @@
               <a:rPr lang="es-ES" b="1" dirty="0"/>
               <a:t>Análisis del Proyecto</a:t>
             </a:r>
-            <a:r>
-              <a:rPr lang="es-AR" b="1" dirty="0"/>
-              <a:t/>
-            </a:r>
             <a:br>
               <a:rPr lang="es-AR" b="1" dirty="0"/>
             </a:br>
@@ -8378,35 +8367,21 @@
             </a:r>
           </a:p>
           <a:p>
+            <a:endParaRPr lang="es-ES" dirty="0"/>
+          </a:p>
+          <a:p>
             <a:r>
               <a:rPr lang="es-ES" dirty="0"/>
               <a:t>La solución será un sistema web, donde podrá agendar todos sus clientes, cargar todos los turnos y ver una estadística de los mismos.</a:t>
             </a:r>
+          </a:p>
+          <a:p>
             <a:endParaRPr lang="es-AR" dirty="0"/>
           </a:p>
           <a:p>
             <a:r>
               <a:rPr lang="es-ES" dirty="0"/>
-              <a:t>Objetivo del sistema: </a:t>
-            </a:r>
-          </a:p>
-          <a:p>
-            <a:pPr lvl="4"/>
-            <a:r>
-              <a:rPr lang="es-ES" dirty="0"/>
-              <a:t>Registrar los clientes y los turnos del día.</a:t>
-            </a:r>
-          </a:p>
-          <a:p>
-            <a:r>
-              <a:rPr lang="es-ES" dirty="0"/>
-              <a:t>Tiempo estimado de construcción : 2 a 3 meses.</a:t>
-            </a:r>
-          </a:p>
-          <a:p>
-            <a:r>
-              <a:rPr lang="es-ES" dirty="0"/>
-              <a:t>Impacto del Sistema : Si todo es registrado, generará una organización en el ámbito laboral, permitiendo conocer el flujo de trabajo diario.</a:t>
+              <a:t>Tiempo estimado de construcción : 2 meses.</a:t>
             </a:r>
           </a:p>
         </p:txBody>
@@ -8858,7 +8833,7 @@
                                         <p:tgtEl>
                                           <p:spTgt spid="3">
                                             <p:txEl>
-                                              <p:pRg st="1" end="1"/>
+                                              <p:pRg st="2" end="2"/>
                                             </p:txEl>
                                           </p:spTgt>
                                         </p:tgtEl>
@@ -8876,102 +8851,7 @@
                                         <p:tgtEl>
                                           <p:spTgt spid="3">
                                             <p:txEl>
-                                              <p:pRg st="1" end="1"/>
-                                            </p:txEl>
-                                          </p:spTgt>
-                                        </p:tgtEl>
-                                      </p:cBhvr>
-                                    </p:animEffect>
-                                  </p:childTnLst>
-                                </p:cTn>
-                              </p:par>
-                            </p:childTnLst>
-                          </p:cTn>
-                        </p:par>
-                        <p:par>
-                          <p:cTn id="29" fill="hold">
-                            <p:stCondLst>
-                              <p:cond delay="3000"/>
-                            </p:stCondLst>
-                            <p:childTnLst>
-                              <p:par>
-                                <p:cTn id="30" presetID="16" presetClass="entr" presetSubtype="21" fill="hold" grpId="0" nodeType="afterEffect">
-                                  <p:stCondLst>
-                                    <p:cond delay="0"/>
-                                  </p:stCondLst>
-                                  <p:childTnLst>
-                                    <p:set>
-                                      <p:cBhvr>
-                                        <p:cTn id="31" dur="1" fill="hold">
-                                          <p:stCondLst>
-                                            <p:cond delay="0"/>
-                                          </p:stCondLst>
-                                        </p:cTn>
-                                        <p:tgtEl>
-                                          <p:spTgt spid="3">
-                                            <p:txEl>
                                               <p:pRg st="2" end="2"/>
-                                            </p:txEl>
-                                          </p:spTgt>
-                                        </p:tgtEl>
-                                        <p:attrNameLst>
-                                          <p:attrName>style.visibility</p:attrName>
-                                        </p:attrNameLst>
-                                      </p:cBhvr>
-                                      <p:to>
-                                        <p:strVal val="visible"/>
-                                      </p:to>
-                                    </p:set>
-                                    <p:animEffect transition="in" filter="barn(inVertical)">
-                                      <p:cBhvr>
-                                        <p:cTn id="32" dur="500"/>
-                                        <p:tgtEl>
-                                          <p:spTgt spid="3">
-                                            <p:txEl>
-                                              <p:pRg st="2" end="2"/>
-                                            </p:txEl>
-                                          </p:spTgt>
-                                        </p:tgtEl>
-                                      </p:cBhvr>
-                                    </p:animEffect>
-                                  </p:childTnLst>
-                                </p:cTn>
-                              </p:par>
-                              <p:par>
-                                <p:cTn id="33" presetID="16" presetClass="entr" presetSubtype="21" fill="hold" grpId="0" nodeType="withEffect">
-                                  <p:stCondLst>
-                                    <p:cond delay="0"/>
-                                  </p:stCondLst>
-                                  <p:childTnLst>
-                                    <p:set>
-                                      <p:cBhvr>
-                                        <p:cTn id="34" dur="1" fill="hold">
-                                          <p:stCondLst>
-                                            <p:cond delay="0"/>
-                                          </p:stCondLst>
-                                        </p:cTn>
-                                        <p:tgtEl>
-                                          <p:spTgt spid="3">
-                                            <p:txEl>
-                                              <p:pRg st="3" end="3"/>
-                                            </p:txEl>
-                                          </p:spTgt>
-                                        </p:tgtEl>
-                                        <p:attrNameLst>
-                                          <p:attrName>style.visibility</p:attrName>
-                                        </p:attrNameLst>
-                                      </p:cBhvr>
-                                      <p:to>
-                                        <p:strVal val="visible"/>
-                                      </p:to>
-                                    </p:set>
-                                    <p:animEffect transition="in" filter="barn(inVertical)">
-                                      <p:cBhvr>
-                                        <p:cTn id="35" dur="500"/>
-                                        <p:tgtEl>
-                                          <p:spTgt spid="3">
-                                            <p:txEl>
-                                              <p:pRg st="3" end="3"/>
                                             </p:txEl>
                                           </p:spTgt>
                                         </p:tgtEl>
@@ -8987,26 +8867,26 @@
                     </p:cTn>
                   </p:par>
                   <p:par>
-                    <p:cTn id="36" fill="hold">
+                    <p:cTn id="29" fill="hold">
                       <p:stCondLst>
                         <p:cond delay="indefinite"/>
                       </p:stCondLst>
                       <p:childTnLst>
                         <p:par>
-                          <p:cTn id="37" fill="hold">
+                          <p:cTn id="30" fill="hold">
                             <p:stCondLst>
                               <p:cond delay="0"/>
                             </p:stCondLst>
                             <p:childTnLst>
                               <p:par>
-                                <p:cTn id="38" presetID="16" presetClass="entr" presetSubtype="21" fill="hold" grpId="0" nodeType="clickEffect">
+                                <p:cTn id="31" presetID="16" presetClass="entr" presetSubtype="21" fill="hold" grpId="0" nodeType="clickEffect">
                                   <p:stCondLst>
                                     <p:cond delay="0"/>
                                   </p:stCondLst>
                                   <p:childTnLst>
                                     <p:set>
                                       <p:cBhvr>
-                                        <p:cTn id="39" dur="1" fill="hold">
+                                        <p:cTn id="32" dur="1" fill="hold">
                                           <p:stCondLst>
                                             <p:cond delay="0"/>
                                           </p:stCondLst>
@@ -9028,72 +8908,11 @@
                                     </p:set>
                                     <p:animEffect transition="in" filter="barn(inVertical)">
                                       <p:cBhvr>
-                                        <p:cTn id="40" dur="500"/>
+                                        <p:cTn id="33" dur="500"/>
                                         <p:tgtEl>
                                           <p:spTgt spid="3">
                                             <p:txEl>
                                               <p:pRg st="4" end="4"/>
-                                            </p:txEl>
-                                          </p:spTgt>
-                                        </p:tgtEl>
-                                      </p:cBhvr>
-                                    </p:animEffect>
-                                  </p:childTnLst>
-                                </p:cTn>
-                              </p:par>
-                            </p:childTnLst>
-                          </p:cTn>
-                        </p:par>
-                      </p:childTnLst>
-                    </p:cTn>
-                  </p:par>
-                  <p:par>
-                    <p:cTn id="41" fill="hold">
-                      <p:stCondLst>
-                        <p:cond delay="indefinite"/>
-                      </p:stCondLst>
-                      <p:childTnLst>
-                        <p:par>
-                          <p:cTn id="42" fill="hold">
-                            <p:stCondLst>
-                              <p:cond delay="0"/>
-                            </p:stCondLst>
-                            <p:childTnLst>
-                              <p:par>
-                                <p:cTn id="43" presetID="16" presetClass="entr" presetSubtype="21" fill="hold" grpId="0" nodeType="clickEffect">
-                                  <p:stCondLst>
-                                    <p:cond delay="0"/>
-                                  </p:stCondLst>
-                                  <p:childTnLst>
-                                    <p:set>
-                                      <p:cBhvr>
-                                        <p:cTn id="44" dur="1" fill="hold">
-                                          <p:stCondLst>
-                                            <p:cond delay="0"/>
-                                          </p:stCondLst>
-                                        </p:cTn>
-                                        <p:tgtEl>
-                                          <p:spTgt spid="3">
-                                            <p:txEl>
-                                              <p:pRg st="5" end="5"/>
-                                            </p:txEl>
-                                          </p:spTgt>
-                                        </p:tgtEl>
-                                        <p:attrNameLst>
-                                          <p:attrName>style.visibility</p:attrName>
-                                        </p:attrNameLst>
-                                      </p:cBhvr>
-                                      <p:to>
-                                        <p:strVal val="visible"/>
-                                      </p:to>
-                                    </p:set>
-                                    <p:animEffect transition="in" filter="barn(inVertical)">
-                                      <p:cBhvr>
-                                        <p:cTn id="45" dur="500"/>
-                                        <p:tgtEl>
-                                          <p:spTgt spid="3">
-                                            <p:txEl>
-                                              <p:pRg st="5" end="5"/>
                                             </p:txEl>
                                           </p:spTgt>
                                         </p:tgtEl>
@@ -9255,15 +9074,7 @@
           <a:p>
             <a:r>
               <a:rPr lang="es-AR" sz="5400" dirty="0"/>
-              <a:t>Descripción </a:t>
-            </a:r>
-            <a:r>
-              <a:rPr lang="es-AR" sz="5400" dirty="0" smtClean="0"/>
-              <a:t>del </a:t>
-            </a:r>
-            <a:r>
-              <a:rPr lang="es-AR" sz="5400" dirty="0"/>
-              <a:t>sistema</a:t>
+              <a:t>Descripción del sistema</a:t>
             </a:r>
           </a:p>
         </p:txBody>
@@ -9349,7 +9160,7 @@
               <a:buChar char="Ø"/>
             </a:pPr>
             <a:r>
-              <a:rPr lang="es-AR" dirty="0" smtClean="0"/>
+              <a:rPr lang="es-AR" dirty="0"/>
               <a:t>Servicios</a:t>
             </a:r>
           </a:p>
@@ -9362,10 +9173,10 @@
               <a:buChar char="Ø"/>
             </a:pPr>
             <a:r>
-              <a:rPr lang="es-ES" dirty="0" smtClean="0"/>
+              <a:rPr lang="es-ES" dirty="0"/>
               <a:t>Nuevo Servicio</a:t>
             </a:r>
-            <a:endParaRPr lang="es-AR" dirty="0" smtClean="0"/>
+            <a:endParaRPr lang="es-AR" dirty="0"/>
           </a:p>
           <a:p>
             <a:pPr>
@@ -9375,13 +9186,8 @@
             </a:pPr>
             <a:r>
               <a:rPr lang="es-AR" dirty="0"/>
-              <a:t>	</a:t>
+              <a:t>		</a:t>
             </a:r>
-            <a:r>
-              <a:rPr lang="es-AR" dirty="0" smtClean="0"/>
-              <a:t>	</a:t>
-            </a:r>
-            <a:endParaRPr lang="es-AR" dirty="0"/>
           </a:p>
         </p:txBody>
       </p:sp>
@@ -9442,7 +9248,7 @@
               <a:buChar char="Ø"/>
             </a:pPr>
             <a:r>
-              <a:rPr lang="es-AR" dirty="0" smtClean="0"/>
+              <a:rPr lang="es-AR" dirty="0"/>
               <a:t>Turnos</a:t>
             </a:r>
           </a:p>
@@ -9455,10 +9261,10 @@
               <a:buChar char="Ø"/>
             </a:pPr>
             <a:r>
-              <a:rPr lang="es-ES" dirty="0" smtClean="0"/>
+              <a:rPr lang="es-ES" dirty="0"/>
               <a:t>Ver Turnos</a:t>
             </a:r>
-            <a:endParaRPr lang="es-AR" dirty="0" smtClean="0"/>
+            <a:endParaRPr lang="es-AR" dirty="0"/>
           </a:p>
           <a:p>
             <a:pPr>
@@ -9468,13 +9274,8 @@
             </a:pPr>
             <a:r>
               <a:rPr lang="es-AR" dirty="0"/>
-              <a:t>	</a:t>
+              <a:t>		</a:t>
             </a:r>
-            <a:r>
-              <a:rPr lang="es-AR" dirty="0" smtClean="0"/>
-              <a:t>	</a:t>
-            </a:r>
-            <a:endParaRPr lang="es-AR" dirty="0"/>
           </a:p>
         </p:txBody>
       </p:sp>
@@ -9507,7 +9308,7 @@
               <a:buChar char="Ø"/>
             </a:pPr>
             <a:r>
-              <a:rPr lang="es-AR" dirty="0" smtClean="0"/>
+              <a:rPr lang="es-AR" dirty="0"/>
               <a:t>Clientes</a:t>
             </a:r>
           </a:p>
@@ -9520,10 +9321,10 @@
               <a:buChar char="Ø"/>
             </a:pPr>
             <a:r>
-              <a:rPr lang="es-ES" dirty="0" smtClean="0"/>
+              <a:rPr lang="es-ES" dirty="0"/>
               <a:t>Agenda de Clientes</a:t>
             </a:r>
-            <a:endParaRPr lang="es-AR" dirty="0" smtClean="0"/>
+            <a:endParaRPr lang="es-AR" dirty="0"/>
           </a:p>
           <a:p>
             <a:pPr>
@@ -9533,13 +9334,8 @@
             </a:pPr>
             <a:r>
               <a:rPr lang="es-AR" dirty="0"/>
-              <a:t>	</a:t>
+              <a:t>		</a:t>
             </a:r>
-            <a:r>
-              <a:rPr lang="es-AR" dirty="0" smtClean="0"/>
-              <a:t>	</a:t>
-            </a:r>
-            <a:endParaRPr lang="es-AR" dirty="0"/>
           </a:p>
         </p:txBody>
       </p:sp>
@@ -9813,6 +9609,36 @@
           </a:prstGeom>
         </p:spPr>
       </p:pic>
+      <p:pic>
+        <p:nvPicPr>
+          <p:cNvPr id="6" name="Imagen 5">
+            <a:extLst>
+              <a:ext uri="{FF2B5EF4-FFF2-40B4-BE49-F238E27FC236}">
+                <a16:creationId xmlns:a16="http://schemas.microsoft.com/office/drawing/2014/main" id="{E969F082-705D-9384-4B28-FD7F7695B68D}"/>
+              </a:ext>
+            </a:extLst>
+          </p:cNvPr>
+          <p:cNvPicPr>
+            <a:picLocks noChangeAspect="1"/>
+          </p:cNvPicPr>
+          <p:nvPr/>
+        </p:nvPicPr>
+        <p:blipFill>
+          <a:blip r:embed="rId14"/>
+          <a:stretch>
+            <a:fillRect/>
+          </a:stretch>
+        </p:blipFill>
+        <p:spPr>
+          <a:xfrm>
+            <a:off x="4033334" y="2170177"/>
+            <a:ext cx="4408561" cy="4415848"/>
+          </a:xfrm>
+          <a:prstGeom prst="rect">
+            <a:avLst/>
+          </a:prstGeom>
+        </p:spPr>
+      </p:pic>
     </p:spTree>
     <p:extLst>
       <p:ext uri="{BB962C8B-B14F-4D97-AF65-F5344CB8AC3E}">
@@ -9847,6 +9673,9 @@
                     <p:cTn id="3" fill="hold">
                       <p:stCondLst>
                         <p:cond delay="indefinite"/>
+                        <p:cond evt="onBegin" delay="0">
+                          <p:tn val="2"/>
+                        </p:cond>
                       </p:stCondLst>
                       <p:childTnLst>
                         <p:par>
@@ -9856,7 +9685,7 @@
                             </p:stCondLst>
                             <p:childTnLst>
                               <p:par>
-                                <p:cTn id="5" presetID="6" presetClass="entr" presetSubtype="16" fill="hold" grpId="0" nodeType="clickEffect">
+                                <p:cTn id="5" presetID="6" presetClass="entr" presetSubtype="16" fill="hold" grpId="0" nodeType="afterEffect">
                                   <p:stCondLst>
                                     <p:cond delay="0"/>
                                   </p:stCondLst>
@@ -10156,30 +9985,21 @@
                             </p:childTnLst>
                           </p:cTn>
                         </p:par>
-                      </p:childTnLst>
-                    </p:cTn>
-                  </p:par>
-                  <p:par>
-                    <p:cTn id="29" fill="hold">
-                      <p:stCondLst>
-                        <p:cond delay="indefinite"/>
-                      </p:stCondLst>
-                      <p:childTnLst>
                         <p:par>
-                          <p:cTn id="30" fill="hold">
+                          <p:cTn id="29" fill="hold">
                             <p:stCondLst>
-                              <p:cond delay="0"/>
+                              <p:cond delay="1000"/>
                             </p:stCondLst>
                             <p:childTnLst>
                               <p:par>
-                                <p:cTn id="31" presetID="47" presetClass="entr" presetSubtype="0" fill="hold" nodeType="clickEffect">
+                                <p:cTn id="30" presetID="47" presetClass="entr" presetSubtype="0" fill="hold" nodeType="afterEffect">
                                   <p:stCondLst>
                                     <p:cond delay="0"/>
                                   </p:stCondLst>
                                   <p:childTnLst>
                                     <p:set>
                                       <p:cBhvr>
-                                        <p:cTn id="32" dur="1" fill="hold">
+                                        <p:cTn id="31" dur="1" fill="hold">
                                           <p:stCondLst>
                                             <p:cond delay="0"/>
                                           </p:stCondLst>
@@ -10197,7 +10017,7 @@
                                     </p:set>
                                     <p:animEffect transition="in" filter="fade">
                                       <p:cBhvr>
-                                        <p:cTn id="33" dur="1000"/>
+                                        <p:cTn id="32" dur="1000"/>
                                         <p:tgtEl>
                                           <p:spTgt spid="17"/>
                                         </p:tgtEl>
@@ -10205,7 +10025,7 @@
                                     </p:animEffect>
                                     <p:anim calcmode="lin" valueType="num">
                                       <p:cBhvr>
-                                        <p:cTn id="34" dur="1000" fill="hold"/>
+                                        <p:cTn id="33" dur="1000" fill="hold"/>
                                         <p:tgtEl>
                                           <p:spTgt spid="17"/>
                                         </p:tgtEl>
@@ -10228,7 +10048,7 @@
                                     </p:anim>
                                     <p:anim calcmode="lin" valueType="num">
                                       <p:cBhvr>
-                                        <p:cTn id="35" dur="1000" fill="hold"/>
+                                        <p:cTn id="34" dur="1000" fill="hold"/>
                                         <p:tgtEl>
                                           <p:spTgt spid="17"/>
                                         </p:tgtEl>
@@ -10259,26 +10079,26 @@
                     </p:cTn>
                   </p:par>
                   <p:par>
-                    <p:cTn id="36" fill="hold">
+                    <p:cTn id="35" fill="hold">
                       <p:stCondLst>
                         <p:cond delay="indefinite"/>
                       </p:stCondLst>
                       <p:childTnLst>
                         <p:par>
-                          <p:cTn id="37" fill="hold">
+                          <p:cTn id="36" fill="hold">
                             <p:stCondLst>
                               <p:cond delay="0"/>
                             </p:stCondLst>
                             <p:childTnLst>
                               <p:par>
-                                <p:cTn id="38" presetID="1" presetClass="entr" presetSubtype="0" fill="hold" nodeType="clickEffect">
+                                <p:cTn id="37" presetID="1" presetClass="entr" presetSubtype="0" fill="hold" nodeType="clickEffect">
                                   <p:stCondLst>
                                     <p:cond delay="0"/>
                                   </p:stCondLst>
                                   <p:childTnLst>
                                     <p:set>
                                       <p:cBhvr>
-                                        <p:cTn id="39" dur="1" fill="hold">
+                                        <p:cTn id="38" dur="1" fill="hold">
                                           <p:stCondLst>
                                             <p:cond delay="0"/>
                                           </p:stCondLst>
@@ -10304,26 +10124,26 @@
                     </p:cTn>
                   </p:par>
                   <p:par>
-                    <p:cTn id="40" fill="hold">
+                    <p:cTn id="39" fill="hold">
                       <p:stCondLst>
                         <p:cond delay="indefinite"/>
                       </p:stCondLst>
                       <p:childTnLst>
                         <p:par>
-                          <p:cTn id="41" fill="hold">
+                          <p:cTn id="40" fill="hold">
                             <p:stCondLst>
                               <p:cond delay="0"/>
                             </p:stCondLst>
                             <p:childTnLst>
                               <p:par>
-                                <p:cTn id="42" presetID="2" presetClass="exit" presetSubtype="4" fill="hold" nodeType="clickEffect">
+                                <p:cTn id="41" presetID="2" presetClass="exit" presetSubtype="4" fill="hold" nodeType="clickEffect">
                                   <p:stCondLst>
                                     <p:cond delay="0"/>
                                   </p:stCondLst>
                                   <p:childTnLst>
                                     <p:anim calcmode="lin" valueType="num">
                                       <p:cBhvr additive="base">
-                                        <p:cTn id="43" dur="500"/>
+                                        <p:cTn id="42" dur="500"/>
                                         <p:tgtEl>
                                           <p:spTgt spid="17"/>
                                         </p:tgtEl>
@@ -10346,7 +10166,7 @@
                                     </p:anim>
                                     <p:anim calcmode="lin" valueType="num">
                                       <p:cBhvr additive="base">
-                                        <p:cTn id="44" dur="500"/>
+                                        <p:cTn id="43" dur="500"/>
                                         <p:tgtEl>
                                           <p:spTgt spid="17"/>
                                         </p:tgtEl>
@@ -10369,7 +10189,7 @@
                                     </p:anim>
                                     <p:set>
                                       <p:cBhvr>
-                                        <p:cTn id="45" dur="1" fill="hold">
+                                        <p:cTn id="44" dur="1" fill="hold">
                                           <p:stCondLst>
                                             <p:cond delay="499"/>
                                           </p:stCondLst>
@@ -10392,20 +10212,20 @@
                           </p:cTn>
                         </p:par>
                         <p:par>
-                          <p:cTn id="46" fill="hold">
+                          <p:cTn id="45" fill="hold">
                             <p:stCondLst>
                               <p:cond delay="500"/>
                             </p:stCondLst>
                             <p:childTnLst>
                               <p:par>
-                                <p:cTn id="47" presetID="2" presetClass="exit" presetSubtype="4" fill="hold" nodeType="afterEffect">
+                                <p:cTn id="46" presetID="2" presetClass="exit" presetSubtype="4" fill="hold" nodeType="afterEffect">
                                   <p:stCondLst>
                                     <p:cond delay="0"/>
                                   </p:stCondLst>
                                   <p:childTnLst>
                                     <p:anim calcmode="lin" valueType="num">
                                       <p:cBhvr additive="base">
-                                        <p:cTn id="48" dur="500"/>
+                                        <p:cTn id="47" dur="500"/>
                                         <p:tgtEl>
                                           <p:spTgt spid="16"/>
                                         </p:tgtEl>
@@ -10428,7 +10248,7 @@
                                     </p:anim>
                                     <p:anim calcmode="lin" valueType="num">
                                       <p:cBhvr additive="base">
-                                        <p:cTn id="49" dur="500"/>
+                                        <p:cTn id="48" dur="500"/>
                                         <p:tgtEl>
                                           <p:spTgt spid="16"/>
                                         </p:tgtEl>
@@ -10451,7 +10271,7 @@
                                     </p:anim>
                                     <p:set>
                                       <p:cBhvr>
-                                        <p:cTn id="50" dur="1" fill="hold">
+                                        <p:cTn id="49" dur="1" fill="hold">
                                           <p:stCondLst>
                                             <p:cond delay="499"/>
                                           </p:stCondLst>
@@ -10474,20 +10294,20 @@
                           </p:cTn>
                         </p:par>
                         <p:par>
-                          <p:cTn id="51" fill="hold">
+                          <p:cTn id="50" fill="hold">
                             <p:stCondLst>
                               <p:cond delay="1000"/>
                             </p:stCondLst>
                             <p:childTnLst>
                               <p:par>
-                                <p:cTn id="52" presetID="31" presetClass="entr" presetSubtype="0" fill="hold" grpId="0" nodeType="afterEffect">
+                                <p:cTn id="51" presetID="31" presetClass="entr" presetSubtype="0" fill="hold" grpId="0" nodeType="afterEffect">
                                   <p:stCondLst>
                                     <p:cond delay="0"/>
                                   </p:stCondLst>
                                   <p:childTnLst>
                                     <p:set>
                                       <p:cBhvr>
-                                        <p:cTn id="53" dur="1" fill="hold">
+                                        <p:cTn id="52" dur="1" fill="hold">
                                           <p:stCondLst>
                                             <p:cond delay="0"/>
                                           </p:stCondLst>
@@ -10505,7 +10325,7 @@
                                     </p:set>
                                     <p:anim calcmode="lin" valueType="num">
                                       <p:cBhvr>
-                                        <p:cTn id="54" dur="1000" fill="hold"/>
+                                        <p:cTn id="53" dur="1000" fill="hold"/>
                                         <p:tgtEl>
                                           <p:spTgt spid="15"/>
                                         </p:tgtEl>
@@ -10528,7 +10348,7 @@
                                     </p:anim>
                                     <p:anim calcmode="lin" valueType="num">
                                       <p:cBhvr>
-                                        <p:cTn id="55" dur="1000" fill="hold"/>
+                                        <p:cTn id="54" dur="1000" fill="hold"/>
                                         <p:tgtEl>
                                           <p:spTgt spid="15"/>
                                         </p:tgtEl>
@@ -10551,7 +10371,7 @@
                                     </p:anim>
                                     <p:anim calcmode="lin" valueType="num">
                                       <p:cBhvr>
-                                        <p:cTn id="56" dur="1000" fill="hold"/>
+                                        <p:cTn id="55" dur="1000" fill="hold"/>
                                         <p:tgtEl>
                                           <p:spTgt spid="15"/>
                                         </p:tgtEl>
@@ -10574,7 +10394,7 @@
                                     </p:anim>
                                     <p:animEffect transition="in" filter="fade">
                                       <p:cBhvr>
-                                        <p:cTn id="57" dur="1000"/>
+                                        <p:cTn id="56" dur="1000"/>
                                         <p:tgtEl>
                                           <p:spTgt spid="15"/>
                                         </p:tgtEl>
@@ -10586,30 +10406,21 @@
                             </p:childTnLst>
                           </p:cTn>
                         </p:par>
-                      </p:childTnLst>
-                    </p:cTn>
-                  </p:par>
-                  <p:par>
-                    <p:cTn id="58" fill="hold">
-                      <p:stCondLst>
-                        <p:cond delay="indefinite"/>
-                      </p:stCondLst>
-                      <p:childTnLst>
                         <p:par>
-                          <p:cTn id="59" fill="hold">
+                          <p:cTn id="57" fill="hold">
                             <p:stCondLst>
-                              <p:cond delay="0"/>
+                              <p:cond delay="2000"/>
                             </p:stCondLst>
                             <p:childTnLst>
                               <p:par>
-                                <p:cTn id="60" presetID="47" presetClass="entr" presetSubtype="0" fill="hold" nodeType="clickEffect">
+                                <p:cTn id="58" presetID="47" presetClass="entr" presetSubtype="0" fill="hold" nodeType="afterEffect">
                                   <p:stCondLst>
                                     <p:cond delay="0"/>
                                   </p:stCondLst>
                                   <p:childTnLst>
                                     <p:set>
                                       <p:cBhvr>
-                                        <p:cTn id="61" dur="1" fill="hold">
+                                        <p:cTn id="59" dur="1" fill="hold">
                                           <p:stCondLst>
                                             <p:cond delay="0"/>
                                           </p:stCondLst>
@@ -10627,7 +10438,7 @@
                                     </p:set>
                                     <p:animEffect transition="in" filter="fade">
                                       <p:cBhvr>
-                                        <p:cTn id="62" dur="1000"/>
+                                        <p:cTn id="60" dur="1000"/>
                                         <p:tgtEl>
                                           <p:spTgt spid="18"/>
                                         </p:tgtEl>
@@ -10635,7 +10446,7 @@
                                     </p:animEffect>
                                     <p:anim calcmode="lin" valueType="num">
                                       <p:cBhvr>
-                                        <p:cTn id="63" dur="1000" fill="hold"/>
+                                        <p:cTn id="61" dur="1000" fill="hold"/>
                                         <p:tgtEl>
                                           <p:spTgt spid="18"/>
                                         </p:tgtEl>
@@ -10658,7 +10469,7 @@
                                     </p:anim>
                                     <p:anim calcmode="lin" valueType="num">
                                       <p:cBhvr>
-                                        <p:cTn id="64" dur="1000" fill="hold"/>
+                                        <p:cTn id="62" dur="1000" fill="hold"/>
                                         <p:tgtEl>
                                           <p:spTgt spid="18"/>
                                         </p:tgtEl>
@@ -10689,26 +10500,26 @@
                     </p:cTn>
                   </p:par>
                   <p:par>
-                    <p:cTn id="65" fill="hold">
+                    <p:cTn id="63" fill="hold">
                       <p:stCondLst>
                         <p:cond delay="indefinite"/>
                       </p:stCondLst>
                       <p:childTnLst>
                         <p:par>
-                          <p:cTn id="66" fill="hold">
+                          <p:cTn id="64" fill="hold">
                             <p:stCondLst>
                               <p:cond delay="0"/>
                             </p:stCondLst>
                             <p:childTnLst>
                               <p:par>
-                                <p:cTn id="67" presetID="47" presetClass="entr" presetSubtype="0" fill="hold" nodeType="clickEffect">
+                                <p:cTn id="65" presetID="47" presetClass="entr" presetSubtype="0" fill="hold" nodeType="clickEffect">
                                   <p:stCondLst>
                                     <p:cond delay="0"/>
                                   </p:stCondLst>
                                   <p:childTnLst>
                                     <p:set>
                                       <p:cBhvr>
-                                        <p:cTn id="68" dur="1" fill="hold">
+                                        <p:cTn id="66" dur="1" fill="hold">
                                           <p:stCondLst>
                                             <p:cond delay="0"/>
                                           </p:stCondLst>
@@ -10726,7 +10537,7 @@
                                     </p:set>
                                     <p:animEffect transition="in" filter="fade">
                                       <p:cBhvr>
-                                        <p:cTn id="69" dur="1000"/>
+                                        <p:cTn id="67" dur="1000"/>
                                         <p:tgtEl>
                                           <p:spTgt spid="20"/>
                                         </p:tgtEl>
@@ -10734,7 +10545,7 @@
                                     </p:animEffect>
                                     <p:anim calcmode="lin" valueType="num">
                                       <p:cBhvr>
-                                        <p:cTn id="70" dur="1000" fill="hold"/>
+                                        <p:cTn id="68" dur="1000" fill="hold"/>
                                         <p:tgtEl>
                                           <p:spTgt spid="20"/>
                                         </p:tgtEl>
@@ -10757,7 +10568,7 @@
                                     </p:anim>
                                     <p:anim calcmode="lin" valueType="num">
                                       <p:cBhvr>
-                                        <p:cTn id="71" dur="1000" fill="hold"/>
+                                        <p:cTn id="69" dur="1000" fill="hold"/>
                                         <p:tgtEl>
                                           <p:spTgt spid="20"/>
                                         </p:tgtEl>
@@ -10785,20 +10596,20 @@
                           </p:cTn>
                         </p:par>
                         <p:par>
-                          <p:cTn id="72" fill="hold">
+                          <p:cTn id="70" fill="hold">
                             <p:stCondLst>
                               <p:cond delay="1000"/>
                             </p:stCondLst>
                             <p:childTnLst>
                               <p:par>
-                                <p:cTn id="73" presetID="47" presetClass="entr" presetSubtype="0" fill="hold" nodeType="afterEffect">
+                                <p:cTn id="71" presetID="47" presetClass="entr" presetSubtype="0" fill="hold" nodeType="afterEffect">
                                   <p:stCondLst>
                                     <p:cond delay="0"/>
                                   </p:stCondLst>
                                   <p:childTnLst>
                                     <p:set>
                                       <p:cBhvr>
-                                        <p:cTn id="74" dur="1" fill="hold">
+                                        <p:cTn id="72" dur="1" fill="hold">
                                           <p:stCondLst>
                                             <p:cond delay="0"/>
                                           </p:stCondLst>
@@ -10816,7 +10627,7 @@
                                     </p:set>
                                     <p:animEffect transition="in" filter="fade">
                                       <p:cBhvr>
-                                        <p:cTn id="75" dur="1000"/>
+                                        <p:cTn id="73" dur="1000"/>
                                         <p:tgtEl>
                                           <p:spTgt spid="21"/>
                                         </p:tgtEl>
@@ -10824,7 +10635,7 @@
                                     </p:animEffect>
                                     <p:anim calcmode="lin" valueType="num">
                                       <p:cBhvr>
-                                        <p:cTn id="76" dur="1000" fill="hold"/>
+                                        <p:cTn id="74" dur="1000" fill="hold"/>
                                         <p:tgtEl>
                                           <p:spTgt spid="21"/>
                                         </p:tgtEl>
@@ -10847,7 +10658,7 @@
                                     </p:anim>
                                     <p:anim calcmode="lin" valueType="num">
                                       <p:cBhvr>
-                                        <p:cTn id="77" dur="1000" fill="hold"/>
+                                        <p:cTn id="75" dur="1000" fill="hold"/>
                                         <p:tgtEl>
                                           <p:spTgt spid="21"/>
                                         </p:tgtEl>
@@ -10875,20 +10686,20 @@
                           </p:cTn>
                         </p:par>
                         <p:par>
-                          <p:cTn id="78" fill="hold">
+                          <p:cTn id="76" fill="hold">
                             <p:stCondLst>
                               <p:cond delay="2000"/>
                             </p:stCondLst>
                             <p:childTnLst>
                               <p:par>
-                                <p:cTn id="79" presetID="47" presetClass="entr" presetSubtype="0" fill="hold" nodeType="afterEffect">
+                                <p:cTn id="77" presetID="47" presetClass="entr" presetSubtype="0" fill="hold" nodeType="afterEffect">
                                   <p:stCondLst>
                                     <p:cond delay="0"/>
                                   </p:stCondLst>
                                   <p:childTnLst>
                                     <p:set>
                                       <p:cBhvr>
-                                        <p:cTn id="80" dur="1" fill="hold">
+                                        <p:cTn id="78" dur="1" fill="hold">
                                           <p:stCondLst>
                                             <p:cond delay="0"/>
                                           </p:stCondLst>
@@ -10906,7 +10717,7 @@
                                     </p:set>
                                     <p:animEffect transition="in" filter="fade">
                                       <p:cBhvr>
-                                        <p:cTn id="81" dur="1000"/>
+                                        <p:cTn id="79" dur="1000"/>
                                         <p:tgtEl>
                                           <p:spTgt spid="22"/>
                                         </p:tgtEl>
@@ -10914,7 +10725,7 @@
                                     </p:animEffect>
                                     <p:anim calcmode="lin" valueType="num">
                                       <p:cBhvr>
-                                        <p:cTn id="82" dur="1000" fill="hold"/>
+                                        <p:cTn id="80" dur="1000" fill="hold"/>
                                         <p:tgtEl>
                                           <p:spTgt spid="22"/>
                                         </p:tgtEl>
@@ -10937,7 +10748,7 @@
                                     </p:anim>
                                     <p:anim calcmode="lin" valueType="num">
                                       <p:cBhvr>
-                                        <p:cTn id="83" dur="1000" fill="hold"/>
+                                        <p:cTn id="81" dur="1000" fill="hold"/>
                                         <p:tgtEl>
                                           <p:spTgt spid="22"/>
                                         </p:tgtEl>
@@ -10968,36 +10779,81 @@
                     </p:cTn>
                   </p:par>
                   <p:par>
-                    <p:cTn id="84" fill="hold">
+                    <p:cTn id="82" fill="hold">
                       <p:stCondLst>
                         <p:cond delay="indefinite"/>
                       </p:stCondLst>
                       <p:childTnLst>
                         <p:par>
-                          <p:cTn id="85" fill="hold">
+                          <p:cTn id="83" fill="hold">
                             <p:stCondLst>
                               <p:cond delay="0"/>
                             </p:stCondLst>
                             <p:childTnLst>
                               <p:par>
-                                <p:cTn id="86" presetID="42" presetClass="exit" presetSubtype="0" fill="hold" nodeType="clickEffect">
+                                <p:cTn id="84" presetID="16" presetClass="entr" presetSubtype="21" fill="hold" nodeType="clickEffect">
                                   <p:stCondLst>
                                     <p:cond delay="0"/>
                                   </p:stCondLst>
                                   <p:childTnLst>
-                                    <p:animEffect transition="out" filter="fade">
-                                      <p:cBhvr>
-                                        <p:cTn id="87" dur="1000"/>
-                                        <p:tgtEl>
-                                          <p:spTgt spid="18"/>
+                                    <p:set>
+                                      <p:cBhvr>
+                                        <p:cTn id="85" dur="1" fill="hold">
+                                          <p:stCondLst>
+                                            <p:cond delay="0"/>
+                                          </p:stCondLst>
+                                        </p:cTn>
+                                        <p:tgtEl>
+                                          <p:spTgt spid="6"/>
+                                        </p:tgtEl>
+                                        <p:attrNameLst>
+                                          <p:attrName>style.visibility</p:attrName>
+                                        </p:attrNameLst>
+                                      </p:cBhvr>
+                                      <p:to>
+                                        <p:strVal val="visible"/>
+                                      </p:to>
+                                    </p:set>
+                                    <p:animEffect transition="in" filter="barn(inVertical)">
+                                      <p:cBhvr>
+                                        <p:cTn id="86" dur="500"/>
+                                        <p:tgtEl>
+                                          <p:spTgt spid="6"/>
                                         </p:tgtEl>
                                       </p:cBhvr>
                                     </p:animEffect>
+                                  </p:childTnLst>
+                                </p:cTn>
+                              </p:par>
+                            </p:childTnLst>
+                          </p:cTn>
+                        </p:par>
+                      </p:childTnLst>
+                    </p:cTn>
+                  </p:par>
+                  <p:par>
+                    <p:cTn id="87" fill="hold">
+                      <p:stCondLst>
+                        <p:cond delay="indefinite"/>
+                      </p:stCondLst>
+                      <p:childTnLst>
+                        <p:par>
+                          <p:cTn id="88" fill="hold">
+                            <p:stCondLst>
+                              <p:cond delay="0"/>
+                            </p:stCondLst>
+                            <p:childTnLst>
+                              <p:par>
+                                <p:cTn id="89" presetID="2" presetClass="exit" presetSubtype="4" fill="hold" nodeType="clickEffect">
+                                  <p:stCondLst>
+                                    <p:cond delay="0"/>
+                                  </p:stCondLst>
+                                  <p:childTnLst>
                                     <p:anim calcmode="lin" valueType="num">
-                                      <p:cBhvr>
-                                        <p:cTn id="88" dur="1000"/>
-                                        <p:tgtEl>
-                                          <p:spTgt spid="18"/>
+                                      <p:cBhvr additive="base">
+                                        <p:cTn id="90" dur="500"/>
+                                        <p:tgtEl>
+                                          <p:spTgt spid="6"/>
                                         </p:tgtEl>
                                         <p:attrNameLst>
                                           <p:attrName>ppt_x</p:attrName>
@@ -11017,10 +10873,10 @@
                                       </p:tavLst>
                                     </p:anim>
                                     <p:anim calcmode="lin" valueType="num">
-                                      <p:cBhvr>
-                                        <p:cTn id="89" dur="1000"/>
-                                        <p:tgtEl>
-                                          <p:spTgt spid="18"/>
+                                      <p:cBhvr additive="base">
+                                        <p:cTn id="91" dur="500"/>
+                                        <p:tgtEl>
+                                          <p:spTgt spid="6"/>
                                         </p:tgtEl>
                                         <p:attrNameLst>
                                           <p:attrName>ppt_y</p:attrName>
@@ -11034,20 +10890,20 @@
                                         </p:tav>
                                         <p:tav tm="100000">
                                           <p:val>
-                                            <p:strVal val="ppt_y+.1"/>
+                                            <p:strVal val="1+ppt_h/2"/>
                                           </p:val>
                                         </p:tav>
                                       </p:tavLst>
                                     </p:anim>
                                     <p:set>
                                       <p:cBhvr>
-                                        <p:cTn id="90" dur="1" fill="hold">
+                                        <p:cTn id="92" dur="1" fill="hold">
                                           <p:stCondLst>
-                                            <p:cond delay="999"/>
+                                            <p:cond delay="499"/>
                                           </p:stCondLst>
                                         </p:cTn>
                                         <p:tgtEl>
-                                          <p:spTgt spid="18"/>
+                                          <p:spTgt spid="6"/>
                                         </p:tgtEl>
                                         <p:attrNameLst>
                                           <p:attrName>style.visibility</p:attrName>
@@ -11064,22 +10920,30 @@
                           </p:cTn>
                         </p:par>
                         <p:par>
-                          <p:cTn id="91" fill="hold">
+                          <p:cTn id="93" fill="hold">
                             <p:stCondLst>
-                              <p:cond delay="1000"/>
+                              <p:cond delay="500"/>
                             </p:stCondLst>
                             <p:childTnLst>
                               <p:par>
-                                <p:cTn id="92" presetID="2" presetClass="exit" presetSubtype="4" fill="hold" nodeType="afterEffect">
+                                <p:cTn id="94" presetID="42" presetClass="exit" presetSubtype="0" fill="hold" nodeType="afterEffect">
                                   <p:stCondLst>
                                     <p:cond delay="0"/>
                                   </p:stCondLst>
                                   <p:childTnLst>
+                                    <p:animEffect transition="out" filter="fade">
+                                      <p:cBhvr>
+                                        <p:cTn id="95" dur="1000"/>
+                                        <p:tgtEl>
+                                          <p:spTgt spid="18"/>
+                                        </p:tgtEl>
+                                      </p:cBhvr>
+                                    </p:animEffect>
                                     <p:anim calcmode="lin" valueType="num">
-                                      <p:cBhvr additive="base">
-                                        <p:cTn id="93" dur="500"/>
-                                        <p:tgtEl>
-                                          <p:spTgt spid="20"/>
+                                      <p:cBhvr>
+                                        <p:cTn id="96" dur="1000"/>
+                                        <p:tgtEl>
+                                          <p:spTgt spid="18"/>
                                         </p:tgtEl>
                                         <p:attrNameLst>
                                           <p:attrName>ppt_x</p:attrName>
@@ -11099,10 +10963,10 @@
                                       </p:tavLst>
                                     </p:anim>
                                     <p:anim calcmode="lin" valueType="num">
-                                      <p:cBhvr additive="base">
-                                        <p:cTn id="94" dur="500"/>
-                                        <p:tgtEl>
-                                          <p:spTgt spid="20"/>
+                                      <p:cBhvr>
+                                        <p:cTn id="97" dur="1000"/>
+                                        <p:tgtEl>
+                                          <p:spTgt spid="18"/>
                                         </p:tgtEl>
                                         <p:attrNameLst>
                                           <p:attrName>ppt_y</p:attrName>
@@ -11116,20 +10980,20 @@
                                         </p:tav>
                                         <p:tav tm="100000">
                                           <p:val>
-                                            <p:strVal val="1+ppt_h/2"/>
+                                            <p:strVal val="ppt_y+.1"/>
                                           </p:val>
                                         </p:tav>
                                       </p:tavLst>
                                     </p:anim>
                                     <p:set>
                                       <p:cBhvr>
-                                        <p:cTn id="95" dur="1" fill="hold">
+                                        <p:cTn id="98" dur="1" fill="hold">
                                           <p:stCondLst>
-                                            <p:cond delay="499"/>
+                                            <p:cond delay="999"/>
                                           </p:stCondLst>
                                         </p:cTn>
                                         <p:tgtEl>
-                                          <p:spTgt spid="20"/>
+                                          <p:spTgt spid="18"/>
                                         </p:tgtEl>
                                         <p:attrNameLst>
                                           <p:attrName>style.visibility</p:attrName>
@@ -11146,22 +11010,22 @@
                           </p:cTn>
                         </p:par>
                         <p:par>
-                          <p:cTn id="96" fill="hold">
+                          <p:cTn id="99" fill="hold">
                             <p:stCondLst>
                               <p:cond delay="1500"/>
                             </p:stCondLst>
                             <p:childTnLst>
                               <p:par>
-                                <p:cTn id="97" presetID="2" presetClass="exit" presetSubtype="4" fill="hold" nodeType="afterEffect">
+                                <p:cTn id="100" presetID="2" presetClass="exit" presetSubtype="4" fill="hold" nodeType="afterEffect">
                                   <p:stCondLst>
                                     <p:cond delay="0"/>
                                   </p:stCondLst>
                                   <p:childTnLst>
                                     <p:anim calcmode="lin" valueType="num">
                                       <p:cBhvr additive="base">
-                                        <p:cTn id="98" dur="500"/>
-                                        <p:tgtEl>
-                                          <p:spTgt spid="21"/>
+                                        <p:cTn id="101" dur="500"/>
+                                        <p:tgtEl>
+                                          <p:spTgt spid="20"/>
                                         </p:tgtEl>
                                         <p:attrNameLst>
                                           <p:attrName>ppt_x</p:attrName>
@@ -11182,9 +11046,9 @@
                                     </p:anim>
                                     <p:anim calcmode="lin" valueType="num">
                                       <p:cBhvr additive="base">
-                                        <p:cTn id="99" dur="500"/>
-                                        <p:tgtEl>
-                                          <p:spTgt spid="21"/>
+                                        <p:cTn id="102" dur="500"/>
+                                        <p:tgtEl>
+                                          <p:spTgt spid="20"/>
                                         </p:tgtEl>
                                         <p:attrNameLst>
                                           <p:attrName>ppt_y</p:attrName>
@@ -11205,13 +11069,13 @@
                                     </p:anim>
                                     <p:set>
                                       <p:cBhvr>
-                                        <p:cTn id="100" dur="1" fill="hold">
+                                        <p:cTn id="103" dur="1" fill="hold">
                                           <p:stCondLst>
                                             <p:cond delay="499"/>
                                           </p:stCondLst>
                                         </p:cTn>
                                         <p:tgtEl>
-                                          <p:spTgt spid="21"/>
+                                          <p:spTgt spid="20"/>
                                         </p:tgtEl>
                                         <p:attrNameLst>
                                           <p:attrName>style.visibility</p:attrName>
@@ -11228,22 +11092,22 @@
                           </p:cTn>
                         </p:par>
                         <p:par>
-                          <p:cTn id="101" fill="hold">
+                          <p:cTn id="104" fill="hold">
                             <p:stCondLst>
                               <p:cond delay="2000"/>
                             </p:stCondLst>
                             <p:childTnLst>
                               <p:par>
-                                <p:cTn id="102" presetID="2" presetClass="exit" presetSubtype="4" fill="hold" nodeType="afterEffect">
+                                <p:cTn id="105" presetID="2" presetClass="exit" presetSubtype="4" fill="hold" nodeType="afterEffect">
                                   <p:stCondLst>
                                     <p:cond delay="0"/>
                                   </p:stCondLst>
                                   <p:childTnLst>
                                     <p:anim calcmode="lin" valueType="num">
                                       <p:cBhvr additive="base">
-                                        <p:cTn id="103" dur="500"/>
-                                        <p:tgtEl>
-                                          <p:spTgt spid="22"/>
+                                        <p:cTn id="106" dur="500"/>
+                                        <p:tgtEl>
+                                          <p:spTgt spid="21"/>
                                         </p:tgtEl>
                                         <p:attrNameLst>
                                           <p:attrName>ppt_x</p:attrName>
@@ -11264,9 +11128,9 @@
                                     </p:anim>
                                     <p:anim calcmode="lin" valueType="num">
                                       <p:cBhvr additive="base">
-                                        <p:cTn id="104" dur="500"/>
-                                        <p:tgtEl>
-                                          <p:spTgt spid="22"/>
+                                        <p:cTn id="107" dur="500"/>
+                                        <p:tgtEl>
+                                          <p:spTgt spid="21"/>
                                         </p:tgtEl>
                                         <p:attrNameLst>
                                           <p:attrName>ppt_y</p:attrName>
@@ -11287,13 +11151,13 @@
                                     </p:anim>
                                     <p:set>
                                       <p:cBhvr>
-                                        <p:cTn id="105" dur="1" fill="hold">
+                                        <p:cTn id="108" dur="1" fill="hold">
                                           <p:stCondLst>
                                             <p:cond delay="499"/>
                                           </p:stCondLst>
                                         </p:cTn>
                                         <p:tgtEl>
-                                          <p:spTgt spid="22"/>
+                                          <p:spTgt spid="21"/>
                                         </p:tgtEl>
                                         <p:attrNameLst>
                                           <p:attrName>style.visibility</p:attrName>
@@ -11310,20 +11174,102 @@
                           </p:cTn>
                         </p:par>
                         <p:par>
-                          <p:cTn id="106" fill="hold">
+                          <p:cTn id="109" fill="hold">
                             <p:stCondLst>
                               <p:cond delay="2500"/>
                             </p:stCondLst>
                             <p:childTnLst>
                               <p:par>
-                                <p:cTn id="107" presetID="31" presetClass="entr" presetSubtype="0" fill="hold" grpId="0" nodeType="afterEffect">
+                                <p:cTn id="110" presetID="2" presetClass="exit" presetSubtype="4" fill="hold" nodeType="afterEffect">
+                                  <p:stCondLst>
+                                    <p:cond delay="0"/>
+                                  </p:stCondLst>
+                                  <p:childTnLst>
+                                    <p:anim calcmode="lin" valueType="num">
+                                      <p:cBhvr additive="base">
+                                        <p:cTn id="111" dur="500"/>
+                                        <p:tgtEl>
+                                          <p:spTgt spid="22"/>
+                                        </p:tgtEl>
+                                        <p:attrNameLst>
+                                          <p:attrName>ppt_x</p:attrName>
+                                        </p:attrNameLst>
+                                      </p:cBhvr>
+                                      <p:tavLst>
+                                        <p:tav tm="0">
+                                          <p:val>
+                                            <p:strVal val="ppt_x"/>
+                                          </p:val>
+                                        </p:tav>
+                                        <p:tav tm="100000">
+                                          <p:val>
+                                            <p:strVal val="ppt_x"/>
+                                          </p:val>
+                                        </p:tav>
+                                      </p:tavLst>
+                                    </p:anim>
+                                    <p:anim calcmode="lin" valueType="num">
+                                      <p:cBhvr additive="base">
+                                        <p:cTn id="112" dur="500"/>
+                                        <p:tgtEl>
+                                          <p:spTgt spid="22"/>
+                                        </p:tgtEl>
+                                        <p:attrNameLst>
+                                          <p:attrName>ppt_y</p:attrName>
+                                        </p:attrNameLst>
+                                      </p:cBhvr>
+                                      <p:tavLst>
+                                        <p:tav tm="0">
+                                          <p:val>
+                                            <p:strVal val="ppt_y"/>
+                                          </p:val>
+                                        </p:tav>
+                                        <p:tav tm="100000">
+                                          <p:val>
+                                            <p:strVal val="1+ppt_h/2"/>
+                                          </p:val>
+                                        </p:tav>
+                                      </p:tavLst>
+                                    </p:anim>
+                                    <p:set>
+                                      <p:cBhvr>
+                                        <p:cTn id="113" dur="1" fill="hold">
+                                          <p:stCondLst>
+                                            <p:cond delay="499"/>
+                                          </p:stCondLst>
+                                        </p:cTn>
+                                        <p:tgtEl>
+                                          <p:spTgt spid="22"/>
+                                        </p:tgtEl>
+                                        <p:attrNameLst>
+                                          <p:attrName>style.visibility</p:attrName>
+                                        </p:attrNameLst>
+                                      </p:cBhvr>
+                                      <p:to>
+                                        <p:strVal val="hidden"/>
+                                      </p:to>
+                                    </p:set>
+                                  </p:childTnLst>
+                                </p:cTn>
+                              </p:par>
+                            </p:childTnLst>
+                          </p:cTn>
+                        </p:par>
+                        <p:par>
+                          <p:cTn id="114" fill="hold">
+                            <p:stCondLst>
+                              <p:cond delay="3000"/>
+                            </p:stCondLst>
+                            <p:childTnLst>
+                              <p:par>
+                                <p:cTn id="115" presetID="31" presetClass="entr" presetSubtype="0" fill="hold" grpId="0" nodeType="afterEffect">
                                   <p:stCondLst>
                                     <p:cond delay="0"/>
                                   </p:stCondLst>
                                   <p:childTnLst>
                                     <p:set>
                                       <p:cBhvr>
-                                        <p:cTn id="108" dur="1" fill="hold">
+                                        <p:cTn id="116" dur="1" fill="hold">
                                           <p:stCondLst>
                                             <p:cond delay="0"/>
                                           </p:stCondLst>
@@ -11341,7 +11287,7 @@
                                     </p:set>
                                     <p:anim calcmode="lin" valueType="num">
                                       <p:cBhvr>
-                                        <p:cTn id="109" dur="1000" fill="hold"/>
+                                        <p:cTn id="117" dur="1000" fill="hold"/>
                                         <p:tgtEl>
                                           <p:spTgt spid="14"/>
                                         </p:tgtEl>
@@ -11364,7 +11310,7 @@
                                     </p:anim>
                                     <p:anim calcmode="lin" valueType="num">
                                       <p:cBhvr>
-                                        <p:cTn id="110" dur="1000" fill="hold"/>
+                                        <p:cTn id="118" dur="1000" fill="hold"/>
                                         <p:tgtEl>
                                           <p:spTgt spid="14"/>
                                         </p:tgtEl>
@@ -11387,7 +11333,7 @@
                                     </p:anim>
                                     <p:anim calcmode="lin" valueType="num">
                                       <p:cBhvr>
-                                        <p:cTn id="111" dur="1000" fill="hold"/>
+                                        <p:cTn id="119" dur="1000" fill="hold"/>
                                         <p:tgtEl>
                                           <p:spTgt spid="14"/>
                                         </p:tgtEl>
@@ -11410,7 +11356,7 @@
                                     </p:anim>
                                     <p:animEffect transition="in" filter="fade">
                                       <p:cBhvr>
-                                        <p:cTn id="112" dur="1000"/>
+                                        <p:cTn id="120" dur="1000"/>
                                         <p:tgtEl>
                                           <p:spTgt spid="14"/>
                                         </p:tgtEl>
@@ -11422,30 +11368,21 @@
                             </p:childTnLst>
                           </p:cTn>
                         </p:par>
-                      </p:childTnLst>
-                    </p:cTn>
-                  </p:par>
-                  <p:par>
-                    <p:cTn id="113" fill="hold">
-                      <p:stCondLst>
-                        <p:cond delay="indefinite"/>
-                      </p:stCondLst>
-                      <p:childTnLst>
                         <p:par>
-                          <p:cTn id="114" fill="hold">
+                          <p:cTn id="121" fill="hold">
                             <p:stCondLst>
-                              <p:cond delay="0"/>
+                              <p:cond delay="4000"/>
                             </p:stCondLst>
                             <p:childTnLst>
                               <p:par>
-                                <p:cTn id="115" presetID="47" presetClass="entr" presetSubtype="0" fill="hold" nodeType="clickEffect">
+                                <p:cTn id="122" presetID="47" presetClass="entr" presetSubtype="0" fill="hold" nodeType="afterEffect">
                                   <p:stCondLst>
                                     <p:cond delay="0"/>
                                   </p:stCondLst>
                                   <p:childTnLst>
                                     <p:set>
                                       <p:cBhvr>
-                                        <p:cTn id="116" dur="1" fill="hold">
+                                        <p:cTn id="123" dur="1" fill="hold">
                                           <p:stCondLst>
                                             <p:cond delay="0"/>
                                           </p:stCondLst>
@@ -11463,7 +11400,7 @@
                                     </p:set>
                                     <p:animEffect transition="in" filter="fade">
                                       <p:cBhvr>
-                                        <p:cTn id="117" dur="1000"/>
+                                        <p:cTn id="124" dur="1000"/>
                                         <p:tgtEl>
                                           <p:spTgt spid="23"/>
                                         </p:tgtEl>
@@ -11471,7 +11408,7 @@
                                     </p:animEffect>
                                     <p:anim calcmode="lin" valueType="num">
                                       <p:cBhvr>
-                                        <p:cTn id="118" dur="1000" fill="hold"/>
+                                        <p:cTn id="125" dur="1000" fill="hold"/>
                                         <p:tgtEl>
                                           <p:spTgt spid="23"/>
                                         </p:tgtEl>
@@ -11494,7 +11431,7 @@
                                     </p:anim>
                                     <p:anim calcmode="lin" valueType="num">
                                       <p:cBhvr>
-                                        <p:cTn id="119" dur="1000" fill="hold"/>
+                                        <p:cTn id="126" dur="1000" fill="hold"/>
                                         <p:tgtEl>
                                           <p:spTgt spid="23"/>
                                         </p:tgtEl>
@@ -11525,26 +11462,26 @@
                     </p:cTn>
                   </p:par>
                   <p:par>
-                    <p:cTn id="120" fill="hold">
+                    <p:cTn id="127" fill="hold">
                       <p:stCondLst>
                         <p:cond delay="indefinite"/>
                       </p:stCondLst>
                       <p:childTnLst>
                         <p:par>
-                          <p:cTn id="121" fill="hold">
+                          <p:cTn id="128" fill="hold">
                             <p:stCondLst>
                               <p:cond delay="0"/>
                             </p:stCondLst>
                             <p:childTnLst>
                               <p:par>
-                                <p:cTn id="122" presetID="2" presetClass="exit" presetSubtype="4" fill="hold" nodeType="clickEffect">
+                                <p:cTn id="129" presetID="2" presetClass="exit" presetSubtype="4" fill="hold" nodeType="clickEffect">
                                   <p:stCondLst>
                                     <p:cond delay="0"/>
                                   </p:stCondLst>
                                   <p:childTnLst>
                                     <p:anim calcmode="lin" valueType="num">
                                       <p:cBhvr additive="base">
-                                        <p:cTn id="123" dur="500"/>
+                                        <p:cTn id="130" dur="500"/>
                                         <p:tgtEl>
                                           <p:spTgt spid="23"/>
                                         </p:tgtEl>
@@ -11567,7 +11504,7 @@
                                     </p:anim>
                                     <p:anim calcmode="lin" valueType="num">
                                       <p:cBhvr additive="base">
-                                        <p:cTn id="124" dur="500"/>
+                                        <p:cTn id="131" dur="500"/>
                                         <p:tgtEl>
                                           <p:spTgt spid="23"/>
                                         </p:tgtEl>
@@ -11590,7 +11527,7 @@
                                     </p:anim>
                                     <p:set>
                                       <p:cBhvr>
-                                        <p:cTn id="125" dur="1" fill="hold">
+                                        <p:cTn id="132" dur="1" fill="hold">
                                           <p:stCondLst>
                                             <p:cond delay="499"/>
                                           </p:stCondLst>
@@ -11613,20 +11550,20 @@
                           </p:cTn>
                         </p:par>
                         <p:par>
-                          <p:cTn id="126" fill="hold">
+                          <p:cTn id="133" fill="hold">
                             <p:stCondLst>
                               <p:cond delay="500"/>
                             </p:stCondLst>
                             <p:childTnLst>
                               <p:par>
-                                <p:cTn id="127" presetID="47" presetClass="entr" presetSubtype="0" fill="hold" nodeType="afterEffect">
+                                <p:cTn id="134" presetID="47" presetClass="entr" presetSubtype="0" fill="hold" nodeType="afterEffect">
                                   <p:stCondLst>
                                     <p:cond delay="0"/>
                                   </p:stCondLst>
                                   <p:childTnLst>
                                     <p:set>
                                       <p:cBhvr>
-                                        <p:cTn id="128" dur="1" fill="hold">
+                                        <p:cTn id="135" dur="1" fill="hold">
                                           <p:stCondLst>
                                             <p:cond delay="0"/>
                                           </p:stCondLst>
@@ -11644,7 +11581,7 @@
                                     </p:set>
                                     <p:animEffect transition="in" filter="fade">
                                       <p:cBhvr>
-                                        <p:cTn id="129" dur="1000"/>
+                                        <p:cTn id="136" dur="1000"/>
                                         <p:tgtEl>
                                           <p:spTgt spid="24"/>
                                         </p:tgtEl>
@@ -11652,7 +11589,7 @@
                                     </p:animEffect>
                                     <p:anim calcmode="lin" valueType="num">
                                       <p:cBhvr>
-                                        <p:cTn id="130" dur="1000" fill="hold"/>
+                                        <p:cTn id="137" dur="1000" fill="hold"/>
                                         <p:tgtEl>
                                           <p:spTgt spid="24"/>
                                         </p:tgtEl>
@@ -11675,7 +11612,7 @@
                                     </p:anim>
                                     <p:anim calcmode="lin" valueType="num">
                                       <p:cBhvr>
-                                        <p:cTn id="131" dur="1000" fill="hold"/>
+                                        <p:cTn id="138" dur="1000" fill="hold"/>
                                         <p:tgtEl>
                                           <p:spTgt spid="24"/>
                                         </p:tgtEl>
@@ -11706,26 +11643,26 @@
                     </p:cTn>
                   </p:par>
                   <p:par>
-                    <p:cTn id="132" fill="hold">
+                    <p:cTn id="139" fill="hold">
                       <p:stCondLst>
                         <p:cond delay="indefinite"/>
                       </p:stCondLst>
                       <p:childTnLst>
                         <p:par>
-                          <p:cTn id="133" fill="hold">
+                          <p:cTn id="140" fill="hold">
                             <p:stCondLst>
                               <p:cond delay="0"/>
                             </p:stCondLst>
                             <p:childTnLst>
                               <p:par>
-                                <p:cTn id="134" presetID="2" presetClass="exit" presetSubtype="4" fill="hold" nodeType="clickEffect">
+                                <p:cTn id="141" presetID="2" presetClass="exit" presetSubtype="4" fill="hold" nodeType="clickEffect">
                                   <p:stCondLst>
                                     <p:cond delay="0"/>
                                   </p:stCondLst>
                                   <p:childTnLst>
                                     <p:anim calcmode="lin" valueType="num">
                                       <p:cBhvr additive="base">
-                                        <p:cTn id="135" dur="500"/>
+                                        <p:cTn id="142" dur="500"/>
                                         <p:tgtEl>
                                           <p:spTgt spid="24"/>
                                         </p:tgtEl>
@@ -11748,7 +11685,7 @@
                                     </p:anim>
                                     <p:anim calcmode="lin" valueType="num">
                                       <p:cBhvr additive="base">
-                                        <p:cTn id="136" dur="500"/>
+                                        <p:cTn id="143" dur="500"/>
                                         <p:tgtEl>
                                           <p:spTgt spid="24"/>
                                         </p:tgtEl>
@@ -11771,7 +11708,7 @@
                                     </p:anim>
                                     <p:set>
                                       <p:cBhvr>
-                                        <p:cTn id="137" dur="1" fill="hold">
+                                        <p:cTn id="144" dur="1" fill="hold">
                                           <p:stCondLst>
                                             <p:cond delay="499"/>
                                           </p:stCondLst>
@@ -11794,20 +11731,20 @@
                           </p:cTn>
                         </p:par>
                         <p:par>
-                          <p:cTn id="138" fill="hold">
+                          <p:cTn id="145" fill="hold">
                             <p:stCondLst>
                               <p:cond delay="500"/>
                             </p:stCondLst>
                             <p:childTnLst>
                               <p:par>
-                                <p:cTn id="139" presetID="47" presetClass="entr" presetSubtype="0" fill="hold" nodeType="afterEffect">
+                                <p:cTn id="146" presetID="47" presetClass="entr" presetSubtype="0" fill="hold" nodeType="afterEffect">
                                   <p:stCondLst>
                                     <p:cond delay="0"/>
                                   </p:stCondLst>
                                   <p:childTnLst>
                                     <p:set>
                                       <p:cBhvr>
-                                        <p:cTn id="140" dur="1" fill="hold">
+                                        <p:cTn id="147" dur="1" fill="hold">
                                           <p:stCondLst>
                                             <p:cond delay="0"/>
                                           </p:stCondLst>
@@ -11825,7 +11762,7 @@
                                     </p:set>
                                     <p:animEffect transition="in" filter="fade">
                                       <p:cBhvr>
-                                        <p:cTn id="141" dur="1000"/>
+                                        <p:cTn id="148" dur="1000"/>
                                         <p:tgtEl>
                                           <p:spTgt spid="25"/>
                                         </p:tgtEl>
@@ -11833,7 +11770,7 @@
                                     </p:animEffect>
                                     <p:anim calcmode="lin" valueType="num">
                                       <p:cBhvr>
-                                        <p:cTn id="142" dur="1000" fill="hold"/>
+                                        <p:cTn id="149" dur="1000" fill="hold"/>
                                         <p:tgtEl>
                                           <p:spTgt spid="25"/>
                                         </p:tgtEl>
@@ -11856,7 +11793,7 @@
                                     </p:anim>
                                     <p:anim calcmode="lin" valueType="num">
                                       <p:cBhvr>
-                                        <p:cTn id="143" dur="1000" fill="hold"/>
+                                        <p:cTn id="150" dur="1000" fill="hold"/>
                                         <p:tgtEl>
                                           <p:spTgt spid="25"/>
                                         </p:tgtEl>
@@ -11887,26 +11824,26 @@
                     </p:cTn>
                   </p:par>
                   <p:par>
-                    <p:cTn id="144" fill="hold">
+                    <p:cTn id="151" fill="hold">
                       <p:stCondLst>
                         <p:cond delay="indefinite"/>
                       </p:stCondLst>
                       <p:childTnLst>
                         <p:par>
-                          <p:cTn id="145" fill="hold">
+                          <p:cTn id="152" fill="hold">
                             <p:stCondLst>
                               <p:cond delay="0"/>
                             </p:stCondLst>
                             <p:childTnLst>
                               <p:par>
-                                <p:cTn id="146" presetID="2" presetClass="exit" presetSubtype="4" fill="hold" nodeType="clickEffect">
+                                <p:cTn id="153" presetID="2" presetClass="exit" presetSubtype="4" fill="hold" nodeType="clickEffect">
                                   <p:stCondLst>
                                     <p:cond delay="0"/>
                                   </p:stCondLst>
                                   <p:childTnLst>
                                     <p:anim calcmode="lin" valueType="num">
                                       <p:cBhvr additive="base">
-                                        <p:cTn id="147" dur="500"/>
+                                        <p:cTn id="154" dur="500"/>
                                         <p:tgtEl>
                                           <p:spTgt spid="25"/>
                                         </p:tgtEl>
@@ -11929,7 +11866,7 @@
                                     </p:anim>
                                     <p:anim calcmode="lin" valueType="num">
                                       <p:cBhvr additive="base">
-                                        <p:cTn id="148" dur="500"/>
+                                        <p:cTn id="155" dur="500"/>
                                         <p:tgtEl>
                                           <p:spTgt spid="25"/>
                                         </p:tgtEl>
@@ -11952,7 +11889,7 @@
                                     </p:anim>
                                     <p:set>
                                       <p:cBhvr>
-                                        <p:cTn id="149" dur="1" fill="hold">
+                                        <p:cTn id="156" dur="1" fill="hold">
                                           <p:stCondLst>
                                             <p:cond delay="499"/>
                                           </p:stCondLst>
@@ -11975,20 +11912,20 @@
                           </p:cTn>
                         </p:par>
                         <p:par>
-                          <p:cTn id="150" fill="hold">
+                          <p:cTn id="157" fill="hold">
                             <p:stCondLst>
                               <p:cond delay="500"/>
                             </p:stCondLst>
                             <p:childTnLst>
                               <p:par>
-                                <p:cTn id="151" presetID="22" presetClass="exit" presetSubtype="4" fill="hold" grpId="1" nodeType="afterEffect">
+                                <p:cTn id="158" presetID="22" presetClass="exit" presetSubtype="4" fill="hold" grpId="1" nodeType="afterEffect">
                                   <p:stCondLst>
                                     <p:cond delay="0"/>
                                   </p:stCondLst>
                                   <p:childTnLst>
                                     <p:animEffect transition="out" filter="wipe(down)">
                                       <p:cBhvr>
-                                        <p:cTn id="152" dur="500"/>
+                                        <p:cTn id="159" dur="500"/>
                                         <p:tgtEl>
                                           <p:spTgt spid="7"/>
                                         </p:tgtEl>
@@ -11996,7 +11933,7 @@
                                     </p:animEffect>
                                     <p:set>
                                       <p:cBhvr>
-                                        <p:cTn id="153" dur="1" fill="hold">
+                                        <p:cTn id="160" dur="1" fill="hold">
                                           <p:stCondLst>
                                             <p:cond delay="499"/>
                                           </p:stCondLst>
@@ -12019,20 +11956,20 @@
                           </p:cTn>
                         </p:par>
                         <p:par>
-                          <p:cTn id="154" fill="hold">
+                          <p:cTn id="161" fill="hold">
                             <p:stCondLst>
                               <p:cond delay="1000"/>
                             </p:stCondLst>
                             <p:childTnLst>
                               <p:par>
-                                <p:cTn id="155" presetID="22" presetClass="exit" presetSubtype="4" fill="hold" grpId="1" nodeType="afterEffect">
+                                <p:cTn id="162" presetID="22" presetClass="exit" presetSubtype="4" fill="hold" grpId="1" nodeType="afterEffect">
                                   <p:stCondLst>
                                     <p:cond delay="0"/>
                                   </p:stCondLst>
                                   <p:childTnLst>
                                     <p:animEffect transition="out" filter="wipe(down)">
                                       <p:cBhvr>
-                                        <p:cTn id="156" dur="500"/>
+                                        <p:cTn id="163" dur="500"/>
                                         <p:tgtEl>
                                           <p:spTgt spid="9"/>
                                         </p:tgtEl>
@@ -12040,7 +11977,7 @@
                                     </p:animEffect>
                                     <p:set>
                                       <p:cBhvr>
-                                        <p:cTn id="157" dur="1" fill="hold">
+                                        <p:cTn id="164" dur="1" fill="hold">
                                           <p:stCondLst>
                                             <p:cond delay="499"/>
                                           </p:stCondLst>
@@ -12063,20 +12000,20 @@
                           </p:cTn>
                         </p:par>
                         <p:par>
-                          <p:cTn id="158" fill="hold">
+                          <p:cTn id="165" fill="hold">
                             <p:stCondLst>
                               <p:cond delay="1500"/>
                             </p:stCondLst>
                             <p:childTnLst>
                               <p:par>
-                                <p:cTn id="159" presetID="22" presetClass="exit" presetSubtype="4" fill="hold" grpId="1" nodeType="afterEffect">
+                                <p:cTn id="166" presetID="22" presetClass="exit" presetSubtype="4" fill="hold" grpId="1" nodeType="afterEffect">
                                   <p:stCondLst>
                                     <p:cond delay="0"/>
                                   </p:stCondLst>
                                   <p:childTnLst>
                                     <p:animEffect transition="out" filter="wipe(down)">
                                       <p:cBhvr>
-                                        <p:cTn id="160" dur="500"/>
+                                        <p:cTn id="167" dur="500"/>
                                         <p:tgtEl>
                                           <p:spTgt spid="15"/>
                                         </p:tgtEl>
@@ -12084,7 +12021,7 @@
                                     </p:animEffect>
                                     <p:set>
                                       <p:cBhvr>
-                                        <p:cTn id="161" dur="1" fill="hold">
+                                        <p:cTn id="168" dur="1" fill="hold">
                                           <p:stCondLst>
                                             <p:cond delay="499"/>
                                           </p:stCondLst>
@@ -12107,20 +12044,20 @@
                           </p:cTn>
                         </p:par>
                         <p:par>
-                          <p:cTn id="162" fill="hold">
+                          <p:cTn id="169" fill="hold">
                             <p:stCondLst>
                               <p:cond delay="2000"/>
                             </p:stCondLst>
                             <p:childTnLst>
                               <p:par>
-                                <p:cTn id="163" presetID="22" presetClass="exit" presetSubtype="4" fill="hold" grpId="1" nodeType="afterEffect">
+                                <p:cTn id="170" presetID="22" presetClass="exit" presetSubtype="4" fill="hold" grpId="1" nodeType="afterEffect">
                                   <p:stCondLst>
                                     <p:cond delay="0"/>
                                   </p:stCondLst>
                                   <p:childTnLst>
                                     <p:animEffect transition="out" filter="wipe(down)">
                                       <p:cBhvr>
-                                        <p:cTn id="164" dur="500"/>
+                                        <p:cTn id="171" dur="500"/>
                                         <p:tgtEl>
                                           <p:spTgt spid="14"/>
                                         </p:tgtEl>
@@ -12128,7 +12065,7 @@
                                     </p:animEffect>
                                     <p:set>
                                       <p:cBhvr>
-                                        <p:cTn id="165" dur="1" fill="hold">
+                                        <p:cTn id="172" dur="1" fill="hold">
                                           <p:stCondLst>
                                             <p:cond delay="499"/>
                                           </p:stCondLst>
@@ -12151,20 +12088,20 @@
                           </p:cTn>
                         </p:par>
                         <p:par>
-                          <p:cTn id="166" fill="hold">
+                          <p:cTn id="173" fill="hold">
                             <p:stCondLst>
                               <p:cond delay="2500"/>
                             </p:stCondLst>
                             <p:childTnLst>
                               <p:par>
-                                <p:cTn id="167" presetID="14" presetClass="entr" presetSubtype="10" fill="hold" grpId="0" nodeType="afterEffect">
+                                <p:cTn id="174" presetID="14" presetClass="entr" presetSubtype="10" fill="hold" grpId="0" nodeType="afterEffect">
                                   <p:stCondLst>
                                     <p:cond delay="0"/>
                                   </p:stCondLst>
                                   <p:childTnLst>
                                     <p:set>
                                       <p:cBhvr>
-                                        <p:cTn id="168" dur="1" fill="hold">
+                                        <p:cTn id="175" dur="1" fill="hold">
                                           <p:stCondLst>
                                             <p:cond delay="0"/>
                                           </p:stCondLst>
@@ -12182,7 +12119,7 @@
                                     </p:set>
                                     <p:animEffect transition="in" filter="randombar(horizontal)">
                                       <p:cBhvr>
-                                        <p:cTn id="169" dur="500"/>
+                                        <p:cTn id="176" dur="500"/>
                                         <p:tgtEl>
                                           <p:spTgt spid="11"/>
                                         </p:tgtEl>
@@ -12195,20 +12132,20 @@
                           </p:cTn>
                         </p:par>
                         <p:par>
-                          <p:cTn id="170" fill="hold">
+                          <p:cTn id="177" fill="hold">
                             <p:stCondLst>
                               <p:cond delay="3000"/>
                             </p:stCondLst>
                             <p:childTnLst>
                               <p:par>
-                                <p:cTn id="171" presetID="47" presetClass="entr" presetSubtype="0" fill="hold" nodeType="afterEffect">
+                                <p:cTn id="178" presetID="47" presetClass="entr" presetSubtype="0" fill="hold" nodeType="afterEffect">
                                   <p:stCondLst>
                                     <p:cond delay="0"/>
                                   </p:stCondLst>
                                   <p:childTnLst>
                                     <p:set>
                                       <p:cBhvr>
-                                        <p:cTn id="172" dur="1" fill="hold">
+                                        <p:cTn id="179" dur="1" fill="hold">
                                           <p:stCondLst>
                                             <p:cond delay="0"/>
                                           </p:stCondLst>
@@ -12226,7 +12163,7 @@
                                     </p:set>
                                     <p:animEffect transition="in" filter="fade">
                                       <p:cBhvr>
-                                        <p:cTn id="173" dur="1000"/>
+                                        <p:cTn id="180" dur="1000"/>
                                         <p:tgtEl>
                                           <p:spTgt spid="26"/>
                                         </p:tgtEl>
@@ -12234,7 +12171,7 @@
                                     </p:animEffect>
                                     <p:anim calcmode="lin" valueType="num">
                                       <p:cBhvr>
-                                        <p:cTn id="174" dur="1000" fill="hold"/>
+                                        <p:cTn id="181" dur="1000" fill="hold"/>
                                         <p:tgtEl>
                                           <p:spTgt spid="26"/>
                                         </p:tgtEl>
@@ -12257,7 +12194,7 @@
                                     </p:anim>
                                     <p:anim calcmode="lin" valueType="num">
                                       <p:cBhvr>
-                                        <p:cTn id="175" dur="1000" fill="hold"/>
+                                        <p:cTn id="182" dur="1000" fill="hold"/>
                                         <p:tgtEl>
                                           <p:spTgt spid="26"/>
                                         </p:tgtEl>
@@ -12393,11 +12330,7 @@
           <a:p>
             <a:r>
               <a:rPr lang="es-ES" dirty="0"/>
-              <a:t>Diagrama </a:t>
-            </a:r>
-            <a:r>
-              <a:rPr lang="es-ES" dirty="0" smtClean="0"/>
-              <a:t>Entidad-Relación</a:t>
+              <a:t>Diagrama Entidad-Relación</a:t>
             </a:r>
             <a:endParaRPr lang="es-AR" dirty="0"/>
           </a:p>
@@ -12640,7 +12573,7 @@
           <a:p>
             <a:pPr lvl="0"/>
             <a:r>
-              <a:rPr lang="es-ES" dirty="0" smtClean="0"/>
+              <a:rPr lang="es-ES" dirty="0"/>
               <a:t>Gestión Cliente</a:t>
             </a:r>
             <a:endParaRPr lang="es-AR" dirty="0"/>
@@ -12648,36 +12581,23 @@
           <a:p>
             <a:pPr lvl="0"/>
             <a:r>
-              <a:rPr lang="es-ES" dirty="0" smtClean="0"/>
-              <a:t>Gestión </a:t>
+              <a:rPr lang="es-ES" dirty="0"/>
+              <a:t>Gestión Servicios Peluquería </a:t>
             </a:r>
+            <a:endParaRPr lang="es-AR" dirty="0"/>
+          </a:p>
+          <a:p>
+            <a:pPr lvl="0"/>
             <a:r>
               <a:rPr lang="es-ES" dirty="0"/>
-              <a:t>Servicios Peluquería </a:t>
+              <a:t>Gestión Servicios uñas </a:t>
             </a:r>
-            <a:endParaRPr lang="es-AR" dirty="0"/>
           </a:p>
           <a:p>
             <a:pPr lvl="0"/>
             <a:r>
-              <a:rPr lang="es-ES" dirty="0" smtClean="0"/>
-              <a:t>Gestión </a:t>
-            </a:r>
-            <a:r>
               <a:rPr lang="es-ES" dirty="0"/>
-              <a:t>Servicios uñas </a:t>
-            </a:r>
-            <a:endParaRPr lang="es-ES" dirty="0" smtClean="0"/>
-          </a:p>
-          <a:p>
-            <a:pPr lvl="0"/>
-            <a:r>
-              <a:rPr lang="es-ES" dirty="0" smtClean="0"/>
-              <a:t>Crear </a:t>
-            </a:r>
-            <a:r>
-              <a:rPr lang="es-ES" dirty="0"/>
-              <a:t>Turno </a:t>
+              <a:t>Crear Turno </a:t>
             </a:r>
             <a:endParaRPr lang="es-AR" dirty="0"/>
           </a:p>
@@ -12984,24 +12904,24 @@
               <a:buNone/>
             </a:pPr>
             <a:r>
-              <a:rPr lang="es-ES" dirty="0" smtClean="0"/>
+              <a:rPr lang="es-ES" dirty="0"/>
               <a:t>Versión 3.0</a:t>
             </a:r>
-            <a:endParaRPr lang="es-AR" dirty="0" smtClean="0"/>
+            <a:endParaRPr lang="es-AR" dirty="0"/>
           </a:p>
           <a:p>
             <a:r>
-              <a:rPr lang="es-ES" dirty="0" smtClean="0"/>
+              <a:rPr lang="es-ES" dirty="0"/>
               <a:t>Visualización de la cantidad de veces que un cliente asistió al local y ver el servicio que se realizo</a:t>
             </a:r>
-            <a:endParaRPr lang="es-AR" dirty="0" smtClean="0"/>
+            <a:endParaRPr lang="es-AR" dirty="0"/>
           </a:p>
           <a:p>
             <a:r>
-              <a:rPr lang="es-ES" dirty="0" smtClean="0"/>
+              <a:rPr lang="es-ES" dirty="0"/>
               <a:t>Ver cuadro de estadísticas de los turnos por día y las ventas por día. </a:t>
             </a:r>
-            <a:endParaRPr lang="es-AR" dirty="0" smtClean="0"/>
+            <a:endParaRPr lang="es-AR" dirty="0"/>
           </a:p>
           <a:p>
             <a:endParaRPr lang="es-AR" dirty="0"/>
@@ -13253,22 +13173,22 @@
               <a:buNone/>
             </a:pPr>
             <a:r>
-              <a:rPr lang="es-AR" dirty="0" smtClean="0"/>
+              <a:rPr lang="es-AR" dirty="0"/>
               <a:t>Versión 2.0</a:t>
             </a:r>
           </a:p>
           <a:p>
             <a:r>
-              <a:rPr lang="es-ES" dirty="0" smtClean="0"/>
+              <a:rPr lang="es-ES" dirty="0"/>
               <a:t>Gestión Ficha del cliente</a:t>
             </a:r>
           </a:p>
           <a:p>
             <a:r>
-              <a:rPr lang="es-ES" dirty="0" smtClean="0"/>
+              <a:rPr lang="es-ES" dirty="0"/>
               <a:t>Editar Turnos (cambiar el cliente, el servicio, el precio, hora de inicio y fin, fecha del turno)</a:t>
             </a:r>
-            <a:endParaRPr lang="es-AR" dirty="0" smtClean="0"/>
+            <a:endParaRPr lang="es-AR" dirty="0"/>
           </a:p>
           <a:p>
             <a:pPr marL="0" indent="0">
@@ -13276,10 +13196,10 @@
               <a:buNone/>
             </a:pPr>
             <a:r>
-              <a:rPr lang="es-ES" dirty="0" smtClean="0"/>
+              <a:rPr lang="es-ES" dirty="0"/>
               <a:t> </a:t>
             </a:r>
-            <a:endParaRPr lang="es-AR" dirty="0" smtClean="0"/>
+            <a:endParaRPr lang="es-AR" dirty="0"/>
           </a:p>
         </p:txBody>
       </p:sp>
@@ -15217,22 +15137,6 @@
               <a:defRPr/>
             </a:pPr>
             <a:r>
-              <a:rPr kumimoji="0" lang="es-AR" sz="1050" b="0" i="0" u="none" strike="noStrike" kern="0" cap="none" spc="0" normalizeH="0" baseline="0" noProof="0" dirty="0" smtClean="0">
-                <a:ln>
-                  <a:noFill/>
-                </a:ln>
-                <a:solidFill>
-                  <a:sysClr val="windowText" lastClr="000000"/>
-                </a:solidFill>
-                <a:effectLst/>
-                <a:uLnTx/>
-                <a:uFillTx/>
-                <a:ea typeface="Times New Roman" panose="02020603050405020304" pitchFamily="18" charset="0"/>
-                <a:cs typeface="Times New Roman" panose="02020603050405020304" pitchFamily="18" charset="0"/>
-              </a:rPr>
-              <a:t>lenguaje </a:t>
-            </a:r>
-            <a:r>
               <a:rPr kumimoji="0" lang="es-AR" sz="1050" b="0" i="0" u="none" strike="noStrike" kern="0" cap="none" spc="0" normalizeH="0" baseline="0" noProof="0" dirty="0">
                 <a:ln>
                   <a:noFill/>
@@ -15246,7 +15150,7 @@
                 <a:ea typeface="Times New Roman" panose="02020603050405020304" pitchFamily="18" charset="0"/>
                 <a:cs typeface="Times New Roman" panose="02020603050405020304" pitchFamily="18" charset="0"/>
               </a:rPr>
-              <a:t>principal de programación</a:t>
+              <a:t>lenguaje principal de programación</a:t>
             </a:r>
           </a:p>
         </p:txBody>
@@ -15601,18 +15505,13 @@
               </a:spcAft>
             </a:pPr>
             <a:r>
-              <a:rPr lang="es-AR" sz="1050" dirty="0" smtClean="0">
+              <a:rPr lang="es-AR" sz="1050" dirty="0">
                 <a:effectLst/>
                 <a:ea typeface="Times New Roman" panose="02020603050405020304" pitchFamily="18" charset="0"/>
                 <a:cs typeface="Times New Roman" panose="02020603050405020304" pitchFamily="18" charset="0"/>
               </a:rPr>
               <a:t>Librería utilizada para estilos y clases del sistema.</a:t>
             </a:r>
-            <a:endParaRPr lang="es-AR" sz="1050" dirty="0">
-              <a:effectLst/>
-              <a:ea typeface="Times New Roman" panose="02020603050405020304" pitchFamily="18" charset="0"/>
-              <a:cs typeface="Times New Roman" panose="02020603050405020304" pitchFamily="18" charset="0"/>
-            </a:endParaRPr>
           </a:p>
         </p:txBody>
       </p:sp>
@@ -15853,21 +15752,30 @@
                             </p:childTnLst>
                           </p:cTn>
                         </p:par>
+                      </p:childTnLst>
+                    </p:cTn>
+                  </p:par>
+                  <p:par>
+                    <p:cTn id="8" fill="hold">
+                      <p:stCondLst>
+                        <p:cond delay="indefinite"/>
+                      </p:stCondLst>
+                      <p:childTnLst>
                         <p:par>
-                          <p:cTn id="8" fill="hold">
+                          <p:cTn id="9" fill="hold">
                             <p:stCondLst>
-                              <p:cond delay="2000"/>
+                              <p:cond delay="0"/>
                             </p:stCondLst>
                             <p:childTnLst>
                               <p:par>
-                                <p:cTn id="9" presetID="26" presetClass="entr" presetSubtype="0" fill="hold" nodeType="afterEffect">
+                                <p:cTn id="10" presetID="26" presetClass="entr" presetSubtype="0" fill="hold" nodeType="clickEffect">
                                   <p:stCondLst>
                                     <p:cond delay="0"/>
                                   </p:stCondLst>
                                   <p:childTnLst>
                                     <p:set>
                                       <p:cBhvr>
-                                        <p:cTn id="10" dur="1" fill="hold">
+                                        <p:cTn id="11" dur="1" fill="hold">
                                           <p:stCondLst>
                                             <p:cond delay="0"/>
                                           </p:stCondLst>
@@ -15885,7 +15793,7 @@
                                     </p:set>
                                     <p:animEffect transition="in" filter="wipe(down)">
                                       <p:cBhvr>
-                                        <p:cTn id="11" dur="580">
+                                        <p:cTn id="12" dur="580">
                                           <p:stCondLst>
                                             <p:cond delay="0"/>
                                           </p:stCondLst>
@@ -15897,7 +15805,7 @@
                                     </p:animEffect>
                                     <p:anim calcmode="lin" valueType="num">
                                       <p:cBhvr>
-                                        <p:cTn id="12" dur="1822" tmFilter="0,0; 0.14,0.36; 0.43,0.73; 0.71,0.91; 1.0,1.0">
+                                        <p:cTn id="13" dur="1822" tmFilter="0,0; 0.14,0.36; 0.43,0.73; 0.71,0.91; 1.0,1.0">
                                           <p:stCondLst>
                                             <p:cond delay="0"/>
                                           </p:stCondLst>
@@ -15924,7 +15832,7 @@
                                     </p:anim>
                                     <p:anim calcmode="lin" valueType="num">
                                       <p:cBhvr>
-                                        <p:cTn id="13" dur="664" tmFilter="0.0,0.0; 0.25,0.07; 0.50,0.2; 0.75,0.467; 1.0,1.0">
+                                        <p:cTn id="14" dur="664" tmFilter="0.0,0.0; 0.25,0.07; 0.50,0.2; 0.75,0.467; 1.0,1.0">
                                           <p:stCondLst>
                                             <p:cond delay="0"/>
                                           </p:stCondLst>
@@ -15951,7 +15859,7 @@
                                     </p:anim>
                                     <p:anim calcmode="lin" valueType="num">
                                       <p:cBhvr>
-                                        <p:cTn id="14" dur="664" tmFilter="0, 0; 0.125,0.2665; 0.25,0.4; 0.375,0.465; 0.5,0.5;  0.625,0.535; 0.75,0.6; 0.875,0.7335; 1,1">
+                                        <p:cTn id="15" dur="664" tmFilter="0, 0; 0.125,0.2665; 0.25,0.4; 0.375,0.465; 0.5,0.5;  0.625,0.535; 0.75,0.6; 0.875,0.7335; 1,1">
                                           <p:stCondLst>
                                             <p:cond delay="664"/>
                                           </p:stCondLst>
@@ -15978,7 +15886,7 @@
                                     </p:anim>
                                     <p:anim calcmode="lin" valueType="num">
                                       <p:cBhvr>
-                                        <p:cTn id="15" dur="332" tmFilter="0, 0; 0.125,0.2665; 0.25,0.4; 0.375,0.465; 0.5,0.5;  0.625,0.535; 0.75,0.6; 0.875,0.7335; 1,1">
+                                        <p:cTn id="16" dur="332" tmFilter="0, 0; 0.125,0.2665; 0.25,0.4; 0.375,0.465; 0.5,0.5;  0.625,0.535; 0.75,0.6; 0.875,0.7335; 1,1">
                                           <p:stCondLst>
                                             <p:cond delay="1324"/>
                                           </p:stCondLst>
@@ -16005,7 +15913,7 @@
                                     </p:anim>
                                     <p:anim calcmode="lin" valueType="num">
                                       <p:cBhvr>
-                                        <p:cTn id="16" dur="164" tmFilter="0, 0; 0.125,0.2665; 0.25,0.4; 0.375,0.465; 0.5,0.5;  0.625,0.535; 0.75,0.6; 0.875,0.7335; 1,1">
+                                        <p:cTn id="17" dur="164" tmFilter="0, 0; 0.125,0.2665; 0.25,0.4; 0.375,0.465; 0.5,0.5;  0.625,0.535; 0.75,0.6; 0.875,0.7335; 1,1">
                                           <p:stCondLst>
                                             <p:cond delay="1656"/>
                                           </p:stCondLst>
@@ -16032,7 +15940,7 @@
                                     </p:anim>
                                     <p:animScale>
                                       <p:cBhvr>
-                                        <p:cTn id="17" dur="26">
+                                        <p:cTn id="18" dur="26">
                                           <p:stCondLst>
                                             <p:cond delay="650"/>
                                           </p:stCondLst>
@@ -16045,7 +15953,7 @@
                                     </p:animScale>
                                     <p:animScale>
                                       <p:cBhvr>
-                                        <p:cTn id="18" dur="166" decel="50000">
+                                        <p:cTn id="19" dur="166" decel="50000">
                                           <p:stCondLst>
                                             <p:cond delay="676"/>
                                           </p:stCondLst>
@@ -16058,7 +15966,7 @@
                                     </p:animScale>
                                     <p:animScale>
                                       <p:cBhvr>
-                                        <p:cTn id="19" dur="26">
+                                        <p:cTn id="20" dur="26">
                                           <p:stCondLst>
                                             <p:cond delay="1312"/>
                                           </p:stCondLst>
@@ -16071,7 +15979,7 @@
                                     </p:animScale>
                                     <p:animScale>
                                       <p:cBhvr>
-                                        <p:cTn id="20" dur="166" decel="50000">
+                                        <p:cTn id="21" dur="166" decel="50000">
                                           <p:stCondLst>
                                             <p:cond delay="1338"/>
                                           </p:stCondLst>
@@ -16084,7 +15992,7 @@
                                     </p:animScale>
                                     <p:animScale>
                                       <p:cBhvr>
-                                        <p:cTn id="21" dur="26">
+                                        <p:cTn id="22" dur="26">
                                           <p:stCondLst>
                                             <p:cond delay="1642"/>
                                           </p:stCondLst>
@@ -16097,7 +16005,7 @@
                                     </p:animScale>
                                     <p:animScale>
                                       <p:cBhvr>
-                                        <p:cTn id="22" dur="166" decel="50000">
+                                        <p:cTn id="23" dur="166" decel="50000">
                                           <p:stCondLst>
                                             <p:cond delay="1668"/>
                                           </p:stCondLst>
@@ -16110,7 +16018,7 @@
                                     </p:animScale>
                                     <p:animScale>
                                       <p:cBhvr>
-                                        <p:cTn id="23" dur="26">
+                                        <p:cTn id="24" dur="26">
                                           <p:stCondLst>
                                             <p:cond delay="1808"/>
                                           </p:stCondLst>
@@ -16123,7 +16031,7 @@
                                     </p:animScale>
                                     <p:animScale>
                                       <p:cBhvr>
-                                        <p:cTn id="24" dur="166" decel="50000">
+                                        <p:cTn id="25" dur="166" decel="50000">
                                           <p:stCondLst>
                                             <p:cond delay="1834"/>
                                           </p:stCondLst>
@@ -16140,23 +16048,14 @@
                             </p:childTnLst>
                           </p:cTn>
                         </p:par>
-                      </p:childTnLst>
-                    </p:cTn>
-                  </p:par>
-                  <p:par>
-                    <p:cTn id="25" fill="hold">
-                      <p:stCondLst>
-                        <p:cond delay="indefinite"/>
-                      </p:stCondLst>
-                      <p:childTnLst>
                         <p:par>
                           <p:cTn id="26" fill="hold">
                             <p:stCondLst>
-                              <p:cond delay="0"/>
+                              <p:cond delay="2000"/>
                             </p:stCondLst>
                             <p:childTnLst>
                               <p:par>
-                                <p:cTn id="27" presetID="9" presetClass="entr" presetSubtype="0" fill="hold" grpId="0" nodeType="clickEffect">
+                                <p:cTn id="27" presetID="9" presetClass="entr" presetSubtype="0" fill="hold" grpId="0" nodeType="afterEffect">
                                   <p:stCondLst>
                                     <p:cond delay="0"/>
                                   </p:stCondLst>
@@ -16184,428 +16083,6 @@
                                         <p:cTn id="29" dur="500"/>
                                         <p:tgtEl>
                                           <p:spTgt spid="18"/>
-                                        </p:tgtEl>
-                                      </p:cBhvr>
-                                    </p:animEffect>
-                                  </p:childTnLst>
-                                </p:cTn>
-                              </p:par>
-                            </p:childTnLst>
-                          </p:cTn>
-                        </p:par>
-                        <p:par>
-                          <p:cTn id="30" fill="hold">
-                            <p:stCondLst>
-                              <p:cond delay="500"/>
-                            </p:stCondLst>
-                            <p:childTnLst>
-                              <p:par>
-                                <p:cTn id="31" presetID="35" presetClass="entr" presetSubtype="0" fill="hold" nodeType="afterEffect">
-                                  <p:stCondLst>
-                                    <p:cond delay="0"/>
-                                  </p:stCondLst>
-                                  <p:childTnLst>
-                                    <p:set>
-                                      <p:cBhvr>
-                                        <p:cTn id="32" dur="1" fill="hold">
-                                          <p:stCondLst>
-                                            <p:cond delay="0"/>
-                                          </p:stCondLst>
-                                        </p:cTn>
-                                        <p:tgtEl>
-                                          <p:spTgt spid="8"/>
-                                        </p:tgtEl>
-                                        <p:attrNameLst>
-                                          <p:attrName>style.visibility</p:attrName>
-                                        </p:attrNameLst>
-                                      </p:cBhvr>
-                                      <p:to>
-                                        <p:strVal val="visible"/>
-                                      </p:to>
-                                    </p:set>
-                                    <p:animEffect transition="in" filter="fade">
-                                      <p:cBhvr>
-                                        <p:cTn id="33" dur="2000"/>
-                                        <p:tgtEl>
-                                          <p:spTgt spid="8"/>
-                                        </p:tgtEl>
-                                      </p:cBhvr>
-                                    </p:animEffect>
-                                    <p:anim calcmode="lin" valueType="num">
-                                      <p:cBhvr>
-                                        <p:cTn id="34" dur="2000" fill="hold"/>
-                                        <p:tgtEl>
-                                          <p:spTgt spid="8"/>
-                                        </p:tgtEl>
-                                        <p:attrNameLst>
-                                          <p:attrName>style.rotation</p:attrName>
-                                        </p:attrNameLst>
-                                      </p:cBhvr>
-                                      <p:tavLst>
-                                        <p:tav tm="0">
-                                          <p:val>
-                                            <p:fltVal val="720"/>
-                                          </p:val>
-                                        </p:tav>
-                                        <p:tav tm="100000">
-                                          <p:val>
-                                            <p:fltVal val="0"/>
-                                          </p:val>
-                                        </p:tav>
-                                      </p:tavLst>
-                                    </p:anim>
-                                    <p:anim calcmode="lin" valueType="num">
-                                      <p:cBhvr>
-                                        <p:cTn id="35" dur="2000" fill="hold"/>
-                                        <p:tgtEl>
-                                          <p:spTgt spid="8"/>
-                                        </p:tgtEl>
-                                        <p:attrNameLst>
-                                          <p:attrName>ppt_h</p:attrName>
-                                        </p:attrNameLst>
-                                      </p:cBhvr>
-                                      <p:tavLst>
-                                        <p:tav tm="0">
-                                          <p:val>
-                                            <p:fltVal val="0"/>
-                                          </p:val>
-                                        </p:tav>
-                                        <p:tav tm="100000">
-                                          <p:val>
-                                            <p:strVal val="#ppt_h"/>
-                                          </p:val>
-                                        </p:tav>
-                                      </p:tavLst>
-                                    </p:anim>
-                                    <p:anim calcmode="lin" valueType="num">
-                                      <p:cBhvr>
-                                        <p:cTn id="36" dur="2000" fill="hold"/>
-                                        <p:tgtEl>
-                                          <p:spTgt spid="8"/>
-                                        </p:tgtEl>
-                                        <p:attrNameLst>
-                                          <p:attrName>ppt_w</p:attrName>
-                                        </p:attrNameLst>
-                                      </p:cBhvr>
-                                      <p:tavLst>
-                                        <p:tav tm="0">
-                                          <p:val>
-                                            <p:fltVal val="0"/>
-                                          </p:val>
-                                        </p:tav>
-                                        <p:tav tm="100000">
-                                          <p:val>
-                                            <p:strVal val="#ppt_w"/>
-                                          </p:val>
-                                        </p:tav>
-                                      </p:tavLst>
-                                    </p:anim>
-                                  </p:childTnLst>
-                                </p:cTn>
-                              </p:par>
-                            </p:childTnLst>
-                          </p:cTn>
-                        </p:par>
-                      </p:childTnLst>
-                    </p:cTn>
-                  </p:par>
-                  <p:par>
-                    <p:cTn id="37" fill="hold">
-                      <p:stCondLst>
-                        <p:cond delay="indefinite"/>
-                      </p:stCondLst>
-                      <p:childTnLst>
-                        <p:par>
-                          <p:cTn id="38" fill="hold">
-                            <p:stCondLst>
-                              <p:cond delay="0"/>
-                            </p:stCondLst>
-                            <p:childTnLst>
-                              <p:par>
-                                <p:cTn id="39" presetID="9" presetClass="entr" presetSubtype="0" fill="hold" grpId="0" nodeType="clickEffect">
-                                  <p:stCondLst>
-                                    <p:cond delay="0"/>
-                                  </p:stCondLst>
-                                  <p:childTnLst>
-                                    <p:set>
-                                      <p:cBhvr>
-                                        <p:cTn id="40" dur="1" fill="hold">
-                                          <p:stCondLst>
-                                            <p:cond delay="0"/>
-                                          </p:stCondLst>
-                                        </p:cTn>
-                                        <p:tgtEl>
-                                          <p:spTgt spid="14"/>
-                                        </p:tgtEl>
-                                        <p:attrNameLst>
-                                          <p:attrName>style.visibility</p:attrName>
-                                        </p:attrNameLst>
-                                      </p:cBhvr>
-                                      <p:to>
-                                        <p:strVal val="visible"/>
-                                      </p:to>
-                                    </p:set>
-                                    <p:animEffect transition="in" filter="dissolve">
-                                      <p:cBhvr>
-                                        <p:cTn id="41" dur="500"/>
-                                        <p:tgtEl>
-                                          <p:spTgt spid="14"/>
-                                        </p:tgtEl>
-                                      </p:cBhvr>
-                                    </p:animEffect>
-                                  </p:childTnLst>
-                                </p:cTn>
-                              </p:par>
-                            </p:childTnLst>
-                          </p:cTn>
-                        </p:par>
-                        <p:par>
-                          <p:cTn id="42" fill="hold">
-                            <p:stCondLst>
-                              <p:cond delay="500"/>
-                            </p:stCondLst>
-                            <p:childTnLst>
-                              <p:par>
-                                <p:cTn id="43" presetID="42" presetClass="entr" presetSubtype="0" fill="hold" nodeType="afterEffect">
-                                  <p:stCondLst>
-                                    <p:cond delay="0"/>
-                                  </p:stCondLst>
-                                  <p:childTnLst>
-                                    <p:set>
-                                      <p:cBhvr>
-                                        <p:cTn id="44" dur="1" fill="hold">
-                                          <p:stCondLst>
-                                            <p:cond delay="0"/>
-                                          </p:stCondLst>
-                                        </p:cTn>
-                                        <p:tgtEl>
-                                          <p:spTgt spid="12"/>
-                                        </p:tgtEl>
-                                        <p:attrNameLst>
-                                          <p:attrName>style.visibility</p:attrName>
-                                        </p:attrNameLst>
-                                      </p:cBhvr>
-                                      <p:to>
-                                        <p:strVal val="visible"/>
-                                      </p:to>
-                                    </p:set>
-                                    <p:animEffect transition="in" filter="fade">
-                                      <p:cBhvr>
-                                        <p:cTn id="45" dur="1000"/>
-                                        <p:tgtEl>
-                                          <p:spTgt spid="12"/>
-                                        </p:tgtEl>
-                                      </p:cBhvr>
-                                    </p:animEffect>
-                                    <p:anim calcmode="lin" valueType="num">
-                                      <p:cBhvr>
-                                        <p:cTn id="46" dur="1000" fill="hold"/>
-                                        <p:tgtEl>
-                                          <p:spTgt spid="12"/>
-                                        </p:tgtEl>
-                                        <p:attrNameLst>
-                                          <p:attrName>ppt_x</p:attrName>
-                                        </p:attrNameLst>
-                                      </p:cBhvr>
-                                      <p:tavLst>
-                                        <p:tav tm="0">
-                                          <p:val>
-                                            <p:strVal val="#ppt_x"/>
-                                          </p:val>
-                                        </p:tav>
-                                        <p:tav tm="100000">
-                                          <p:val>
-                                            <p:strVal val="#ppt_x"/>
-                                          </p:val>
-                                        </p:tav>
-                                      </p:tavLst>
-                                    </p:anim>
-                                    <p:anim calcmode="lin" valueType="num">
-                                      <p:cBhvr>
-                                        <p:cTn id="47" dur="1000" fill="hold"/>
-                                        <p:tgtEl>
-                                          <p:spTgt spid="12"/>
-                                        </p:tgtEl>
-                                        <p:attrNameLst>
-                                          <p:attrName>ppt_y</p:attrName>
-                                        </p:attrNameLst>
-                                      </p:cBhvr>
-                                      <p:tavLst>
-                                        <p:tav tm="0">
-                                          <p:val>
-                                            <p:strVal val="#ppt_y+.1"/>
-                                          </p:val>
-                                        </p:tav>
-                                        <p:tav tm="100000">
-                                          <p:val>
-                                            <p:strVal val="#ppt_y"/>
-                                          </p:val>
-                                        </p:tav>
-                                      </p:tavLst>
-                                    </p:anim>
-                                  </p:childTnLst>
-                                </p:cTn>
-                              </p:par>
-                            </p:childTnLst>
-                          </p:cTn>
-                        </p:par>
-                      </p:childTnLst>
-                    </p:cTn>
-                  </p:par>
-                  <p:par>
-                    <p:cTn id="48" fill="hold">
-                      <p:stCondLst>
-                        <p:cond delay="indefinite"/>
-                      </p:stCondLst>
-                      <p:childTnLst>
-                        <p:par>
-                          <p:cTn id="49" fill="hold">
-                            <p:stCondLst>
-                              <p:cond delay="0"/>
-                            </p:stCondLst>
-                            <p:childTnLst>
-                              <p:par>
-                                <p:cTn id="50" presetID="9" presetClass="entr" presetSubtype="0" fill="hold" grpId="0" nodeType="clickEffect">
-                                  <p:stCondLst>
-                                    <p:cond delay="0"/>
-                                  </p:stCondLst>
-                                  <p:childTnLst>
-                                    <p:set>
-                                      <p:cBhvr>
-                                        <p:cTn id="51" dur="1" fill="hold">
-                                          <p:stCondLst>
-                                            <p:cond delay="0"/>
-                                          </p:stCondLst>
-                                        </p:cTn>
-                                        <p:tgtEl>
-                                          <p:spTgt spid="16"/>
-                                        </p:tgtEl>
-                                        <p:attrNameLst>
-                                          <p:attrName>style.visibility</p:attrName>
-                                        </p:attrNameLst>
-                                      </p:cBhvr>
-                                      <p:to>
-                                        <p:strVal val="visible"/>
-                                      </p:to>
-                                    </p:set>
-                                    <p:animEffect transition="in" filter="dissolve">
-                                      <p:cBhvr>
-                                        <p:cTn id="52" dur="500"/>
-                                        <p:tgtEl>
-                                          <p:spTgt spid="16"/>
-                                        </p:tgtEl>
-                                      </p:cBhvr>
-                                    </p:animEffect>
-                                  </p:childTnLst>
-                                </p:cTn>
-                              </p:par>
-                            </p:childTnLst>
-                          </p:cTn>
-                        </p:par>
-                        <p:par>
-                          <p:cTn id="53" fill="hold">
-                            <p:stCondLst>
-                              <p:cond delay="500"/>
-                            </p:stCondLst>
-                            <p:childTnLst>
-                              <p:par>
-                                <p:cTn id="54" presetID="31" presetClass="entr" presetSubtype="0" fill="hold" nodeType="afterEffect">
-                                  <p:stCondLst>
-                                    <p:cond delay="0"/>
-                                  </p:stCondLst>
-                                  <p:childTnLst>
-                                    <p:set>
-                                      <p:cBhvr>
-                                        <p:cTn id="55" dur="1" fill="hold">
-                                          <p:stCondLst>
-                                            <p:cond delay="0"/>
-                                          </p:stCondLst>
-                                        </p:cTn>
-                                        <p:tgtEl>
-                                          <p:spTgt spid="7"/>
-                                        </p:tgtEl>
-                                        <p:attrNameLst>
-                                          <p:attrName>style.visibility</p:attrName>
-                                        </p:attrNameLst>
-                                      </p:cBhvr>
-                                      <p:to>
-                                        <p:strVal val="visible"/>
-                                      </p:to>
-                                    </p:set>
-                                    <p:anim calcmode="lin" valueType="num">
-                                      <p:cBhvr>
-                                        <p:cTn id="56" dur="1000" fill="hold"/>
-                                        <p:tgtEl>
-                                          <p:spTgt spid="7"/>
-                                        </p:tgtEl>
-                                        <p:attrNameLst>
-                                          <p:attrName>ppt_w</p:attrName>
-                                        </p:attrNameLst>
-                                      </p:cBhvr>
-                                      <p:tavLst>
-                                        <p:tav tm="0">
-                                          <p:val>
-                                            <p:fltVal val="0"/>
-                                          </p:val>
-                                        </p:tav>
-                                        <p:tav tm="100000">
-                                          <p:val>
-                                            <p:strVal val="#ppt_w"/>
-                                          </p:val>
-                                        </p:tav>
-                                      </p:tavLst>
-                                    </p:anim>
-                                    <p:anim calcmode="lin" valueType="num">
-                                      <p:cBhvr>
-                                        <p:cTn id="57" dur="1000" fill="hold"/>
-                                        <p:tgtEl>
-                                          <p:spTgt spid="7"/>
-                                        </p:tgtEl>
-                                        <p:attrNameLst>
-                                          <p:attrName>ppt_h</p:attrName>
-                                        </p:attrNameLst>
-                                      </p:cBhvr>
-                                      <p:tavLst>
-                                        <p:tav tm="0">
-                                          <p:val>
-                                            <p:fltVal val="0"/>
-                                          </p:val>
-                                        </p:tav>
-                                        <p:tav tm="100000">
-                                          <p:val>
-                                            <p:strVal val="#ppt_h"/>
-                                          </p:val>
-                                        </p:tav>
-                                      </p:tavLst>
-                                    </p:anim>
-                                    <p:anim calcmode="lin" valueType="num">
-                                      <p:cBhvr>
-                                        <p:cTn id="58" dur="1000" fill="hold"/>
-                                        <p:tgtEl>
-                                          <p:spTgt spid="7"/>
-                                        </p:tgtEl>
-                                        <p:attrNameLst>
-                                          <p:attrName>style.rotation</p:attrName>
-                                        </p:attrNameLst>
-                                      </p:cBhvr>
-                                      <p:tavLst>
-                                        <p:tav tm="0">
-                                          <p:val>
-                                            <p:fltVal val="90"/>
-                                          </p:val>
-                                        </p:tav>
-                                        <p:tav tm="100000">
-                                          <p:val>
-                                            <p:fltVal val="0"/>
-                                          </p:val>
-                                        </p:tav>
-                                      </p:tavLst>
-                                    </p:anim>
-                                    <p:animEffect transition="in" filter="fade">
-                                      <p:cBhvr>
-                                        <p:cTn id="59" dur="1000"/>
-                                        <p:tgtEl>
-                                          <p:spTgt spid="7"/>
                                         </p:tgtEl>
                                       </p:cBhvr>
                                     </p:animEffect>
@@ -16619,32 +16096,32 @@
                     </p:cTn>
                   </p:par>
                   <p:par>
-                    <p:cTn id="60" fill="hold">
+                    <p:cTn id="30" fill="hold">
                       <p:stCondLst>
                         <p:cond delay="indefinite"/>
                       </p:stCondLst>
                       <p:childTnLst>
                         <p:par>
-                          <p:cTn id="61" fill="hold">
+                          <p:cTn id="31" fill="hold">
                             <p:stCondLst>
                               <p:cond delay="0"/>
                             </p:stCondLst>
                             <p:childTnLst>
                               <p:par>
-                                <p:cTn id="62" presetID="9" presetClass="entr" presetSubtype="0" fill="hold" grpId="0" nodeType="clickEffect">
+                                <p:cTn id="32" presetID="35" presetClass="entr" presetSubtype="0" fill="hold" nodeType="clickEffect">
                                   <p:stCondLst>
                                     <p:cond delay="0"/>
                                   </p:stCondLst>
                                   <p:childTnLst>
                                     <p:set>
                                       <p:cBhvr>
-                                        <p:cTn id="63" dur="1" fill="hold">
+                                        <p:cTn id="33" dur="1" fill="hold">
                                           <p:stCondLst>
                                             <p:cond delay="0"/>
                                           </p:stCondLst>
                                         </p:cTn>
                                         <p:tgtEl>
-                                          <p:spTgt spid="19"/>
+                                          <p:spTgt spid="8"/>
                                         </p:tgtEl>
                                         <p:attrNameLst>
                                           <p:attrName>style.visibility</p:attrName>
@@ -16654,14 +16131,83 @@
                                         <p:strVal val="visible"/>
                                       </p:to>
                                     </p:set>
-                                    <p:animEffect transition="in" filter="dissolve">
-                                      <p:cBhvr>
-                                        <p:cTn id="64" dur="500"/>
-                                        <p:tgtEl>
-                                          <p:spTgt spid="19"/>
+                                    <p:animEffect transition="in" filter="fade">
+                                      <p:cBhvr>
+                                        <p:cTn id="34" dur="2000"/>
+                                        <p:tgtEl>
+                                          <p:spTgt spid="8"/>
                                         </p:tgtEl>
                                       </p:cBhvr>
                                     </p:animEffect>
+                                    <p:anim calcmode="lin" valueType="num">
+                                      <p:cBhvr>
+                                        <p:cTn id="35" dur="2000" fill="hold"/>
+                                        <p:tgtEl>
+                                          <p:spTgt spid="8"/>
+                                        </p:tgtEl>
+                                        <p:attrNameLst>
+                                          <p:attrName>style.rotation</p:attrName>
+                                        </p:attrNameLst>
+                                      </p:cBhvr>
+                                      <p:tavLst>
+                                        <p:tav tm="0">
+                                          <p:val>
+                                            <p:fltVal val="720"/>
+                                          </p:val>
+                                        </p:tav>
+                                        <p:tav tm="100000">
+                                          <p:val>
+                                            <p:fltVal val="0"/>
+                                          </p:val>
+                                        </p:tav>
+                                      </p:tavLst>
+                                    </p:anim>
+                                    <p:anim calcmode="lin" valueType="num">
+                                      <p:cBhvr>
+                                        <p:cTn id="36" dur="2000" fill="hold"/>
+                                        <p:tgtEl>
+                                          <p:spTgt spid="8"/>
+                                        </p:tgtEl>
+                                        <p:attrNameLst>
+                                          <p:attrName>ppt_h</p:attrName>
+                                        </p:attrNameLst>
+                                      </p:cBhvr>
+                                      <p:tavLst>
+                                        <p:tav tm="0">
+                                          <p:val>
+                                            <p:fltVal val="0"/>
+                                          </p:val>
+                                        </p:tav>
+                                        <p:tav tm="100000">
+                                          <p:val>
+                                            <p:strVal val="#ppt_h"/>
+                                          </p:val>
+                                        </p:tav>
+                                      </p:tavLst>
+                                    </p:anim>
+                                    <p:anim calcmode="lin" valueType="num">
+                                      <p:cBhvr>
+                                        <p:cTn id="37" dur="2000" fill="hold"/>
+                                        <p:tgtEl>
+                                          <p:spTgt spid="8"/>
+                                        </p:tgtEl>
+                                        <p:attrNameLst>
+                                          <p:attrName>ppt_w</p:attrName>
+                                        </p:attrNameLst>
+                                      </p:cBhvr>
+                                      <p:tavLst>
+                                        <p:tav tm="0">
+                                          <p:val>
+                                            <p:fltVal val="0"/>
+                                          </p:val>
+                                        </p:tav>
+                                        <p:tav tm="100000">
+                                          <p:val>
+                                            <p:strVal val="#ppt_w"/>
+                                          </p:val>
+                                        </p:tav>
+                                      </p:tavLst>
+                                    </p:anim>
                                   </p:childTnLst>
                                 </p:cTn>
                               </p:par>
@@ -16669,26 +16215,26 @@
                           </p:cTn>
                         </p:par>
                         <p:par>
-                          <p:cTn id="65" fill="hold">
+                          <p:cTn id="38" fill="hold">
                             <p:stCondLst>
-                              <p:cond delay="500"/>
+                              <p:cond delay="2000"/>
                             </p:stCondLst>
                             <p:childTnLst>
                               <p:par>
-                                <p:cTn id="66" presetID="3" presetClass="entr" presetSubtype="10" fill="hold" nodeType="afterEffect">
+                                <p:cTn id="39" presetID="9" presetClass="entr" presetSubtype="0" fill="hold" grpId="0" nodeType="afterEffect">
                                   <p:stCondLst>
                                     <p:cond delay="0"/>
                                   </p:stCondLst>
                                   <p:childTnLst>
                                     <p:set>
                                       <p:cBhvr>
-                                        <p:cTn id="67" dur="1" fill="hold">
+                                        <p:cTn id="40" dur="1" fill="hold">
                                           <p:stCondLst>
                                             <p:cond delay="0"/>
                                           </p:stCondLst>
                                         </p:cTn>
                                         <p:tgtEl>
-                                          <p:spTgt spid="11"/>
+                                          <p:spTgt spid="14"/>
                                         </p:tgtEl>
                                         <p:attrNameLst>
                                           <p:attrName>style.visibility</p:attrName>
@@ -16698,11 +16244,11 @@
                                         <p:strVal val="visible"/>
                                       </p:to>
                                     </p:set>
-                                    <p:animEffect transition="in" filter="blinds(horizontal)">
-                                      <p:cBhvr>
-                                        <p:cTn id="68" dur="500"/>
-                                        <p:tgtEl>
-                                          <p:spTgt spid="11"/>
+                                    <p:animEffect transition="in" filter="dissolve">
+                                      <p:cBhvr>
+                                        <p:cTn id="41" dur="500"/>
+                                        <p:tgtEl>
+                                          <p:spTgt spid="14"/>
                                         </p:tgtEl>
                                       </p:cBhvr>
                                     </p:animEffect>
@@ -16716,32 +16262,32 @@
                     </p:cTn>
                   </p:par>
                   <p:par>
-                    <p:cTn id="69" fill="hold">
+                    <p:cTn id="42" fill="hold">
                       <p:stCondLst>
                         <p:cond delay="indefinite"/>
                       </p:stCondLst>
                       <p:childTnLst>
                         <p:par>
-                          <p:cTn id="70" fill="hold">
+                          <p:cTn id="43" fill="hold">
                             <p:stCondLst>
                               <p:cond delay="0"/>
                             </p:stCondLst>
                             <p:childTnLst>
                               <p:par>
-                                <p:cTn id="71" presetID="9" presetClass="entr" presetSubtype="0" fill="hold" grpId="0" nodeType="clickEffect">
+                                <p:cTn id="44" presetID="42" presetClass="entr" presetSubtype="0" fill="hold" nodeType="clickEffect">
                                   <p:stCondLst>
                                     <p:cond delay="0"/>
                                   </p:stCondLst>
                                   <p:childTnLst>
                                     <p:set>
                                       <p:cBhvr>
-                                        <p:cTn id="72" dur="1" fill="hold">
+                                        <p:cTn id="45" dur="1" fill="hold">
                                           <p:stCondLst>
                                             <p:cond delay="0"/>
                                           </p:stCondLst>
                                         </p:cTn>
                                         <p:tgtEl>
-                                          <p:spTgt spid="21"/>
+                                          <p:spTgt spid="12"/>
                                         </p:tgtEl>
                                         <p:attrNameLst>
                                           <p:attrName>style.visibility</p:attrName>
@@ -16751,14 +16297,60 @@
                                         <p:strVal val="visible"/>
                                       </p:to>
                                     </p:set>
-                                    <p:animEffect transition="in" filter="dissolve">
-                                      <p:cBhvr>
-                                        <p:cTn id="73" dur="500"/>
-                                        <p:tgtEl>
-                                          <p:spTgt spid="21"/>
+                                    <p:animEffect transition="in" filter="fade">
+                                      <p:cBhvr>
+                                        <p:cTn id="46" dur="1000"/>
+                                        <p:tgtEl>
+                                          <p:spTgt spid="12"/>
                                         </p:tgtEl>
                                       </p:cBhvr>
                                     </p:animEffect>
+                                    <p:anim calcmode="lin" valueType="num">
+                                      <p:cBhvr>
+                                        <p:cTn id="47" dur="1000" fill="hold"/>
+                                        <p:tgtEl>
+                                          <p:spTgt spid="12"/>
+                                        </p:tgtEl>
+                                        <p:attrNameLst>
+                                          <p:attrName>ppt_x</p:attrName>
+                                        </p:attrNameLst>
+                                      </p:cBhvr>
+                                      <p:tavLst>
+                                        <p:tav tm="0">
+                                          <p:val>
+                                            <p:strVal val="#ppt_x"/>
+                                          </p:val>
+                                        </p:tav>
+                                        <p:tav tm="100000">
+                                          <p:val>
+                                            <p:strVal val="#ppt_x"/>
+                                          </p:val>
+                                        </p:tav>
+                                      </p:tavLst>
+                                    </p:anim>
+                                    <p:anim calcmode="lin" valueType="num">
+                                      <p:cBhvr>
+                                        <p:cTn id="48" dur="1000" fill="hold"/>
+                                        <p:tgtEl>
+                                          <p:spTgt spid="12"/>
+                                        </p:tgtEl>
+                                        <p:attrNameLst>
+                                          <p:attrName>ppt_y</p:attrName>
+                                        </p:attrNameLst>
+                                      </p:cBhvr>
+                                      <p:tavLst>
+                                        <p:tav tm="0">
+                                          <p:val>
+                                            <p:strVal val="#ppt_y+.1"/>
+                                          </p:val>
+                                        </p:tav>
+                                        <p:tav tm="100000">
+                                          <p:val>
+                                            <p:strVal val="#ppt_y"/>
+                                          </p:val>
+                                        </p:tav>
+                                      </p:tavLst>
+                                    </p:anim>
                                   </p:childTnLst>
                                 </p:cTn>
                               </p:par>
@@ -16766,26 +16358,26 @@
                           </p:cTn>
                         </p:par>
                         <p:par>
-                          <p:cTn id="74" fill="hold">
+                          <p:cTn id="49" fill="hold">
                             <p:stCondLst>
-                              <p:cond delay="500"/>
+                              <p:cond delay="1000"/>
                             </p:stCondLst>
                             <p:childTnLst>
                               <p:par>
-                                <p:cTn id="75" presetID="21" presetClass="entr" presetSubtype="1" fill="hold" nodeType="afterEffect">
+                                <p:cTn id="50" presetID="9" presetClass="entr" presetSubtype="0" fill="hold" grpId="0" nodeType="afterEffect">
                                   <p:stCondLst>
                                     <p:cond delay="0"/>
                                   </p:stCondLst>
                                   <p:childTnLst>
                                     <p:set>
                                       <p:cBhvr>
-                                        <p:cTn id="76" dur="1" fill="hold">
+                                        <p:cTn id="51" dur="1" fill="hold">
                                           <p:stCondLst>
                                             <p:cond delay="0"/>
                                           </p:stCondLst>
                                         </p:cTn>
                                         <p:tgtEl>
-                                          <p:spTgt spid="9"/>
+                                          <p:spTgt spid="16"/>
                                         </p:tgtEl>
                                         <p:attrNameLst>
                                           <p:attrName>style.visibility</p:attrName>
@@ -16795,11 +16387,11 @@
                                         <p:strVal val="visible"/>
                                       </p:to>
                                     </p:set>
-                                    <p:animEffect transition="in" filter="wheel(1)">
-                                      <p:cBhvr>
-                                        <p:cTn id="77" dur="2000"/>
-                                        <p:tgtEl>
-                                          <p:spTgt spid="9"/>
+                                    <p:animEffect transition="in" filter="dissolve">
+                                      <p:cBhvr>
+                                        <p:cTn id="52" dur="500"/>
+                                        <p:tgtEl>
+                                          <p:spTgt spid="16"/>
                                         </p:tgtEl>
                                       </p:cBhvr>
                                     </p:animEffect>
@@ -16813,32 +16405,32 @@
                     </p:cTn>
                   </p:par>
                   <p:par>
-                    <p:cTn id="78" fill="hold">
+                    <p:cTn id="53" fill="hold">
                       <p:stCondLst>
                         <p:cond delay="indefinite"/>
                       </p:stCondLst>
                       <p:childTnLst>
                         <p:par>
-                          <p:cTn id="79" fill="hold">
+                          <p:cTn id="54" fill="hold">
                             <p:stCondLst>
                               <p:cond delay="0"/>
                             </p:stCondLst>
                             <p:childTnLst>
                               <p:par>
-                                <p:cTn id="80" presetID="9" presetClass="entr" presetSubtype="0" fill="hold" grpId="0" nodeType="clickEffect">
+                                <p:cTn id="55" presetID="31" presetClass="entr" presetSubtype="0" fill="hold" nodeType="clickEffect">
                                   <p:stCondLst>
                                     <p:cond delay="0"/>
                                   </p:stCondLst>
                                   <p:childTnLst>
                                     <p:set>
                                       <p:cBhvr>
-                                        <p:cTn id="81" dur="1" fill="hold">
+                                        <p:cTn id="56" dur="1" fill="hold">
                                           <p:stCondLst>
                                             <p:cond delay="0"/>
                                           </p:stCondLst>
                                         </p:cTn>
                                         <p:tgtEl>
-                                          <p:spTgt spid="24"/>
+                                          <p:spTgt spid="7"/>
                                         </p:tgtEl>
                                         <p:attrNameLst>
                                           <p:attrName>style.visibility</p:attrName>
@@ -16848,11 +16440,80 @@
                                         <p:strVal val="visible"/>
                                       </p:to>
                                     </p:set>
-                                    <p:animEffect transition="in" filter="dissolve">
-                                      <p:cBhvr>
-                                        <p:cTn id="82" dur="500"/>
-                                        <p:tgtEl>
-                                          <p:spTgt spid="24"/>
+                                    <p:anim calcmode="lin" valueType="num">
+                                      <p:cBhvr>
+                                        <p:cTn id="57" dur="1000" fill="hold"/>
+                                        <p:tgtEl>
+                                          <p:spTgt spid="7"/>
+                                        </p:tgtEl>
+                                        <p:attrNameLst>
+                                          <p:attrName>ppt_w</p:attrName>
+                                        </p:attrNameLst>
+                                      </p:cBhvr>
+                                      <p:tavLst>
+                                        <p:tav tm="0">
+                                          <p:val>
+                                            <p:fltVal val="0"/>
+                                          </p:val>
+                                        </p:tav>
+                                        <p:tav tm="100000">
+                                          <p:val>
+                                            <p:strVal val="#ppt_w"/>
+                                          </p:val>
+                                        </p:tav>
+                                      </p:tavLst>
+                                    </p:anim>
+                                    <p:anim calcmode="lin" valueType="num">
+                                      <p:cBhvr>
+                                        <p:cTn id="58" dur="1000" fill="hold"/>
+                                        <p:tgtEl>
+                                          <p:spTgt spid="7"/>
+                                        </p:tgtEl>
+                                        <p:attrNameLst>
+                                          <p:attrName>ppt_h</p:attrName>
+                                        </p:attrNameLst>
+                                      </p:cBhvr>
+                                      <p:tavLst>
+                                        <p:tav tm="0">
+                                          <p:val>
+                                            <p:fltVal val="0"/>
+                                          </p:val>
+                                        </p:tav>
+                                        <p:tav tm="100000">
+                                          <p:val>
+                                            <p:strVal val="#ppt_h"/>
+                                          </p:val>
+                                        </p:tav>
+                                      </p:tavLst>
+                                    </p:anim>
+                                    <p:anim calcmode="lin" valueType="num">
+                                      <p:cBhvr>
+                                        <p:cTn id="59" dur="1000" fill="hold"/>
+                                        <p:tgtEl>
+                                          <p:spTgt spid="7"/>
+                                        </p:tgtEl>
+                                        <p:attrNameLst>
+                                          <p:attrName>style.rotation</p:attrName>
+                                        </p:attrNameLst>
+                                      </p:cBhvr>
+                                      <p:tavLst>
+                                        <p:tav tm="0">
+                                          <p:val>
+                                            <p:fltVal val="90"/>
+                                          </p:val>
+                                        </p:tav>
+                                        <p:tav tm="100000">
+                                          <p:val>
+                                            <p:fltVal val="0"/>
+                                          </p:val>
+                                        </p:tav>
+                                      </p:tavLst>
+                                    </p:anim>
+                                    <p:animEffect transition="in" filter="fade">
+                                      <p:cBhvr>
+                                        <p:cTn id="60" dur="1000"/>
+                                        <p:tgtEl>
+                                          <p:spTgt spid="7"/>
                                         </p:tgtEl>
                                       </p:cBhvr>
                                     </p:animEffect>
@@ -16863,202 +16524,26 @@
                           </p:cTn>
                         </p:par>
                         <p:par>
-                          <p:cTn id="83" fill="hold">
+                          <p:cTn id="61" fill="hold">
                             <p:stCondLst>
-                              <p:cond delay="500"/>
+                              <p:cond delay="1000"/>
                             </p:stCondLst>
                             <p:childTnLst>
                               <p:par>
-                                <p:cTn id="84" presetID="30" presetClass="entr" presetSubtype="0" fill="hold" nodeType="afterEffect">
+                                <p:cTn id="62" presetID="9" presetClass="entr" presetSubtype="0" fill="hold" grpId="0" nodeType="afterEffect">
                                   <p:stCondLst>
                                     <p:cond delay="0"/>
                                   </p:stCondLst>
                                   <p:childTnLst>
                                     <p:set>
                                       <p:cBhvr>
-                                        <p:cTn id="85" dur="1" fill="hold">
+                                        <p:cTn id="63" dur="1" fill="hold">
                                           <p:stCondLst>
                                             <p:cond delay="0"/>
                                           </p:stCondLst>
                                         </p:cTn>
                                         <p:tgtEl>
-                                          <p:spTgt spid="5"/>
-                                        </p:tgtEl>
-                                        <p:attrNameLst>
-                                          <p:attrName>style.visibility</p:attrName>
-                                        </p:attrNameLst>
-                                      </p:cBhvr>
-                                      <p:to>
-                                        <p:strVal val="visible"/>
-                                      </p:to>
-                                    </p:set>
-                                    <p:animEffect transition="in" filter="fade">
-                                      <p:cBhvr>
-                                        <p:cTn id="86" dur="800" decel="100000"/>
-                                        <p:tgtEl>
-                                          <p:spTgt spid="5"/>
-                                        </p:tgtEl>
-                                      </p:cBhvr>
-                                    </p:animEffect>
-                                    <p:anim calcmode="lin" valueType="num">
-                                      <p:cBhvr>
-                                        <p:cTn id="87" dur="800" decel="100000" fill="hold"/>
-                                        <p:tgtEl>
-                                          <p:spTgt spid="5"/>
-                                        </p:tgtEl>
-                                        <p:attrNameLst>
-                                          <p:attrName>style.rotation</p:attrName>
-                                        </p:attrNameLst>
-                                      </p:cBhvr>
-                                      <p:tavLst>
-                                        <p:tav tm="0">
-                                          <p:val>
-                                            <p:fltVal val="-90"/>
-                                          </p:val>
-                                        </p:tav>
-                                        <p:tav tm="100000">
-                                          <p:val>
-                                            <p:fltVal val="0"/>
-                                          </p:val>
-                                        </p:tav>
-                                      </p:tavLst>
-                                    </p:anim>
-                                    <p:anim calcmode="lin" valueType="num">
-                                      <p:cBhvr>
-                                        <p:cTn id="88" dur="800" decel="100000" fill="hold"/>
-                                        <p:tgtEl>
-                                          <p:spTgt spid="5"/>
-                                        </p:tgtEl>
-                                        <p:attrNameLst>
-                                          <p:attrName>ppt_x</p:attrName>
-                                        </p:attrNameLst>
-                                      </p:cBhvr>
-                                      <p:tavLst>
-                                        <p:tav tm="0">
-                                          <p:val>
-                                            <p:strVal val="#ppt_x+0.4"/>
-                                          </p:val>
-                                        </p:tav>
-                                        <p:tav tm="100000">
-                                          <p:val>
-                                            <p:strVal val="#ppt_x-0.05"/>
-                                          </p:val>
-                                        </p:tav>
-                                      </p:tavLst>
-                                    </p:anim>
-                                    <p:anim calcmode="lin" valueType="num">
-                                      <p:cBhvr>
-                                        <p:cTn id="89" dur="800" decel="100000" fill="hold"/>
-                                        <p:tgtEl>
-                                          <p:spTgt spid="5"/>
-                                        </p:tgtEl>
-                                        <p:attrNameLst>
-                                          <p:attrName>ppt_y</p:attrName>
-                                        </p:attrNameLst>
-                                      </p:cBhvr>
-                                      <p:tavLst>
-                                        <p:tav tm="0">
-                                          <p:val>
-                                            <p:strVal val="#ppt_y-0.4"/>
-                                          </p:val>
-                                        </p:tav>
-                                        <p:tav tm="100000">
-                                          <p:val>
-                                            <p:strVal val="#ppt_y+0.1"/>
-                                          </p:val>
-                                        </p:tav>
-                                      </p:tavLst>
-                                    </p:anim>
-                                    <p:anim calcmode="lin" valueType="num">
-                                      <p:cBhvr>
-                                        <p:cTn id="90" dur="200" accel="100000" fill="hold">
-                                          <p:stCondLst>
-                                            <p:cond delay="800"/>
-                                          </p:stCondLst>
-                                        </p:cTn>
-                                        <p:tgtEl>
-                                          <p:spTgt spid="5"/>
-                                        </p:tgtEl>
-                                        <p:attrNameLst>
-                                          <p:attrName>ppt_x</p:attrName>
-                                        </p:attrNameLst>
-                                      </p:cBhvr>
-                                      <p:tavLst>
-                                        <p:tav tm="0">
-                                          <p:val>
-                                            <p:strVal val="#ppt_x-0.05"/>
-                                          </p:val>
-                                        </p:tav>
-                                        <p:tav tm="100000">
-                                          <p:val>
-                                            <p:strVal val="#ppt_x"/>
-                                          </p:val>
-                                        </p:tav>
-                                      </p:tavLst>
-                                    </p:anim>
-                                    <p:anim calcmode="lin" valueType="num">
-                                      <p:cBhvr>
-                                        <p:cTn id="91" dur="200" accel="100000" fill="hold">
-                                          <p:stCondLst>
-                                            <p:cond delay="800"/>
-                                          </p:stCondLst>
-                                        </p:cTn>
-                                        <p:tgtEl>
-                                          <p:spTgt spid="5"/>
-                                        </p:tgtEl>
-                                        <p:attrNameLst>
-                                          <p:attrName>ppt_y</p:attrName>
-                                        </p:attrNameLst>
-                                      </p:cBhvr>
-                                      <p:tavLst>
-                                        <p:tav tm="0">
-                                          <p:val>
-                                            <p:strVal val="#ppt_y+0.1"/>
-                                          </p:val>
-                                        </p:tav>
-                                        <p:tav tm="100000">
-                                          <p:val>
-                                            <p:strVal val="#ppt_y"/>
-                                          </p:val>
-                                        </p:tav>
-                                      </p:tavLst>
-                                    </p:anim>
-                                  </p:childTnLst>
-                                </p:cTn>
-                              </p:par>
-                            </p:childTnLst>
-                          </p:cTn>
-                        </p:par>
-                      </p:childTnLst>
-                    </p:cTn>
-                  </p:par>
-                  <p:par>
-                    <p:cTn id="92" fill="hold">
-                      <p:stCondLst>
-                        <p:cond delay="indefinite"/>
-                      </p:stCondLst>
-                      <p:childTnLst>
-                        <p:par>
-                          <p:cTn id="93" fill="hold">
-                            <p:stCondLst>
-                              <p:cond delay="0"/>
-                            </p:stCondLst>
-                            <p:childTnLst>
-                              <p:par>
-                                <p:cTn id="94" presetID="9" presetClass="entr" presetSubtype="0" fill="hold" grpId="0" nodeType="clickEffect">
-                                  <p:stCondLst>
-                                    <p:cond delay="0"/>
-                                  </p:stCondLst>
-                                  <p:childTnLst>
-                                    <p:set>
-                                      <p:cBhvr>
-                                        <p:cTn id="95" dur="1" fill="hold">
-                                          <p:stCondLst>
-                                            <p:cond delay="0"/>
-                                          </p:stCondLst>
-                                        </p:cTn>
-                                        <p:tgtEl>
-                                          <p:spTgt spid="13"/>
+                                          <p:spTgt spid="19"/>
                                         </p:tgtEl>
                                         <p:attrNameLst>
                                           <p:attrName>style.visibility</p:attrName>
@@ -17070,196 +16555,9 @@
                                     </p:set>
                                     <p:animEffect transition="in" filter="dissolve">
                                       <p:cBhvr>
-                                        <p:cTn id="96" dur="500"/>
-                                        <p:tgtEl>
-                                          <p:spTgt spid="13"/>
-                                        </p:tgtEl>
-                                      </p:cBhvr>
-                                    </p:animEffect>
-                                  </p:childTnLst>
-                                </p:cTn>
-                              </p:par>
-                            </p:childTnLst>
-                          </p:cTn>
-                        </p:par>
-                        <p:par>
-                          <p:cTn id="97" fill="hold">
-                            <p:stCondLst>
-                              <p:cond delay="500"/>
-                            </p:stCondLst>
-                            <p:childTnLst>
-                              <p:par>
-                                <p:cTn id="98" presetID="45" presetClass="entr" presetSubtype="0" fill="hold" nodeType="afterEffect">
-                                  <p:stCondLst>
-                                    <p:cond delay="0"/>
-                                  </p:stCondLst>
-                                  <p:childTnLst>
-                                    <p:set>
-                                      <p:cBhvr>
-                                        <p:cTn id="99" dur="1" fill="hold">
-                                          <p:stCondLst>
-                                            <p:cond delay="0"/>
-                                          </p:stCondLst>
-                                        </p:cTn>
-                                        <p:tgtEl>
-                                          <p:spTgt spid="10"/>
-                                        </p:tgtEl>
-                                        <p:attrNameLst>
-                                          <p:attrName>style.visibility</p:attrName>
-                                        </p:attrNameLst>
-                                      </p:cBhvr>
-                                      <p:to>
-                                        <p:strVal val="visible"/>
-                                      </p:to>
-                                    </p:set>
-                                    <p:animEffect transition="in" filter="fade">
-                                      <p:cBhvr>
-                                        <p:cTn id="100" dur="2000"/>
-                                        <p:tgtEl>
-                                          <p:spTgt spid="10"/>
-                                        </p:tgtEl>
-                                      </p:cBhvr>
-                                    </p:animEffect>
-                                    <p:anim calcmode="lin" valueType="num">
-                                      <p:cBhvr>
-                                        <p:cTn id="101" dur="2000" fill="hold"/>
-                                        <p:tgtEl>
-                                          <p:spTgt spid="10"/>
-                                        </p:tgtEl>
-                                        <p:attrNameLst>
-                                          <p:attrName>ppt_w</p:attrName>
-                                        </p:attrNameLst>
-                                      </p:cBhvr>
-                                      <p:tavLst>
-                                        <p:tav tm="0" fmla="#ppt_w*sin(2.5*pi*$)">
-                                          <p:val>
-                                            <p:fltVal val="0"/>
-                                          </p:val>
-                                        </p:tav>
-                                        <p:tav tm="100000">
-                                          <p:val>
-                                            <p:fltVal val="1"/>
-                                          </p:val>
-                                        </p:tav>
-                                      </p:tavLst>
-                                    </p:anim>
-                                    <p:anim calcmode="lin" valueType="num">
-                                      <p:cBhvr>
-                                        <p:cTn id="102" dur="2000" fill="hold"/>
-                                        <p:tgtEl>
-                                          <p:spTgt spid="10"/>
-                                        </p:tgtEl>
-                                        <p:attrNameLst>
-                                          <p:attrName>ppt_h</p:attrName>
-                                        </p:attrNameLst>
-                                      </p:cBhvr>
-                                      <p:tavLst>
-                                        <p:tav tm="0">
-                                          <p:val>
-                                            <p:strVal val="#ppt_h"/>
-                                          </p:val>
-                                        </p:tav>
-                                        <p:tav tm="100000">
-                                          <p:val>
-                                            <p:strVal val="#ppt_h"/>
-                                          </p:val>
-                                        </p:tav>
-                                      </p:tavLst>
-                                    </p:anim>
-                                  </p:childTnLst>
-                                </p:cTn>
-                              </p:par>
-                            </p:childTnLst>
-                          </p:cTn>
-                        </p:par>
-                      </p:childTnLst>
-                    </p:cTn>
-                  </p:par>
-                  <p:par>
-                    <p:cTn id="103" fill="hold">
-                      <p:stCondLst>
-                        <p:cond delay="indefinite"/>
-                      </p:stCondLst>
-                      <p:childTnLst>
-                        <p:par>
-                          <p:cTn id="104" fill="hold">
-                            <p:stCondLst>
-                              <p:cond delay="0"/>
-                            </p:stCondLst>
-                            <p:childTnLst>
-                              <p:par>
-                                <p:cTn id="105" presetID="9" presetClass="entr" presetSubtype="0" fill="hold" grpId="0" nodeType="clickEffect">
-                                  <p:stCondLst>
-                                    <p:cond delay="0"/>
-                                  </p:stCondLst>
-                                  <p:childTnLst>
-                                    <p:set>
-                                      <p:cBhvr>
-                                        <p:cTn id="106" dur="1" fill="hold">
-                                          <p:stCondLst>
-                                            <p:cond delay="0"/>
-                                          </p:stCondLst>
-                                        </p:cTn>
-                                        <p:tgtEl>
-                                          <p:spTgt spid="20"/>
-                                        </p:tgtEl>
-                                        <p:attrNameLst>
-                                          <p:attrName>style.visibility</p:attrName>
-                                        </p:attrNameLst>
-                                      </p:cBhvr>
-                                      <p:to>
-                                        <p:strVal val="visible"/>
-                                      </p:to>
-                                    </p:set>
-                                    <p:animEffect transition="in" filter="dissolve">
-                                      <p:cBhvr>
-                                        <p:cTn id="107" dur="500"/>
-                                        <p:tgtEl>
-                                          <p:spTgt spid="20"/>
-                                        </p:tgtEl>
-                                      </p:cBhvr>
-                                    </p:animEffect>
-                                  </p:childTnLst>
-                                </p:cTn>
-                              </p:par>
-                            </p:childTnLst>
-                          </p:cTn>
-                        </p:par>
-                        <p:par>
-                          <p:cTn id="108" fill="hold">
-                            <p:stCondLst>
-                              <p:cond delay="500"/>
-                            </p:stCondLst>
-                            <p:childTnLst>
-                              <p:par>
-                                <p:cTn id="109" presetID="9" presetClass="entr" presetSubtype="0" fill="hold" nodeType="afterEffect">
-                                  <p:stCondLst>
-                                    <p:cond delay="0"/>
-                                  </p:stCondLst>
-                                  <p:childTnLst>
-                                    <p:set>
-                                      <p:cBhvr>
-                                        <p:cTn id="110" dur="1" fill="hold">
-                                          <p:stCondLst>
-                                            <p:cond delay="0"/>
-                                          </p:stCondLst>
-                                        </p:cTn>
-                                        <p:tgtEl>
-                                          <p:spTgt spid="4"/>
-                                        </p:tgtEl>
-                                        <p:attrNameLst>
-                                          <p:attrName>style.visibility</p:attrName>
-                                        </p:attrNameLst>
-                                      </p:cBhvr>
-                                      <p:to>
-                                        <p:strVal val="visible"/>
-                                      </p:to>
-                                    </p:set>
-                                    <p:animEffect transition="in" filter="dissolve">
-                                      <p:cBhvr>
-                                        <p:cTn id="111" dur="500"/>
-                                        <p:tgtEl>
-                                          <p:spTgt spid="4"/>
+                                        <p:cTn id="64" dur="500"/>
+                                        <p:tgtEl>
+                                          <p:spTgt spid="19"/>
                                         </p:tgtEl>
                                       </p:cBhvr>
                                     </p:animEffect>
@@ -17273,19 +16571,620 @@
                     </p:cTn>
                   </p:par>
                   <p:par>
-                    <p:cTn id="112" fill="hold">
+                    <p:cTn id="65" fill="hold">
                       <p:stCondLst>
                         <p:cond delay="indefinite"/>
                       </p:stCondLst>
                       <p:childTnLst>
                         <p:par>
-                          <p:cTn id="113" fill="hold">
+                          <p:cTn id="66" fill="hold">
                             <p:stCondLst>
                               <p:cond delay="0"/>
                             </p:stCondLst>
                             <p:childTnLst>
                               <p:par>
-                                <p:cTn id="114" presetID="9" presetClass="entr" presetSubtype="0" fill="hold" grpId="0" nodeType="clickEffect">
+                                <p:cTn id="67" presetID="3" presetClass="entr" presetSubtype="10" fill="hold" nodeType="clickEffect">
+                                  <p:stCondLst>
+                                    <p:cond delay="0"/>
+                                  </p:stCondLst>
+                                  <p:childTnLst>
+                                    <p:set>
+                                      <p:cBhvr>
+                                        <p:cTn id="68" dur="1" fill="hold">
+                                          <p:stCondLst>
+                                            <p:cond delay="0"/>
+                                          </p:stCondLst>
+                                        </p:cTn>
+                                        <p:tgtEl>
+                                          <p:spTgt spid="11"/>
+                                        </p:tgtEl>
+                                        <p:attrNameLst>
+                                          <p:attrName>style.visibility</p:attrName>
+                                        </p:attrNameLst>
+                                      </p:cBhvr>
+                                      <p:to>
+                                        <p:strVal val="visible"/>
+                                      </p:to>
+                                    </p:set>
+                                    <p:animEffect transition="in" filter="blinds(horizontal)">
+                                      <p:cBhvr>
+                                        <p:cTn id="69" dur="500"/>
+                                        <p:tgtEl>
+                                          <p:spTgt spid="11"/>
+                                        </p:tgtEl>
+                                      </p:cBhvr>
+                                    </p:animEffect>
+                                  </p:childTnLst>
+                                </p:cTn>
+                              </p:par>
+                            </p:childTnLst>
+                          </p:cTn>
+                        </p:par>
+                        <p:par>
+                          <p:cTn id="70" fill="hold">
+                            <p:stCondLst>
+                              <p:cond delay="500"/>
+                            </p:stCondLst>
+                            <p:childTnLst>
+                              <p:par>
+                                <p:cTn id="71" presetID="9" presetClass="entr" presetSubtype="0" fill="hold" grpId="0" nodeType="afterEffect">
+                                  <p:stCondLst>
+                                    <p:cond delay="0"/>
+                                  </p:stCondLst>
+                                  <p:childTnLst>
+                                    <p:set>
+                                      <p:cBhvr>
+                                        <p:cTn id="72" dur="1" fill="hold">
+                                          <p:stCondLst>
+                                            <p:cond delay="0"/>
+                                          </p:stCondLst>
+                                        </p:cTn>
+                                        <p:tgtEl>
+                                          <p:spTgt spid="21"/>
+                                        </p:tgtEl>
+                                        <p:attrNameLst>
+                                          <p:attrName>style.visibility</p:attrName>
+                                        </p:attrNameLst>
+                                      </p:cBhvr>
+                                      <p:to>
+                                        <p:strVal val="visible"/>
+                                      </p:to>
+                                    </p:set>
+                                    <p:animEffect transition="in" filter="dissolve">
+                                      <p:cBhvr>
+                                        <p:cTn id="73" dur="500"/>
+                                        <p:tgtEl>
+                                          <p:spTgt spid="21"/>
+                                        </p:tgtEl>
+                                      </p:cBhvr>
+                                    </p:animEffect>
+                                  </p:childTnLst>
+                                </p:cTn>
+                              </p:par>
+                            </p:childTnLst>
+                          </p:cTn>
+                        </p:par>
+                      </p:childTnLst>
+                    </p:cTn>
+                  </p:par>
+                  <p:par>
+                    <p:cTn id="74" fill="hold">
+                      <p:stCondLst>
+                        <p:cond delay="indefinite"/>
+                      </p:stCondLst>
+                      <p:childTnLst>
+                        <p:par>
+                          <p:cTn id="75" fill="hold">
+                            <p:stCondLst>
+                              <p:cond delay="0"/>
+                            </p:stCondLst>
+                            <p:childTnLst>
+                              <p:par>
+                                <p:cTn id="76" presetID="21" presetClass="entr" presetSubtype="1" fill="hold" nodeType="clickEffect">
+                                  <p:stCondLst>
+                                    <p:cond delay="0"/>
+                                  </p:stCondLst>
+                                  <p:childTnLst>
+                                    <p:set>
+                                      <p:cBhvr>
+                                        <p:cTn id="77" dur="1" fill="hold">
+                                          <p:stCondLst>
+                                            <p:cond delay="0"/>
+                                          </p:stCondLst>
+                                        </p:cTn>
+                                        <p:tgtEl>
+                                          <p:spTgt spid="9"/>
+                                        </p:tgtEl>
+                                        <p:attrNameLst>
+                                          <p:attrName>style.visibility</p:attrName>
+                                        </p:attrNameLst>
+                                      </p:cBhvr>
+                                      <p:to>
+                                        <p:strVal val="visible"/>
+                                      </p:to>
+                                    </p:set>
+                                    <p:animEffect transition="in" filter="wheel(1)">
+                                      <p:cBhvr>
+                                        <p:cTn id="78" dur="2000"/>
+                                        <p:tgtEl>
+                                          <p:spTgt spid="9"/>
+                                        </p:tgtEl>
+                                      </p:cBhvr>
+                                    </p:animEffect>
+                                  </p:childTnLst>
+                                </p:cTn>
+                              </p:par>
+                            </p:childTnLst>
+                          </p:cTn>
+                        </p:par>
+                        <p:par>
+                          <p:cTn id="79" fill="hold">
+                            <p:stCondLst>
+                              <p:cond delay="2000"/>
+                            </p:stCondLst>
+                            <p:childTnLst>
+                              <p:par>
+                                <p:cTn id="80" presetID="9" presetClass="entr" presetSubtype="0" fill="hold" grpId="0" nodeType="afterEffect">
+                                  <p:stCondLst>
+                                    <p:cond delay="0"/>
+                                  </p:stCondLst>
+                                  <p:childTnLst>
+                                    <p:set>
+                                      <p:cBhvr>
+                                        <p:cTn id="81" dur="1" fill="hold">
+                                          <p:stCondLst>
+                                            <p:cond delay="0"/>
+                                          </p:stCondLst>
+                                        </p:cTn>
+                                        <p:tgtEl>
+                                          <p:spTgt spid="24"/>
+                                        </p:tgtEl>
+                                        <p:attrNameLst>
+                                          <p:attrName>style.visibility</p:attrName>
+                                        </p:attrNameLst>
+                                      </p:cBhvr>
+                                      <p:to>
+                                        <p:strVal val="visible"/>
+                                      </p:to>
+                                    </p:set>
+                                    <p:animEffect transition="in" filter="dissolve">
+                                      <p:cBhvr>
+                                        <p:cTn id="82" dur="500"/>
+                                        <p:tgtEl>
+                                          <p:spTgt spid="24"/>
+                                        </p:tgtEl>
+                                      </p:cBhvr>
+                                    </p:animEffect>
+                                  </p:childTnLst>
+                                </p:cTn>
+                              </p:par>
+                            </p:childTnLst>
+                          </p:cTn>
+                        </p:par>
+                      </p:childTnLst>
+                    </p:cTn>
+                  </p:par>
+                  <p:par>
+                    <p:cTn id="83" fill="hold">
+                      <p:stCondLst>
+                        <p:cond delay="indefinite"/>
+                      </p:stCondLst>
+                      <p:childTnLst>
+                        <p:par>
+                          <p:cTn id="84" fill="hold">
+                            <p:stCondLst>
+                              <p:cond delay="0"/>
+                            </p:stCondLst>
+                            <p:childTnLst>
+                              <p:par>
+                                <p:cTn id="85" presetID="30" presetClass="entr" presetSubtype="0" fill="hold" nodeType="clickEffect">
+                                  <p:stCondLst>
+                                    <p:cond delay="0"/>
+                                  </p:stCondLst>
+                                  <p:childTnLst>
+                                    <p:set>
+                                      <p:cBhvr>
+                                        <p:cTn id="86" dur="1" fill="hold">
+                                          <p:stCondLst>
+                                            <p:cond delay="0"/>
+                                          </p:stCondLst>
+                                        </p:cTn>
+                                        <p:tgtEl>
+                                          <p:spTgt spid="5"/>
+                                        </p:tgtEl>
+                                        <p:attrNameLst>
+                                          <p:attrName>style.visibility</p:attrName>
+                                        </p:attrNameLst>
+                                      </p:cBhvr>
+                                      <p:to>
+                                        <p:strVal val="visible"/>
+                                      </p:to>
+                                    </p:set>
+                                    <p:animEffect transition="in" filter="fade">
+                                      <p:cBhvr>
+                                        <p:cTn id="87" dur="800" decel="100000"/>
+                                        <p:tgtEl>
+                                          <p:spTgt spid="5"/>
+                                        </p:tgtEl>
+                                      </p:cBhvr>
+                                    </p:animEffect>
+                                    <p:anim calcmode="lin" valueType="num">
+                                      <p:cBhvr>
+                                        <p:cTn id="88" dur="800" decel="100000" fill="hold"/>
+                                        <p:tgtEl>
+                                          <p:spTgt spid="5"/>
+                                        </p:tgtEl>
+                                        <p:attrNameLst>
+                                          <p:attrName>style.rotation</p:attrName>
+                                        </p:attrNameLst>
+                                      </p:cBhvr>
+                                      <p:tavLst>
+                                        <p:tav tm="0">
+                                          <p:val>
+                                            <p:fltVal val="-90"/>
+                                          </p:val>
+                                        </p:tav>
+                                        <p:tav tm="100000">
+                                          <p:val>
+                                            <p:fltVal val="0"/>
+                                          </p:val>
+                                        </p:tav>
+                                      </p:tavLst>
+                                    </p:anim>
+                                    <p:anim calcmode="lin" valueType="num">
+                                      <p:cBhvr>
+                                        <p:cTn id="89" dur="800" decel="100000" fill="hold"/>
+                                        <p:tgtEl>
+                                          <p:spTgt spid="5"/>
+                                        </p:tgtEl>
+                                        <p:attrNameLst>
+                                          <p:attrName>ppt_x</p:attrName>
+                                        </p:attrNameLst>
+                                      </p:cBhvr>
+                                      <p:tavLst>
+                                        <p:tav tm="0">
+                                          <p:val>
+                                            <p:strVal val="#ppt_x+0.4"/>
+                                          </p:val>
+                                        </p:tav>
+                                        <p:tav tm="100000">
+                                          <p:val>
+                                            <p:strVal val="#ppt_x-0.05"/>
+                                          </p:val>
+                                        </p:tav>
+                                      </p:tavLst>
+                                    </p:anim>
+                                    <p:anim calcmode="lin" valueType="num">
+                                      <p:cBhvr>
+                                        <p:cTn id="90" dur="800" decel="100000" fill="hold"/>
+                                        <p:tgtEl>
+                                          <p:spTgt spid="5"/>
+                                        </p:tgtEl>
+                                        <p:attrNameLst>
+                                          <p:attrName>ppt_y</p:attrName>
+                                        </p:attrNameLst>
+                                      </p:cBhvr>
+                                      <p:tavLst>
+                                        <p:tav tm="0">
+                                          <p:val>
+                                            <p:strVal val="#ppt_y-0.4"/>
+                                          </p:val>
+                                        </p:tav>
+                                        <p:tav tm="100000">
+                                          <p:val>
+                                            <p:strVal val="#ppt_y+0.1"/>
+                                          </p:val>
+                                        </p:tav>
+                                      </p:tavLst>
+                                    </p:anim>
+                                    <p:anim calcmode="lin" valueType="num">
+                                      <p:cBhvr>
+                                        <p:cTn id="91" dur="200" accel="100000" fill="hold">
+                                          <p:stCondLst>
+                                            <p:cond delay="800"/>
+                                          </p:stCondLst>
+                                        </p:cTn>
+                                        <p:tgtEl>
+                                          <p:spTgt spid="5"/>
+                                        </p:tgtEl>
+                                        <p:attrNameLst>
+                                          <p:attrName>ppt_x</p:attrName>
+                                        </p:attrNameLst>
+                                      </p:cBhvr>
+                                      <p:tavLst>
+                                        <p:tav tm="0">
+                                          <p:val>
+                                            <p:strVal val="#ppt_x-0.05"/>
+                                          </p:val>
+                                        </p:tav>
+                                        <p:tav tm="100000">
+                                          <p:val>
+                                            <p:strVal val="#ppt_x"/>
+                                          </p:val>
+                                        </p:tav>
+                                      </p:tavLst>
+                                    </p:anim>
+                                    <p:anim calcmode="lin" valueType="num">
+                                      <p:cBhvr>
+                                        <p:cTn id="92" dur="200" accel="100000" fill="hold">
+                                          <p:stCondLst>
+                                            <p:cond delay="800"/>
+                                          </p:stCondLst>
+                                        </p:cTn>
+                                        <p:tgtEl>
+                                          <p:spTgt spid="5"/>
+                                        </p:tgtEl>
+                                        <p:attrNameLst>
+                                          <p:attrName>ppt_y</p:attrName>
+                                        </p:attrNameLst>
+                                      </p:cBhvr>
+                                      <p:tavLst>
+                                        <p:tav tm="0">
+                                          <p:val>
+                                            <p:strVal val="#ppt_y+0.1"/>
+                                          </p:val>
+                                        </p:tav>
+                                        <p:tav tm="100000">
+                                          <p:val>
+                                            <p:strVal val="#ppt_y"/>
+                                          </p:val>
+                                        </p:tav>
+                                      </p:tavLst>
+                                    </p:anim>
+                                  </p:childTnLst>
+                                </p:cTn>
+                              </p:par>
+                            </p:childTnLst>
+                          </p:cTn>
+                        </p:par>
+                        <p:par>
+                          <p:cTn id="93" fill="hold">
+                            <p:stCondLst>
+                              <p:cond delay="1000"/>
+                            </p:stCondLst>
+                            <p:childTnLst>
+                              <p:par>
+                                <p:cTn id="94" presetID="9" presetClass="entr" presetSubtype="0" fill="hold" grpId="0" nodeType="afterEffect">
+                                  <p:stCondLst>
+                                    <p:cond delay="0"/>
+                                  </p:stCondLst>
+                                  <p:childTnLst>
+                                    <p:set>
+                                      <p:cBhvr>
+                                        <p:cTn id="95" dur="1" fill="hold">
+                                          <p:stCondLst>
+                                            <p:cond delay="0"/>
+                                          </p:stCondLst>
+                                        </p:cTn>
+                                        <p:tgtEl>
+                                          <p:spTgt spid="13"/>
+                                        </p:tgtEl>
+                                        <p:attrNameLst>
+                                          <p:attrName>style.visibility</p:attrName>
+                                        </p:attrNameLst>
+                                      </p:cBhvr>
+                                      <p:to>
+                                        <p:strVal val="visible"/>
+                                      </p:to>
+                                    </p:set>
+                                    <p:animEffect transition="in" filter="dissolve">
+                                      <p:cBhvr>
+                                        <p:cTn id="96" dur="500"/>
+                                        <p:tgtEl>
+                                          <p:spTgt spid="13"/>
+                                        </p:tgtEl>
+                                      </p:cBhvr>
+                                    </p:animEffect>
+                                  </p:childTnLst>
+                                </p:cTn>
+                              </p:par>
+                            </p:childTnLst>
+                          </p:cTn>
+                        </p:par>
+                      </p:childTnLst>
+                    </p:cTn>
+                  </p:par>
+                  <p:par>
+                    <p:cTn id="97" fill="hold">
+                      <p:stCondLst>
+                        <p:cond delay="indefinite"/>
+                      </p:stCondLst>
+                      <p:childTnLst>
+                        <p:par>
+                          <p:cTn id="98" fill="hold">
+                            <p:stCondLst>
+                              <p:cond delay="0"/>
+                            </p:stCondLst>
+                            <p:childTnLst>
+                              <p:par>
+                                <p:cTn id="99" presetID="45" presetClass="entr" presetSubtype="0" fill="hold" nodeType="clickEffect">
+                                  <p:stCondLst>
+                                    <p:cond delay="0"/>
+                                  </p:stCondLst>
+                                  <p:childTnLst>
+                                    <p:set>
+                                      <p:cBhvr>
+                                        <p:cTn id="100" dur="1" fill="hold">
+                                          <p:stCondLst>
+                                            <p:cond delay="0"/>
+                                          </p:stCondLst>
+                                        </p:cTn>
+                                        <p:tgtEl>
+                                          <p:spTgt spid="10"/>
+                                        </p:tgtEl>
+                                        <p:attrNameLst>
+                                          <p:attrName>style.visibility</p:attrName>
+                                        </p:attrNameLst>
+                                      </p:cBhvr>
+                                      <p:to>
+                                        <p:strVal val="visible"/>
+                                      </p:to>
+                                    </p:set>
+                                    <p:animEffect transition="in" filter="fade">
+                                      <p:cBhvr>
+                                        <p:cTn id="101" dur="2000"/>
+                                        <p:tgtEl>
+                                          <p:spTgt spid="10"/>
+                                        </p:tgtEl>
+                                      </p:cBhvr>
+                                    </p:animEffect>
+                                    <p:anim calcmode="lin" valueType="num">
+                                      <p:cBhvr>
+                                        <p:cTn id="102" dur="2000" fill="hold"/>
+                                        <p:tgtEl>
+                                          <p:spTgt spid="10"/>
+                                        </p:tgtEl>
+                                        <p:attrNameLst>
+                                          <p:attrName>ppt_w</p:attrName>
+                                        </p:attrNameLst>
+                                      </p:cBhvr>
+                                      <p:tavLst>
+                                        <p:tav tm="0" fmla="#ppt_w*sin(2.5*pi*$)">
+                                          <p:val>
+                                            <p:fltVal val="0"/>
+                                          </p:val>
+                                        </p:tav>
+                                        <p:tav tm="100000">
+                                          <p:val>
+                                            <p:fltVal val="1"/>
+                                          </p:val>
+                                        </p:tav>
+                                      </p:tavLst>
+                                    </p:anim>
+                                    <p:anim calcmode="lin" valueType="num">
+                                      <p:cBhvr>
+                                        <p:cTn id="103" dur="2000" fill="hold"/>
+                                        <p:tgtEl>
+                                          <p:spTgt spid="10"/>
+                                        </p:tgtEl>
+                                        <p:attrNameLst>
+                                          <p:attrName>ppt_h</p:attrName>
+                                        </p:attrNameLst>
+                                      </p:cBhvr>
+                                      <p:tavLst>
+                                        <p:tav tm="0">
+                                          <p:val>
+                                            <p:strVal val="#ppt_h"/>
+                                          </p:val>
+                                        </p:tav>
+                                        <p:tav tm="100000">
+                                          <p:val>
+                                            <p:strVal val="#ppt_h"/>
+                                          </p:val>
+                                        </p:tav>
+                                      </p:tavLst>
+                                    </p:anim>
+                                  </p:childTnLst>
+                                </p:cTn>
+                              </p:par>
+                            </p:childTnLst>
+                          </p:cTn>
+                        </p:par>
+                        <p:par>
+                          <p:cTn id="104" fill="hold">
+                            <p:stCondLst>
+                              <p:cond delay="2000"/>
+                            </p:stCondLst>
+                            <p:childTnLst>
+                              <p:par>
+                                <p:cTn id="105" presetID="9" presetClass="entr" presetSubtype="0" fill="hold" grpId="0" nodeType="afterEffect">
+                                  <p:stCondLst>
+                                    <p:cond delay="0"/>
+                                  </p:stCondLst>
+                                  <p:childTnLst>
+                                    <p:set>
+                                      <p:cBhvr>
+                                        <p:cTn id="106" dur="1" fill="hold">
+                                          <p:stCondLst>
+                                            <p:cond delay="0"/>
+                                          </p:stCondLst>
+                                        </p:cTn>
+                                        <p:tgtEl>
+                                          <p:spTgt spid="20"/>
+                                        </p:tgtEl>
+                                        <p:attrNameLst>
+                                          <p:attrName>style.visibility</p:attrName>
+                                        </p:attrNameLst>
+                                      </p:cBhvr>
+                                      <p:to>
+                                        <p:strVal val="visible"/>
+                                      </p:to>
+                                    </p:set>
+                                    <p:animEffect transition="in" filter="dissolve">
+                                      <p:cBhvr>
+                                        <p:cTn id="107" dur="500"/>
+                                        <p:tgtEl>
+                                          <p:spTgt spid="20"/>
+                                        </p:tgtEl>
+                                      </p:cBhvr>
+                                    </p:animEffect>
+                                  </p:childTnLst>
+                                </p:cTn>
+                              </p:par>
+                            </p:childTnLst>
+                          </p:cTn>
+                        </p:par>
+                      </p:childTnLst>
+                    </p:cTn>
+                  </p:par>
+                  <p:par>
+                    <p:cTn id="108" fill="hold">
+                      <p:stCondLst>
+                        <p:cond delay="indefinite"/>
+                      </p:stCondLst>
+                      <p:childTnLst>
+                        <p:par>
+                          <p:cTn id="109" fill="hold">
+                            <p:stCondLst>
+                              <p:cond delay="0"/>
+                            </p:stCondLst>
+                            <p:childTnLst>
+                              <p:par>
+                                <p:cTn id="110" presetID="9" presetClass="entr" presetSubtype="0" fill="hold" nodeType="clickEffect">
+                                  <p:stCondLst>
+                                    <p:cond delay="0"/>
+                                  </p:stCondLst>
+                                  <p:childTnLst>
+                                    <p:set>
+                                      <p:cBhvr>
+                                        <p:cTn id="111" dur="1" fill="hold">
+                                          <p:stCondLst>
+                                            <p:cond delay="0"/>
+                                          </p:stCondLst>
+                                        </p:cTn>
+                                        <p:tgtEl>
+                                          <p:spTgt spid="4"/>
+                                        </p:tgtEl>
+                                        <p:attrNameLst>
+                                          <p:attrName>style.visibility</p:attrName>
+                                        </p:attrNameLst>
+                                      </p:cBhvr>
+                                      <p:to>
+                                        <p:strVal val="visible"/>
+                                      </p:to>
+                                    </p:set>
+                                    <p:animEffect transition="in" filter="dissolve">
+                                      <p:cBhvr>
+                                        <p:cTn id="112" dur="500"/>
+                                        <p:tgtEl>
+                                          <p:spTgt spid="4"/>
+                                        </p:tgtEl>
+                                      </p:cBhvr>
+                                    </p:animEffect>
+                                  </p:childTnLst>
+                                </p:cTn>
+                              </p:par>
+                            </p:childTnLst>
+                          </p:cTn>
+                        </p:par>
+                        <p:par>
+                          <p:cTn id="113" fill="hold">
+                            <p:stCondLst>
+                              <p:cond delay="500"/>
+                            </p:stCondLst>
+                            <p:childTnLst>
+                              <p:par>
+                                <p:cTn id="114" presetID="9" presetClass="entr" presetSubtype="0" fill="hold" grpId="0" nodeType="afterEffect">
                                   <p:stCondLst>
                                     <p:cond delay="0"/>
                                   </p:stCondLst>
@@ -17403,7 +17302,7 @@
           <a:p>
             <a:pPr algn="ctr"/>
             <a:r>
-              <a:rPr lang="es-ES" sz="5400" b="0" cap="none" spc="0" dirty="0" smtClean="0">
+              <a:rPr lang="es-ES" sz="5400" b="0" cap="none" spc="0" dirty="0">
                 <a:ln w="0"/>
                 <a:gradFill>
                   <a:gsLst>

</xml_diff>

<commit_message>
ultima modificacion del ppt
</commit_message>
<xml_diff>
--- a/Documentacion/PresentaciónProyectoFinal.pptx
+++ b/Documentacion/PresentaciónProyectoFinal.pptx
@@ -5,7 +5,7 @@
     <p:sldMasterId id="2147483648" r:id="rId1"/>
   </p:sldMasterIdLst>
   <p:notesMasterIdLst>
-    <p:notesMasterId r:id="rId9"/>
+    <p:notesMasterId r:id="rId10"/>
   </p:notesMasterIdLst>
   <p:sldIdLst>
     <p:sldId id="256" r:id="rId2"/>
@@ -15,6 +15,7 @@
     <p:sldId id="262" r:id="rId6"/>
     <p:sldId id="261" r:id="rId7"/>
     <p:sldId id="260" r:id="rId8"/>
+    <p:sldId id="265" r:id="rId9"/>
   </p:sldIdLst>
   <p:sldSz cx="12192000" cy="6858000"/>
   <p:notesSz cx="6858000" cy="9144000"/>
@@ -17422,6 +17423,9 @@
                     <p:cTn id="3" fill="hold">
                       <p:stCondLst>
                         <p:cond delay="indefinite"/>
+                        <p:cond evt="onBegin" delay="0">
+                          <p:tn val="2"/>
+                        </p:cond>
                       </p:stCondLst>
                       <p:childTnLst>
                         <p:par>
@@ -17431,7 +17435,7 @@
                             </p:stCondLst>
                             <p:childTnLst>
                               <p:par>
-                                <p:cTn id="5" presetID="20" presetClass="entr" presetSubtype="0" fill="hold" nodeType="clickEffect">
+                                <p:cTn id="5" presetID="20" presetClass="entr" presetSubtype="0" fill="hold" nodeType="afterEffect">
                                   <p:stCondLst>
                                     <p:cond delay="0"/>
                                   </p:stCondLst>
@@ -17538,6 +17542,378 @@
     </p:tnLst>
     <p:bldLst>
       <p:bldP spid="5" grpId="0"/>
+    </p:bldLst>
+  </p:timing>
+</p:sld>
+</file>
+
+<file path=ppt/slides/slide8.xml><?xml version="1.0" encoding="utf-8"?>
+<p:sld xmlns:a="http://schemas.openxmlformats.org/drawingml/2006/main" xmlns:r="http://schemas.openxmlformats.org/officeDocument/2006/relationships" xmlns:p="http://schemas.openxmlformats.org/presentationml/2006/main">
+  <p:cSld>
+    <p:spTree>
+      <p:nvGrpSpPr>
+        <p:cNvPr id="1" name=""/>
+        <p:cNvGrpSpPr/>
+        <p:nvPr/>
+      </p:nvGrpSpPr>
+      <p:grpSpPr>
+        <a:xfrm>
+          <a:off x="0" y="0"/>
+          <a:ext cx="0" cy="0"/>
+          <a:chOff x="0" y="0"/>
+          <a:chExt cx="0" cy="0"/>
+        </a:xfrm>
+      </p:grpSpPr>
+      <p:sp>
+        <p:nvSpPr>
+          <p:cNvPr id="2" name="Título 1">
+            <a:extLst>
+              <a:ext uri="{FF2B5EF4-FFF2-40B4-BE49-F238E27FC236}">
+                <a16:creationId xmlns:a16="http://schemas.microsoft.com/office/drawing/2014/main" id="{03CF48A6-4E66-48A2-6930-7E84E0989F7E}"/>
+              </a:ext>
+            </a:extLst>
+          </p:cNvPr>
+          <p:cNvSpPr>
+            <a:spLocks noGrp="1"/>
+          </p:cNvSpPr>
+          <p:nvPr>
+            <p:ph type="ctrTitle"/>
+          </p:nvPr>
+        </p:nvSpPr>
+        <p:spPr>
+          <a:xfrm>
+            <a:off x="2111232" y="675409"/>
+            <a:ext cx="8915399" cy="2262781"/>
+          </a:xfrm>
+        </p:spPr>
+        <p:txBody>
+          <a:bodyPr/>
+          <a:lstStyle/>
+          <a:p>
+            <a:pPr algn="ctr"/>
+            <a:r>
+              <a:rPr lang="es-MX" dirty="0">
+                <a:solidFill>
+                  <a:schemeClr val="tx1"/>
+                </a:solidFill>
+              </a:rPr>
+              <a:t>Muchas gracias por su atención.</a:t>
+            </a:r>
+          </a:p>
+        </p:txBody>
+      </p:sp>
+      <p:sp>
+        <p:nvSpPr>
+          <p:cNvPr id="4" name="Título 1">
+            <a:extLst>
+              <a:ext uri="{FF2B5EF4-FFF2-40B4-BE49-F238E27FC236}">
+                <a16:creationId xmlns:a16="http://schemas.microsoft.com/office/drawing/2014/main" id="{5C110735-81E1-DFB9-4ECF-6D7D67B2BE74}"/>
+              </a:ext>
+            </a:extLst>
+          </p:cNvPr>
+          <p:cNvSpPr txBox="1">
+            <a:spLocks/>
+          </p:cNvSpPr>
+          <p:nvPr/>
+        </p:nvSpPr>
+        <p:spPr>
+          <a:xfrm>
+            <a:off x="1962295" y="3623990"/>
+            <a:ext cx="8915399" cy="1145437"/>
+          </a:xfrm>
+          <a:prstGeom prst="rect">
+            <a:avLst/>
+          </a:prstGeom>
+        </p:spPr>
+        <p:txBody>
+          <a:bodyPr vert="horz" lIns="91440" tIns="45720" rIns="91440" bIns="45720" rtlCol="0" anchor="b">
+            <a:normAutofit/>
+          </a:bodyPr>
+          <a:lstStyle>
+            <a:lvl1pPr algn="l" defTabSz="457200" rtl="0" eaLnBrk="1" latinLnBrk="0" hangingPunct="1">
+              <a:spcBef>
+                <a:spcPct val="0"/>
+              </a:spcBef>
+              <a:buNone/>
+              <a:defRPr sz="5400" kern="1200">
+                <a:solidFill>
+                  <a:schemeClr val="accent2">
+                    <a:lumMod val="75000"/>
+                  </a:schemeClr>
+                </a:solidFill>
+                <a:latin typeface="+mj-lt"/>
+                <a:ea typeface="+mj-ea"/>
+                <a:cs typeface="+mj-cs"/>
+              </a:defRPr>
+            </a:lvl1pPr>
+            <a:lvl2pPr eaLnBrk="1" hangingPunct="1">
+              <a:defRPr>
+                <a:solidFill>
+                  <a:schemeClr val="tx2"/>
+                </a:solidFill>
+              </a:defRPr>
+            </a:lvl2pPr>
+            <a:lvl3pPr eaLnBrk="1" hangingPunct="1">
+              <a:defRPr>
+                <a:solidFill>
+                  <a:schemeClr val="tx2"/>
+                </a:solidFill>
+              </a:defRPr>
+            </a:lvl3pPr>
+            <a:lvl4pPr eaLnBrk="1" hangingPunct="1">
+              <a:defRPr>
+                <a:solidFill>
+                  <a:schemeClr val="tx2"/>
+                </a:solidFill>
+              </a:defRPr>
+            </a:lvl4pPr>
+            <a:lvl5pPr eaLnBrk="1" hangingPunct="1">
+              <a:defRPr>
+                <a:solidFill>
+                  <a:schemeClr val="tx2"/>
+                </a:solidFill>
+              </a:defRPr>
+            </a:lvl5pPr>
+            <a:lvl6pPr eaLnBrk="1" hangingPunct="1">
+              <a:defRPr>
+                <a:solidFill>
+                  <a:schemeClr val="tx2"/>
+                </a:solidFill>
+              </a:defRPr>
+            </a:lvl6pPr>
+            <a:lvl7pPr eaLnBrk="1" hangingPunct="1">
+              <a:defRPr>
+                <a:solidFill>
+                  <a:schemeClr val="tx2"/>
+                </a:solidFill>
+              </a:defRPr>
+            </a:lvl7pPr>
+            <a:lvl8pPr eaLnBrk="1" hangingPunct="1">
+              <a:defRPr>
+                <a:solidFill>
+                  <a:schemeClr val="tx2"/>
+                </a:solidFill>
+              </a:defRPr>
+            </a:lvl8pPr>
+            <a:lvl9pPr eaLnBrk="1" hangingPunct="1">
+              <a:defRPr>
+                <a:solidFill>
+                  <a:schemeClr val="tx2"/>
+                </a:solidFill>
+              </a:defRPr>
+            </a:lvl9pPr>
+          </a:lstStyle>
+          <a:p>
+            <a:pPr algn="ctr"/>
+            <a:r>
+              <a:rPr lang="es-MX" dirty="0">
+                <a:solidFill>
+                  <a:schemeClr val="tx1"/>
+                </a:solidFill>
+              </a:rPr>
+              <a:t>Nos vemos en Tercero. </a:t>
+            </a:r>
+          </a:p>
+        </p:txBody>
+      </p:sp>
+    </p:spTree>
+    <p:extLst>
+      <p:ext uri="{BB962C8B-B14F-4D97-AF65-F5344CB8AC3E}">
+        <p14:creationId xmlns:p14="http://schemas.microsoft.com/office/powerpoint/2010/main" val="3642265372"/>
+      </p:ext>
+    </p:extLst>
+  </p:cSld>
+  <p:clrMapOvr>
+    <a:masterClrMapping/>
+  </p:clrMapOvr>
+  <mc:AlternateContent xmlns:mc="http://schemas.openxmlformats.org/markup-compatibility/2006" xmlns:p14="http://schemas.microsoft.com/office/powerpoint/2010/main">
+    <mc:Choice Requires="p14">
+      <p:transition spd="slow" p14:dur="3000">
+        <p14:shred/>
+      </p:transition>
+    </mc:Choice>
+    <mc:Fallback xmlns="">
+      <p:transition spd="slow">
+        <p:fade/>
+      </p:transition>
+    </mc:Fallback>
+  </mc:AlternateContent>
+  <p:timing>
+    <p:tnLst>
+      <p:par>
+        <p:cTn id="1" dur="indefinite" restart="never" nodeType="tmRoot">
+          <p:childTnLst>
+            <p:seq concurrent="1" nextAc="seek">
+              <p:cTn id="2" dur="indefinite" nodeType="mainSeq">
+                <p:childTnLst>
+                  <p:par>
+                    <p:cTn id="3" fill="hold">
+                      <p:stCondLst>
+                        <p:cond delay="indefinite"/>
+                      </p:stCondLst>
+                      <p:childTnLst>
+                        <p:par>
+                          <p:cTn id="4" fill="hold">
+                            <p:stCondLst>
+                              <p:cond delay="0"/>
+                            </p:stCondLst>
+                            <p:childTnLst>
+                              <p:par>
+                                <p:cTn id="5" presetID="1" presetClass="entr" presetSubtype="0" fill="hold" grpId="0" nodeType="clickEffect">
+                                  <p:stCondLst>
+                                    <p:cond delay="0"/>
+                                  </p:stCondLst>
+                                  <p:childTnLst>
+                                    <p:set>
+                                      <p:cBhvr>
+                                        <p:cTn id="6" dur="1" fill="hold">
+                                          <p:stCondLst>
+                                            <p:cond delay="0"/>
+                                          </p:stCondLst>
+                                        </p:cTn>
+                                        <p:tgtEl>
+                                          <p:spTgt spid="2"/>
+                                        </p:tgtEl>
+                                        <p:attrNameLst>
+                                          <p:attrName>style.visibility</p:attrName>
+                                        </p:attrNameLst>
+                                      </p:cBhvr>
+                                      <p:to>
+                                        <p:strVal val="visible"/>
+                                      </p:to>
+                                    </p:set>
+                                  </p:childTnLst>
+                                </p:cTn>
+                              </p:par>
+                            </p:childTnLst>
+                          </p:cTn>
+                        </p:par>
+                      </p:childTnLst>
+                    </p:cTn>
+                  </p:par>
+                  <p:par>
+                    <p:cTn id="7" fill="hold">
+                      <p:stCondLst>
+                        <p:cond delay="indefinite"/>
+                      </p:stCondLst>
+                      <p:childTnLst>
+                        <p:par>
+                          <p:cTn id="8" fill="hold">
+                            <p:stCondLst>
+                              <p:cond delay="0"/>
+                            </p:stCondLst>
+                            <p:childTnLst>
+                              <p:par>
+                                <p:cTn id="9" presetID="53" presetClass="entr" presetSubtype="16" fill="hold" grpId="0" nodeType="clickEffect">
+                                  <p:stCondLst>
+                                    <p:cond delay="0"/>
+                                  </p:stCondLst>
+                                  <p:childTnLst>
+                                    <p:set>
+                                      <p:cBhvr>
+                                        <p:cTn id="10" dur="1" fill="hold">
+                                          <p:stCondLst>
+                                            <p:cond delay="0"/>
+                                          </p:stCondLst>
+                                        </p:cTn>
+                                        <p:tgtEl>
+                                          <p:spTgt spid="4"/>
+                                        </p:tgtEl>
+                                        <p:attrNameLst>
+                                          <p:attrName>style.visibility</p:attrName>
+                                        </p:attrNameLst>
+                                      </p:cBhvr>
+                                      <p:to>
+                                        <p:strVal val="visible"/>
+                                      </p:to>
+                                    </p:set>
+                                    <p:anim calcmode="lin" valueType="num">
+                                      <p:cBhvr>
+                                        <p:cTn id="11" dur="500" fill="hold"/>
+                                        <p:tgtEl>
+                                          <p:spTgt spid="4"/>
+                                        </p:tgtEl>
+                                        <p:attrNameLst>
+                                          <p:attrName>ppt_w</p:attrName>
+                                        </p:attrNameLst>
+                                      </p:cBhvr>
+                                      <p:tavLst>
+                                        <p:tav tm="0">
+                                          <p:val>
+                                            <p:fltVal val="0"/>
+                                          </p:val>
+                                        </p:tav>
+                                        <p:tav tm="100000">
+                                          <p:val>
+                                            <p:strVal val="#ppt_w"/>
+                                          </p:val>
+                                        </p:tav>
+                                      </p:tavLst>
+                                    </p:anim>
+                                    <p:anim calcmode="lin" valueType="num">
+                                      <p:cBhvr>
+                                        <p:cTn id="12" dur="500" fill="hold"/>
+                                        <p:tgtEl>
+                                          <p:spTgt spid="4"/>
+                                        </p:tgtEl>
+                                        <p:attrNameLst>
+                                          <p:attrName>ppt_h</p:attrName>
+                                        </p:attrNameLst>
+                                      </p:cBhvr>
+                                      <p:tavLst>
+                                        <p:tav tm="0">
+                                          <p:val>
+                                            <p:fltVal val="0"/>
+                                          </p:val>
+                                        </p:tav>
+                                        <p:tav tm="100000">
+                                          <p:val>
+                                            <p:strVal val="#ppt_h"/>
+                                          </p:val>
+                                        </p:tav>
+                                      </p:tavLst>
+                                    </p:anim>
+                                    <p:animEffect transition="in" filter="fade">
+                                      <p:cBhvr>
+                                        <p:cTn id="13" dur="500"/>
+                                        <p:tgtEl>
+                                          <p:spTgt spid="4"/>
+                                        </p:tgtEl>
+                                      </p:cBhvr>
+                                    </p:animEffect>
+                                  </p:childTnLst>
+                                </p:cTn>
+                              </p:par>
+                            </p:childTnLst>
+                          </p:cTn>
+                        </p:par>
+                      </p:childTnLst>
+                    </p:cTn>
+                  </p:par>
+                </p:childTnLst>
+              </p:cTn>
+              <p:prevCondLst>
+                <p:cond evt="onPrev" delay="0">
+                  <p:tgtEl>
+                    <p:sldTgt/>
+                  </p:tgtEl>
+                </p:cond>
+              </p:prevCondLst>
+              <p:nextCondLst>
+                <p:cond evt="onNext" delay="0">
+                  <p:tgtEl>
+                    <p:sldTgt/>
+                  </p:tgtEl>
+                </p:cond>
+              </p:nextCondLst>
+            </p:seq>
+          </p:childTnLst>
+        </p:cTn>
+      </p:par>
+    </p:tnLst>
+    <p:bldLst>
+      <p:bldP spid="2" grpId="0"/>
+      <p:bldP spid="4" grpId="0"/>
     </p:bldLst>
   </p:timing>
 </p:sld>

</xml_diff>